<commit_message>
Modified the performance for MNIST as of 1/20/2018, and add some additional top conferences
</commit_message>
<xml_diff>
--- a/lectures/Lect01_IntroML.pptx
+++ b/lectures/Lect01_IntroML.pptx
@@ -1,6 +1,6 @@
 
 <file path=ppt/presentation.xml><?xml version="1.0" encoding="utf-8"?>
-<p:presentation xmlns:a="http://schemas.openxmlformats.org/drawingml/2006/main" xmlns:r="http://schemas.openxmlformats.org/officeDocument/2006/relationships" xmlns:p="http://schemas.openxmlformats.org/presentationml/2006/main" autoCompressPictures="0">
+<p:presentation xmlns:a="http://schemas.openxmlformats.org/drawingml/2006/main" xmlns:r="http://schemas.openxmlformats.org/officeDocument/2006/relationships" xmlns:p="http://schemas.openxmlformats.org/presentationml/2006/main" saveSubsetFonts="1" autoCompressPictures="0">
   <p:sldMasterIdLst>
     <p:sldMasterId id="2147483648" r:id="rId1"/>
   </p:sldMasterIdLst>
@@ -233,7 +233,7 @@
           <a:p>
             <a:fld id="{B7D6DDD3-D7E9-488B-B626-1E8285E424D8}" type="datetimeFigureOut">
               <a:rPr lang="en-US" smtClean="0"/>
-              <a:t>8/6/2017</a:t>
+              <a:t>1/21/18</a:t>
             </a:fld>
             <a:endParaRPr lang="en-US"/>
           </a:p>
@@ -4782,7 +4782,7 @@
                       <m:sSubPr>
                         <m:ctrlPr>
                           <a:rPr lang="en-US" b="0" i="1" smtClean="0">
-                            <a:latin typeface="Cambria Math" panose="02040503050406030204" pitchFamily="18" charset="0"/>
+                            <a:latin typeface="Cambria Math" charset="0"/>
                           </a:rPr>
                         </m:ctrlPr>
                       </m:sSubPr>
@@ -4813,7 +4813,7 @@
                       <m:sSubPr>
                         <m:ctrlPr>
                           <a:rPr lang="en-US" b="0" i="1" smtClean="0">
-                            <a:latin typeface="Cambria Math" panose="02040503050406030204" pitchFamily="18" charset="0"/>
+                            <a:latin typeface="Cambria Math" charset="0"/>
                           </a:rPr>
                         </m:ctrlPr>
                       </m:sSubPr>
@@ -4892,8 +4892,12 @@
               </a:p>
               <a:p>
                 <a:r>
+                  <a:rPr lang="en-US" dirty="0" smtClean="0"/>
+                  <a:t>The function on the right </a:t>
+                </a:r>
+                <a:r>
                   <a:rPr lang="en-US" dirty="0"/>
-                  <a:t>This function is an example of a </a:t>
+                  <a:t>is an example of a </a:t>
                 </a:r>
                 <a:r>
                   <a:rPr lang="en-US" dirty="0">
@@ -4930,7 +4934,7 @@
                 <a:off x="1097280" y="1539277"/>
                 <a:ext cx="5900928" cy="4329817"/>
               </a:xfrm>
-              <a:blipFill>
+              <a:blipFill rotWithShape="0">
                 <a:blip r:embed="rId2"/>
                 <a:stretch>
                   <a:fillRect l="-2479" t="-1549"/>
@@ -5157,8 +5161,13 @@
                 <a:pPr lvl="1"/>
                 <a:r>
                   <a:rPr lang="en-US" dirty="0"/>
-                  <a:t>Can use multiple predictor</a:t>
+                  <a:t>Can use multiple </a:t>
                 </a:r>
+                <a:r>
+                  <a:rPr lang="en-US" dirty="0" smtClean="0"/>
+                  <a:t>predictors</a:t>
+                </a:r>
+                <a:endParaRPr lang="en-US" dirty="0"/>
               </a:p>
               <a:p>
                 <a:r>
@@ -5190,7 +5199,7 @@
                       <m:sSubPr>
                         <m:ctrlPr>
                           <a:rPr lang="en-US" b="0" i="1" smtClean="0">
-                            <a:latin typeface="Cambria Math" panose="02040503050406030204" pitchFamily="18" charset="0"/>
+                            <a:latin typeface="Cambria Math" charset="0"/>
                           </a:rPr>
                         </m:ctrlPr>
                       </m:sSubPr>
@@ -5221,7 +5230,7 @@
                       <m:sSubPr>
                         <m:ctrlPr>
                           <a:rPr lang="en-US" b="0" i="1" smtClean="0">
-                            <a:latin typeface="Cambria Math" panose="02040503050406030204" pitchFamily="18" charset="0"/>
+                            <a:latin typeface="Cambria Math" charset="0"/>
                           </a:rPr>
                         </m:ctrlPr>
                       </m:sSubPr>
@@ -5264,7 +5273,7 @@
                       <m:sSubPr>
                         <m:ctrlPr>
                           <a:rPr lang="en-US" i="1">
-                            <a:latin typeface="Cambria Math" panose="02040503050406030204" pitchFamily="18" charset="0"/>
+                            <a:latin typeface="Cambria Math" charset="0"/>
                           </a:rPr>
                         </m:ctrlPr>
                       </m:sSubPr>
@@ -5297,7 +5306,7 @@
                       <m:sSubPr>
                         <m:ctrlPr>
                           <a:rPr lang="en-US" i="1">
-                            <a:latin typeface="Cambria Math" panose="02040503050406030204" pitchFamily="18" charset="0"/>
+                            <a:latin typeface="Cambria Math" charset="0"/>
                           </a:rPr>
                         </m:ctrlPr>
                       </m:sSubPr>
@@ -5352,7 +5361,7 @@
                 <a:off x="1097280" y="1539277"/>
                 <a:ext cx="4995871" cy="4329817"/>
               </a:xfrm>
-              <a:blipFill>
+              <a:blipFill rotWithShape="0">
                 <a:blip r:embed="rId2"/>
                 <a:stretch>
                   <a:fillRect l="-2927" t="-1549"/>
@@ -5550,6 +5559,10 @@
                 <a:hlinkClick r:id="rId2"/>
               </a:rPr>
               <a:t>https://archive.ics.uci.edu/ml/datasets/Diabetes</a:t>
+            </a:r>
+            <a:r>
+              <a:rPr lang="en-US" dirty="0"/>
+              <a:t/>
             </a:r>
             <a:br>
               <a:rPr lang="en-US" dirty="0"/>
@@ -5843,6 +5856,10 @@
               </a:rPr>
               <a:t>http://www.ibm.com/support/knowledgecenter</a:t>
             </a:r>
+            <a:r>
+              <a:rPr lang="en-US" dirty="0"/>
+              <a:t/>
+            </a:r>
             <a:br>
               <a:rPr lang="en-US" dirty="0"/>
             </a:br>
@@ -6107,7 +6124,7 @@
           <p:cNvPr id="2" name="Title 1">
             <a:extLst>
               <a:ext uri="{FF2B5EF4-FFF2-40B4-BE49-F238E27FC236}">
-                <a16:creationId xmlns:a16="http://schemas.microsoft.com/office/drawing/2014/main" id="{B16E8B40-51F8-4544-9755-4679E639ADE8}"/>
+                <a16:creationId xmlns:a16="http://schemas.microsoft.com/office/drawing/2014/main" xmlns="" id="{B16E8B40-51F8-4544-9755-4679E639ADE8}"/>
               </a:ext>
             </a:extLst>
           </p:cNvPr>
@@ -6135,7 +6152,7 @@
           <p:cNvPr id="3" name="Content Placeholder 2">
             <a:extLst>
               <a:ext uri="{FF2B5EF4-FFF2-40B4-BE49-F238E27FC236}">
-                <a16:creationId xmlns:a16="http://schemas.microsoft.com/office/drawing/2014/main" id="{9B93E88E-28CB-42DD-9357-D14AE9CDF5E2}"/>
+                <a16:creationId xmlns:a16="http://schemas.microsoft.com/office/drawing/2014/main" xmlns="" id="{9B93E88E-28CB-42DD-9357-D14AE9CDF5E2}"/>
               </a:ext>
             </a:extLst>
           </p:cNvPr>
@@ -6193,7 +6210,7 @@
           <p:cNvPr id="4" name="Slide Number Placeholder 3">
             <a:extLst>
               <a:ext uri="{FF2B5EF4-FFF2-40B4-BE49-F238E27FC236}">
-                <a16:creationId xmlns:a16="http://schemas.microsoft.com/office/drawing/2014/main" id="{22489799-F044-4662-AD56-1867DCBDA703}"/>
+                <a16:creationId xmlns:a16="http://schemas.microsoft.com/office/drawing/2014/main" xmlns="" id="{22489799-F044-4662-AD56-1867DCBDA703}"/>
               </a:ext>
             </a:extLst>
           </p:cNvPr>
@@ -6222,7 +6239,7 @@
           <p:cNvPr id="6" name="Picture 5">
             <a:extLst>
               <a:ext uri="{FF2B5EF4-FFF2-40B4-BE49-F238E27FC236}">
-                <a16:creationId xmlns:a16="http://schemas.microsoft.com/office/drawing/2014/main" id="{ED6BCD80-B7A4-4801-97BF-B5A8BB4FB0EE}"/>
+                <a16:creationId xmlns:a16="http://schemas.microsoft.com/office/drawing/2014/main" xmlns="" id="{ED6BCD80-B7A4-4801-97BF-B5A8BB4FB0EE}"/>
               </a:ext>
             </a:extLst>
           </p:cNvPr>
@@ -6252,7 +6269,7 @@
           <p:cNvPr id="8" name="Picture 7">
             <a:extLst>
               <a:ext uri="{FF2B5EF4-FFF2-40B4-BE49-F238E27FC236}">
-                <a16:creationId xmlns:a16="http://schemas.microsoft.com/office/drawing/2014/main" id="{D426345F-0229-4381-9773-B78DF7B0350D}"/>
+                <a16:creationId xmlns:a16="http://schemas.microsoft.com/office/drawing/2014/main" xmlns="" id="{D426345F-0229-4381-9773-B78DF7B0350D}"/>
               </a:ext>
             </a:extLst>
           </p:cNvPr>
@@ -6282,7 +6299,7 @@
           <p:cNvPr id="10" name="Picture 9">
             <a:extLst>
               <a:ext uri="{FF2B5EF4-FFF2-40B4-BE49-F238E27FC236}">
-                <a16:creationId xmlns:a16="http://schemas.microsoft.com/office/drawing/2014/main" id="{CB013C89-51D4-4841-AC6B-6723DB4391C7}"/>
+                <a16:creationId xmlns:a16="http://schemas.microsoft.com/office/drawing/2014/main" xmlns="" id="{CB013C89-51D4-4841-AC6B-6723DB4391C7}"/>
               </a:ext>
             </a:extLst>
           </p:cNvPr>
@@ -6312,7 +6329,7 @@
           <p:cNvPr id="12" name="Picture 11">
             <a:extLst>
               <a:ext uri="{FF2B5EF4-FFF2-40B4-BE49-F238E27FC236}">
-                <a16:creationId xmlns:a16="http://schemas.microsoft.com/office/drawing/2014/main" id="{E947A439-C85A-41C0-A657-C80676F054B5}"/>
+                <a16:creationId xmlns:a16="http://schemas.microsoft.com/office/drawing/2014/main" xmlns="" id="{E947A439-C85A-41C0-A657-C80676F054B5}"/>
               </a:ext>
             </a:extLst>
           </p:cNvPr>
@@ -6372,7 +6389,7 @@
           <p:cNvPr id="2" name="Title 1">
             <a:extLst>
               <a:ext uri="{FF2B5EF4-FFF2-40B4-BE49-F238E27FC236}">
-                <a16:creationId xmlns:a16="http://schemas.microsoft.com/office/drawing/2014/main" id="{C8627AF6-7C74-4F87-B171-CECD925F68E8}"/>
+                <a16:creationId xmlns:a16="http://schemas.microsoft.com/office/drawing/2014/main" xmlns="" id="{C8627AF6-7C74-4F87-B171-CECD925F68E8}"/>
               </a:ext>
             </a:extLst>
           </p:cNvPr>
@@ -6400,7 +6417,7 @@
           <p:cNvPr id="3" name="Content Placeholder 2">
             <a:extLst>
               <a:ext uri="{FF2B5EF4-FFF2-40B4-BE49-F238E27FC236}">
-                <a16:creationId xmlns:a16="http://schemas.microsoft.com/office/drawing/2014/main" id="{A51702D3-CE94-4364-A5FF-EC836DCDB102}"/>
+                <a16:creationId xmlns:a16="http://schemas.microsoft.com/office/drawing/2014/main" xmlns="" id="{A51702D3-CE94-4364-A5FF-EC836DCDB102}"/>
               </a:ext>
             </a:extLst>
           </p:cNvPr>
@@ -6491,7 +6508,7 @@
           <p:cNvPr id="4" name="Slide Number Placeholder 3">
             <a:extLst>
               <a:ext uri="{FF2B5EF4-FFF2-40B4-BE49-F238E27FC236}">
-                <a16:creationId xmlns:a16="http://schemas.microsoft.com/office/drawing/2014/main" id="{D2A76AA4-A6CE-4BAD-AFA7-223FD21ABD4B}"/>
+                <a16:creationId xmlns:a16="http://schemas.microsoft.com/office/drawing/2014/main" xmlns="" id="{D2A76AA4-A6CE-4BAD-AFA7-223FD21ABD4B}"/>
               </a:ext>
             </a:extLst>
           </p:cNvPr>
@@ -6520,7 +6537,7 @@
           <p:cNvPr id="6" name="Picture 5">
             <a:extLst>
               <a:ext uri="{FF2B5EF4-FFF2-40B4-BE49-F238E27FC236}">
-                <a16:creationId xmlns:a16="http://schemas.microsoft.com/office/drawing/2014/main" id="{1E66F134-F04C-44F3-9EBC-B4C2EFEC4999}"/>
+                <a16:creationId xmlns:a16="http://schemas.microsoft.com/office/drawing/2014/main" xmlns="" id="{1E66F134-F04C-44F3-9EBC-B4C2EFEC4999}"/>
               </a:ext>
             </a:extLst>
           </p:cNvPr>
@@ -6550,7 +6567,7 @@
           <p:cNvPr id="8" name="Picture 7">
             <a:extLst>
               <a:ext uri="{FF2B5EF4-FFF2-40B4-BE49-F238E27FC236}">
-                <a16:creationId xmlns:a16="http://schemas.microsoft.com/office/drawing/2014/main" id="{C9FFBE3F-6FA6-42FE-ADBE-A63CFE2AE558}"/>
+                <a16:creationId xmlns:a16="http://schemas.microsoft.com/office/drawing/2014/main" xmlns="" id="{C9FFBE3F-6FA6-42FE-ADBE-A63CFE2AE558}"/>
               </a:ext>
             </a:extLst>
           </p:cNvPr>
@@ -6580,7 +6597,7 @@
           <p:cNvPr id="9" name="TextBox 8">
             <a:extLst>
               <a:ext uri="{FF2B5EF4-FFF2-40B4-BE49-F238E27FC236}">
-                <a16:creationId xmlns:a16="http://schemas.microsoft.com/office/drawing/2014/main" id="{21FF2B10-47F8-4CEA-8A1B-D0BD8991E07E}"/>
+                <a16:creationId xmlns:a16="http://schemas.microsoft.com/office/drawing/2014/main" xmlns="" id="{21FF2B10-47F8-4CEA-8A1B-D0BD8991E07E}"/>
               </a:ext>
             </a:extLst>
           </p:cNvPr>
@@ -6805,9 +6822,10 @@
           <a:lstStyle/>
           <a:p>
             <a:r>
-              <a:rPr lang="en-US" dirty="0"/>
-              <a:t>Journals</a:t>
-            </a:r>
+              <a:rPr lang="en-US" dirty="0" smtClean="0"/>
+              <a:t>Top Journals</a:t>
+            </a:r>
+            <a:endParaRPr lang="en-US" dirty="0"/>
           </a:p>
         </p:txBody>
       </p:sp>
@@ -6948,9 +6966,10 @@
           <a:lstStyle/>
           <a:p>
             <a:r>
-              <a:rPr lang="en-US" dirty="0"/>
-              <a:t>Conferences</a:t>
-            </a:r>
+              <a:rPr lang="en-US" dirty="0" smtClean="0"/>
+              <a:t>Top Conferences</a:t>
+            </a:r>
+            <a:endParaRPr lang="en-US" dirty="0"/>
           </a:p>
         </p:txBody>
       </p:sp>
@@ -6966,7 +6985,9 @@
         </p:nvSpPr>
         <p:spPr/>
         <p:txBody>
-          <a:bodyPr/>
+          <a:bodyPr>
+            <a:normAutofit lnSpcReduction="10000"/>
+          </a:bodyPr>
           <a:lstStyle/>
           <a:p>
             <a:pPr>
@@ -7042,7 +7063,11 @@
             </a:pPr>
             <a:r>
               <a:rPr lang="tr-TR" dirty="0"/>
-              <a:t>International Conference on AI &amp; Statistics (AISTATS)</a:t>
+              <a:t>International Conference on AI &amp; Statistics (AISTATS</a:t>
+            </a:r>
+            <a:r>
+              <a:rPr lang="tr-TR" dirty="0" smtClean="0"/>
+              <a:t>)</a:t>
             </a:r>
           </a:p>
           <a:p>
@@ -7053,8 +7078,146 @@
             </a:pPr>
             <a:r>
               <a:rPr lang="tr-TR" dirty="0"/>
-              <a:t>International Conference on Pattern Recognition (ICPR)</a:t>
-            </a:r>
+              <a:t>Knowledge </a:t>
+            </a:r>
+            <a:r>
+              <a:rPr lang="tr-TR" dirty="0" err="1"/>
+              <a:t>Discovery</a:t>
+            </a:r>
+            <a:r>
+              <a:rPr lang="tr-TR" dirty="0"/>
+              <a:t> </a:t>
+            </a:r>
+            <a:r>
+              <a:rPr lang="tr-TR" dirty="0" err="1"/>
+              <a:t>and</a:t>
+            </a:r>
+            <a:r>
+              <a:rPr lang="tr-TR" dirty="0"/>
+              <a:t> Data </a:t>
+            </a:r>
+            <a:r>
+              <a:rPr lang="tr-TR" dirty="0" err="1" smtClean="0"/>
+              <a:t>Mining</a:t>
+            </a:r>
+            <a:r>
+              <a:rPr lang="tr-TR" dirty="0" smtClean="0"/>
+              <a:t> (KDD)</a:t>
+            </a:r>
+          </a:p>
+          <a:p>
+            <a:pPr>
+              <a:lnSpc>
+                <a:spcPct val="80000"/>
+              </a:lnSpc>
+            </a:pPr>
+            <a:r>
+              <a:rPr lang="tr-TR" dirty="0" smtClean="0"/>
+              <a:t>International </a:t>
+            </a:r>
+            <a:r>
+              <a:rPr lang="tr-TR" dirty="0" smtClean="0"/>
+              <a:t>Conference on </a:t>
+            </a:r>
+            <a:r>
+              <a:rPr lang="tr-TR" dirty="0" err="1" smtClean="0"/>
+              <a:t>Computer</a:t>
+            </a:r>
+            <a:r>
+              <a:rPr lang="tr-TR" dirty="0" smtClean="0"/>
+              <a:t> </a:t>
+            </a:r>
+            <a:r>
+              <a:rPr lang="tr-TR" dirty="0" err="1" smtClean="0"/>
+              <a:t>Vision</a:t>
+            </a:r>
+            <a:r>
+              <a:rPr lang="tr-TR" dirty="0" smtClean="0"/>
+              <a:t> </a:t>
+            </a:r>
+            <a:r>
+              <a:rPr lang="tr-TR" dirty="0" err="1" smtClean="0"/>
+              <a:t>and</a:t>
+            </a:r>
+            <a:r>
+              <a:rPr lang="tr-TR" dirty="0" smtClean="0"/>
+              <a:t> </a:t>
+            </a:r>
+            <a:r>
+              <a:rPr lang="tr-TR" dirty="0" err="1" smtClean="0"/>
+              <a:t>Pattern</a:t>
+            </a:r>
+            <a:r>
+              <a:rPr lang="tr-TR" dirty="0" smtClean="0"/>
+              <a:t> </a:t>
+            </a:r>
+            <a:r>
+              <a:rPr lang="tr-TR" dirty="0" err="1" smtClean="0"/>
+              <a:t>Recognition</a:t>
+            </a:r>
+            <a:r>
+              <a:rPr lang="tr-TR" dirty="0" smtClean="0"/>
+              <a:t> (CVPR)</a:t>
+            </a:r>
+          </a:p>
+          <a:p>
+            <a:pPr>
+              <a:lnSpc>
+                <a:spcPct val="80000"/>
+              </a:lnSpc>
+            </a:pPr>
+            <a:r>
+              <a:rPr lang="tr-TR" dirty="0" smtClean="0"/>
+              <a:t>International Conference on </a:t>
+            </a:r>
+            <a:r>
+              <a:rPr lang="tr-TR" dirty="0" err="1" smtClean="0"/>
+              <a:t>Computer</a:t>
+            </a:r>
+            <a:r>
+              <a:rPr lang="tr-TR" dirty="0" smtClean="0"/>
+              <a:t> </a:t>
+            </a:r>
+            <a:r>
+              <a:rPr lang="tr-TR" dirty="0" err="1" smtClean="0"/>
+              <a:t>Vision</a:t>
+            </a:r>
+            <a:r>
+              <a:rPr lang="tr-TR" dirty="0" smtClean="0"/>
+              <a:t> (ICCV)</a:t>
+            </a:r>
+          </a:p>
+          <a:p>
+            <a:pPr>
+              <a:lnSpc>
+                <a:spcPct val="80000"/>
+              </a:lnSpc>
+            </a:pPr>
+            <a:r>
+              <a:rPr lang="tr-TR" dirty="0" err="1" smtClean="0"/>
+              <a:t>European</a:t>
+            </a:r>
+            <a:r>
+              <a:rPr lang="tr-TR" dirty="0" smtClean="0"/>
+              <a:t> Conference on </a:t>
+            </a:r>
+            <a:r>
+              <a:rPr lang="tr-TR" dirty="0" err="1" smtClean="0"/>
+              <a:t>Computer</a:t>
+            </a:r>
+            <a:r>
+              <a:rPr lang="tr-TR" dirty="0" smtClean="0"/>
+              <a:t> </a:t>
+            </a:r>
+            <a:r>
+              <a:rPr lang="tr-TR" dirty="0" err="1" smtClean="0"/>
+              <a:t>Vision</a:t>
+            </a:r>
+            <a:r>
+              <a:rPr lang="tr-TR" dirty="0" smtClean="0"/>
+              <a:t> (ECCV)</a:t>
+            </a:r>
+            <a:endParaRPr lang="tr-TR" dirty="0"/>
           </a:p>
           <a:p>
             <a:endParaRPr lang="en-US" dirty="0"/>
@@ -7705,7 +7868,7 @@
                       <m:dPr>
                         <m:ctrlPr>
                           <a:rPr lang="en-US" b="0" i="1" smtClean="0">
-                            <a:latin typeface="Cambria Math" panose="02040503050406030204" pitchFamily="18" charset="0"/>
+                            <a:latin typeface="Cambria Math" charset="0"/>
                           </a:rPr>
                         </m:ctrlPr>
                       </m:dPr>
@@ -7769,7 +7932,7 @@
                       <m:dPr>
                         <m:ctrlPr>
                           <a:rPr lang="en-US" i="1">
-                            <a:latin typeface="Cambria Math" panose="02040503050406030204" pitchFamily="18" charset="0"/>
+                            <a:latin typeface="Cambria Math" charset="0"/>
                           </a:rPr>
                         </m:ctrlPr>
                       </m:dPr>
@@ -7936,8 +8099,8 @@
           </a:p>
         </p:txBody>
       </p:sp>
-      <mc:AlternateContent xmlns:mc="http://schemas.openxmlformats.org/markup-compatibility/2006" xmlns:a14="http://schemas.microsoft.com/office/drawing/2010/main">
-        <mc:Choice Requires="a14">
+      <mc:AlternateContent xmlns:mc="http://schemas.openxmlformats.org/markup-compatibility/2006">
+        <mc:Choice xmlns:a14="http://schemas.microsoft.com/office/drawing/2010/main" Requires="a14">
           <p:sp>
             <p:nvSpPr>
               <p:cNvPr id="3" name="Content Placeholder 2"/>
@@ -8034,11 +8197,46 @@
               <a:p>
                 <a:r>
                   <a:rPr lang="en-US" dirty="0"/>
-                  <a:t>Current systems get &lt;0.4% errors</a:t>
+                  <a:t>Current systems get &lt;</a:t>
                 </a:r>
+                <a:r>
+                  <a:rPr lang="en-US" dirty="0" smtClean="0"/>
+                  <a:t>0.21% </a:t>
+                </a:r>
+                <a:r>
+                  <a:rPr lang="en-US" dirty="0" smtClean="0"/>
+                  <a:t>errors (as of 1/20/2018)</a:t>
+                </a:r>
+                <a:endParaRPr lang="en-US" dirty="0" smtClean="0"/>
               </a:p>
               <a:p>
-                <a:endParaRPr lang="en-US" b="1" dirty="0"/>
+                <a:pPr marL="0" indent="0">
+                  <a:buNone/>
+                </a:pPr>
+                <a:r>
+                  <a:rPr lang="en-US" sz="1800" dirty="0" smtClean="0"/>
+                  <a:t>http</a:t>
+                </a:r>
+                <a:r>
+                  <a:rPr lang="en-US" sz="1800" dirty="0"/>
+                  <a:t>://</a:t>
+                </a:r>
+                <a:r>
+                  <a:rPr lang="en-US" sz="1800" dirty="0" err="1"/>
+                  <a:t>rodrigob.github.io</a:t>
+                </a:r>
+                <a:r>
+                  <a:rPr lang="en-US" sz="1800" dirty="0"/>
+                  <a:t>/</a:t>
+                </a:r>
+                <a:r>
+                  <a:rPr lang="en-US" sz="1800" dirty="0" err="1"/>
+                  <a:t>are_we_there_yet</a:t>
+                </a:r>
+                <a:r>
+                  <a:rPr lang="en-US" sz="1800" dirty="0"/>
+                  <a:t>/build/classification_datasets_results.html#4d4e495354</a:t>
+                </a:r>
               </a:p>
               <a:p>
                 <a:r>
@@ -8050,7 +8248,15 @@
                 <a:pPr lvl="1"/>
                 <a:r>
                   <a:rPr lang="en-US" dirty="0"/>
-                  <a:t>Used by USPS for recognized zip codes on letters</a:t>
+                  <a:t>Used by USPS for </a:t>
+                </a:r>
+                <a:r>
+                  <a:rPr lang="en-US" dirty="0" smtClean="0"/>
+                  <a:t>recognizing </a:t>
+                </a:r>
+                <a:r>
+                  <a:rPr lang="en-US" dirty="0"/>
+                  <a:t>zip codes on letters</a:t>
                 </a:r>
               </a:p>
               <a:p>
@@ -8059,7 +8265,7 @@
             </p:txBody>
           </p:sp>
         </mc:Choice>
-        <mc:Fallback xmlns="">
+        <mc:Fallback>
           <p:sp>
             <p:nvSpPr>
               <p:cNvPr id="3" name="Content Placeholder 2"/>
@@ -8075,10 +8281,10 @@
                 <a:off x="1097280" y="1539277"/>
                 <a:ext cx="5090160" cy="4329817"/>
               </a:xfrm>
-              <a:blipFill>
+              <a:blipFill rotWithShape="0">
                 <a:blip r:embed="rId2"/>
                 <a:stretch>
-                  <a:fillRect l="-2874" t="-1549" r="-2515"/>
+                  <a:fillRect l="-2874" t="-1549" r="-2395"/>
                 </a:stretch>
               </a:blipFill>
             </p:spPr>
@@ -8328,6 +8534,13 @@
   <p:clrMapOvr>
     <a:masterClrMapping/>
   </p:clrMapOvr>
+  <p:timing>
+    <p:tnLst>
+      <p:par>
+        <p:cTn id="1" dur="indefinite" restart="never" nodeType="tmRoot"/>
+      </p:par>
+    </p:tnLst>
+  </p:timing>
 </p:sld>
 </file>
 
@@ -8592,6 +8805,13 @@
   <p:clrMapOvr>
     <a:masterClrMapping/>
   </p:clrMapOvr>
+  <p:timing>
+    <p:tnLst>
+      <p:par>
+        <p:cTn id="1" dur="indefinite" restart="never" nodeType="tmRoot"/>
+      </p:par>
+    </p:tnLst>
+  </p:timing>
 </p:sld>
 </file>
 
@@ -8726,7 +8946,7 @@
                       <m:sSubPr>
                         <m:ctrlPr>
                           <a:rPr lang="en-US" b="0" i="1" smtClean="0">
-                            <a:latin typeface="Cambria Math" panose="02040503050406030204" pitchFamily="18" charset="0"/>
+                            <a:latin typeface="Cambria Math" charset="0"/>
                           </a:rPr>
                         </m:ctrlPr>
                       </m:sSubPr>
@@ -8904,6 +9124,13 @@
   <p:clrMapOvr>
     <a:masterClrMapping/>
   </p:clrMapOvr>
+  <p:timing>
+    <p:tnLst>
+      <p:par>
+        <p:cTn id="1" dur="indefinite" restart="never" nodeType="tmRoot"/>
+      </p:par>
+    </p:tnLst>
+  </p:timing>
 </p:sld>
 </file>
 

</xml_diff>

<commit_message>
Improved explanation on digit example Corrected typo in readme
</commit_message>
<xml_diff>
--- a/lectures/Lect01_IntroML.pptx
+++ b/lectures/Lect01_IntroML.pptx
@@ -5,7 +5,7 @@
     <p:sldMasterId id="2147483648" r:id="rId1"/>
   </p:sldMasterIdLst>
   <p:notesMasterIdLst>
-    <p:notesMasterId r:id="rId25"/>
+    <p:notesMasterId r:id="rId26"/>
   </p:notesMasterIdLst>
   <p:sldIdLst>
     <p:sldId id="258" r:id="rId2"/>
@@ -14,23 +14,24 @@
     <p:sldId id="260" r:id="rId5"/>
     <p:sldId id="261" r:id="rId6"/>
     <p:sldId id="281" r:id="rId7"/>
-    <p:sldId id="262" r:id="rId8"/>
-    <p:sldId id="263" r:id="rId9"/>
-    <p:sldId id="264" r:id="rId10"/>
-    <p:sldId id="265" r:id="rId11"/>
-    <p:sldId id="266" r:id="rId12"/>
-    <p:sldId id="267" r:id="rId13"/>
-    <p:sldId id="278" r:id="rId14"/>
-    <p:sldId id="268" r:id="rId15"/>
-    <p:sldId id="269" r:id="rId16"/>
-    <p:sldId id="270" r:id="rId17"/>
-    <p:sldId id="272" r:id="rId18"/>
-    <p:sldId id="279" r:id="rId19"/>
-    <p:sldId id="277" r:id="rId20"/>
-    <p:sldId id="280" r:id="rId21"/>
-    <p:sldId id="274" r:id="rId22"/>
-    <p:sldId id="273" r:id="rId23"/>
-    <p:sldId id="276" r:id="rId24"/>
+    <p:sldId id="282" r:id="rId8"/>
+    <p:sldId id="283" r:id="rId9"/>
+    <p:sldId id="263" r:id="rId10"/>
+    <p:sldId id="264" r:id="rId11"/>
+    <p:sldId id="265" r:id="rId12"/>
+    <p:sldId id="266" r:id="rId13"/>
+    <p:sldId id="267" r:id="rId14"/>
+    <p:sldId id="278" r:id="rId15"/>
+    <p:sldId id="268" r:id="rId16"/>
+    <p:sldId id="269" r:id="rId17"/>
+    <p:sldId id="270" r:id="rId18"/>
+    <p:sldId id="272" r:id="rId19"/>
+    <p:sldId id="279" r:id="rId20"/>
+    <p:sldId id="277" r:id="rId21"/>
+    <p:sldId id="280" r:id="rId22"/>
+    <p:sldId id="274" r:id="rId23"/>
+    <p:sldId id="273" r:id="rId24"/>
+    <p:sldId id="276" r:id="rId25"/>
   </p:sldIdLst>
   <p:sldSz cx="12192000" cy="6858000"/>
   <p:notesSz cx="7315200" cy="9601200"/>
@@ -4132,6 +4133,270 @@
           <a:p>
             <a:r>
               <a:rPr lang="en-US" dirty="0"/>
+              <a:t>Training Data</a:t>
+            </a:r>
+          </a:p>
+        </p:txBody>
+      </p:sp>
+      <p:sp>
+        <p:nvSpPr>
+          <p:cNvPr id="3" name="Content Placeholder 2"/>
+          <p:cNvSpPr>
+            <a:spLocks noGrp="1"/>
+          </p:cNvSpPr>
+          <p:nvPr>
+            <p:ph idx="1"/>
+          </p:nvPr>
+        </p:nvSpPr>
+        <p:spPr>
+          <a:xfrm>
+            <a:off x="1097280" y="1539277"/>
+            <a:ext cx="6244424" cy="4329817"/>
+          </a:xfrm>
+        </p:spPr>
+        <p:txBody>
+          <a:bodyPr/>
+          <a:lstStyle/>
+          <a:p>
+            <a:r>
+              <a:rPr lang="en-US" dirty="0"/>
+              <a:t>Typical early face recognition datasets:</a:t>
+            </a:r>
+          </a:p>
+          <a:p>
+            <a:r>
+              <a:rPr lang="en-US" dirty="0"/>
+              <a:t>5000 faces</a:t>
+            </a:r>
+          </a:p>
+          <a:p>
+            <a:pPr lvl="1"/>
+            <a:r>
+              <a:rPr lang="en-US" dirty="0"/>
+              <a:t>All near frontal</a:t>
+            </a:r>
+          </a:p>
+          <a:p>
+            <a:pPr lvl="1"/>
+            <a:r>
+              <a:rPr lang="en-US" dirty="0"/>
+              <a:t>Vary age, race, gender, lighting</a:t>
+            </a:r>
+          </a:p>
+          <a:p>
+            <a:r>
+              <a:rPr lang="en-US" dirty="0"/>
+              <a:t> 10^8 non faces</a:t>
+            </a:r>
+          </a:p>
+          <a:p>
+            <a:r>
+              <a:rPr lang="en-US" dirty="0"/>
+              <a:t>Faces are normalized (scale, translation)</a:t>
+            </a:r>
+          </a:p>
+          <a:p>
+            <a:r>
+              <a:rPr lang="en-US" dirty="0"/>
+              <a:t>“functions” that work well may be very complex</a:t>
+            </a:r>
+          </a:p>
+          <a:p>
+            <a:pPr lvl="1"/>
+            <a:endParaRPr lang="en-US" dirty="0"/>
+          </a:p>
+          <a:p>
+            <a:r>
+              <a:rPr lang="en-US" dirty="0"/>
+              <a:t>Many more datasets are available now:</a:t>
+            </a:r>
+          </a:p>
+          <a:p>
+            <a:pPr lvl="1"/>
+            <a:r>
+              <a:rPr lang="en-US" dirty="0"/>
+              <a:t>See </a:t>
+            </a:r>
+            <a:r>
+              <a:rPr lang="en-US" dirty="0">
+                <a:hlinkClick r:id="rId2"/>
+              </a:rPr>
+              <a:t>http://www.face-rec.org/databases/</a:t>
+            </a:r>
+            <a:endParaRPr lang="en-US" dirty="0"/>
+          </a:p>
+          <a:p>
+            <a:pPr lvl="1"/>
+            <a:r>
+              <a:rPr lang="en-US" dirty="0"/>
+              <a:t>You can use this for your project!</a:t>
+            </a:r>
+          </a:p>
+        </p:txBody>
+      </p:sp>
+      <p:sp>
+        <p:nvSpPr>
+          <p:cNvPr id="4" name="Slide Number Placeholder 3"/>
+          <p:cNvSpPr>
+            <a:spLocks noGrp="1"/>
+          </p:cNvSpPr>
+          <p:nvPr>
+            <p:ph type="sldNum" sz="quarter" idx="12"/>
+          </p:nvPr>
+        </p:nvSpPr>
+        <p:spPr/>
+        <p:txBody>
+          <a:bodyPr/>
+          <a:lstStyle/>
+          <a:p>
+            <a:fld id="{629637A9-119A-49DA-BD12-AAC58B377D80}" type="slidenum">
+              <a:rPr lang="en-US" smtClean="0"/>
+              <a:t>10</a:t>
+            </a:fld>
+            <a:endParaRPr lang="en-US" dirty="0"/>
+          </a:p>
+        </p:txBody>
+      </p:sp>
+      <p:pic>
+        <p:nvPicPr>
+          <p:cNvPr id="5" name="Picture 4"/>
+          <p:cNvPicPr>
+            <a:picLocks noChangeAspect="1"/>
+          </p:cNvPicPr>
+          <p:nvPr/>
+        </p:nvPicPr>
+        <p:blipFill>
+          <a:blip r:embed="rId3"/>
+          <a:stretch>
+            <a:fillRect/>
+          </a:stretch>
+        </p:blipFill>
+        <p:spPr>
+          <a:xfrm>
+            <a:off x="8377093" y="1539277"/>
+            <a:ext cx="2281726" cy="2276819"/>
+          </a:xfrm>
+          <a:prstGeom prst="rect">
+            <a:avLst/>
+          </a:prstGeom>
+        </p:spPr>
+      </p:pic>
+      <p:pic>
+        <p:nvPicPr>
+          <p:cNvPr id="6" name="Picture 5"/>
+          <p:cNvPicPr>
+            <a:picLocks noChangeAspect="1"/>
+          </p:cNvPicPr>
+          <p:nvPr/>
+        </p:nvPicPr>
+        <p:blipFill>
+          <a:blip r:embed="rId4"/>
+          <a:stretch>
+            <a:fillRect/>
+          </a:stretch>
+        </p:blipFill>
+        <p:spPr>
+          <a:xfrm>
+            <a:off x="6694063" y="3965353"/>
+            <a:ext cx="4155083" cy="1494541"/>
+          </a:xfrm>
+          <a:prstGeom prst="rect">
+            <a:avLst/>
+          </a:prstGeom>
+        </p:spPr>
+      </p:pic>
+      <p:sp>
+        <p:nvSpPr>
+          <p:cNvPr id="7" name="TextBox 6"/>
+          <p:cNvSpPr txBox="1"/>
+          <p:nvPr/>
+        </p:nvSpPr>
+        <p:spPr>
+          <a:xfrm>
+            <a:off x="6694063" y="5499762"/>
+            <a:ext cx="3319948" cy="369332"/>
+          </a:xfrm>
+          <a:prstGeom prst="rect">
+            <a:avLst/>
+          </a:prstGeom>
+          <a:noFill/>
+        </p:spPr>
+        <p:txBody>
+          <a:bodyPr wrap="none" rtlCol="0">
+            <a:spAutoFit/>
+          </a:bodyPr>
+          <a:lstStyle/>
+          <a:p>
+            <a:r>
+              <a:rPr lang="en-US" dirty="0"/>
+              <a:t>Rowley, </a:t>
+            </a:r>
+            <a:r>
+              <a:rPr lang="en-US" dirty="0" err="1"/>
+              <a:t>Baluja</a:t>
+            </a:r>
+            <a:r>
+              <a:rPr lang="en-US" dirty="0"/>
+              <a:t> and </a:t>
+            </a:r>
+            <a:r>
+              <a:rPr lang="en-US" dirty="0" err="1"/>
+              <a:t>Kanade</a:t>
+            </a:r>
+            <a:r>
+              <a:rPr lang="en-US" dirty="0"/>
+              <a:t>, 1998 </a:t>
+            </a:r>
+          </a:p>
+        </p:txBody>
+      </p:sp>
+    </p:spTree>
+    <p:extLst>
+      <p:ext uri="{BB962C8B-B14F-4D97-AF65-F5344CB8AC3E}">
+        <p14:creationId xmlns:p14="http://schemas.microsoft.com/office/powerpoint/2010/main" val="3701493468"/>
+      </p:ext>
+    </p:extLst>
+  </p:cSld>
+  <p:clrMapOvr>
+    <a:masterClrMapping/>
+  </p:clrMapOvr>
+</p:sld>
+</file>
+
+<file path=ppt/slides/slide11.xml><?xml version="1.0" encoding="utf-8"?>
+<p:sld xmlns:a="http://schemas.openxmlformats.org/drawingml/2006/main" xmlns:r="http://schemas.openxmlformats.org/officeDocument/2006/relationships" xmlns:p="http://schemas.openxmlformats.org/presentationml/2006/main">
+  <p:cSld>
+    <p:spTree>
+      <p:nvGrpSpPr>
+        <p:cNvPr id="1" name=""/>
+        <p:cNvGrpSpPr/>
+        <p:nvPr/>
+      </p:nvGrpSpPr>
+      <p:grpSpPr>
+        <a:xfrm>
+          <a:off x="0" y="0"/>
+          <a:ext cx="0" cy="0"/>
+          <a:chOff x="0" y="0"/>
+          <a:chExt cx="0" cy="0"/>
+        </a:xfrm>
+      </p:grpSpPr>
+      <p:sp>
+        <p:nvSpPr>
+          <p:cNvPr id="2" name="Title 1"/>
+          <p:cNvSpPr>
+            <a:spLocks noGrp="1"/>
+          </p:cNvSpPr>
+          <p:nvPr>
+            <p:ph type="title"/>
+          </p:nvPr>
+        </p:nvSpPr>
+        <p:spPr/>
+        <p:txBody>
+          <a:bodyPr/>
+          <a:lstStyle/>
+          <a:p>
+            <a:r>
+              <a:rPr lang="en-US" dirty="0"/>
               <a:t>Example 3:  Spam Detection</a:t>
             </a:r>
           </a:p>
@@ -4367,7 +4632,7 @@
           <a:p>
             <a:fld id="{629637A9-119A-49DA-BD12-AAC58B377D80}" type="slidenum">
               <a:rPr lang="en-US" smtClean="0"/>
-              <a:t>10</a:t>
+              <a:t>11</a:t>
             </a:fld>
             <a:endParaRPr lang="en-US" dirty="0"/>
           </a:p>
@@ -4410,7 +4675,7 @@
 </p:sld>
 </file>
 
-<file path=ppt/slides/slide11.xml><?xml version="1.0" encoding="utf-8"?>
+<file path=ppt/slides/slide12.xml><?xml version="1.0" encoding="utf-8"?>
 <p:sld xmlns:a="http://schemas.openxmlformats.org/drawingml/2006/main" xmlns:r="http://schemas.openxmlformats.org/officeDocument/2006/relationships" xmlns:p="http://schemas.openxmlformats.org/presentationml/2006/main">
   <p:cSld>
     <p:spTree>
@@ -4508,7 +4773,7 @@
           <a:p>
             <a:fld id="{629637A9-119A-49DA-BD12-AAC58B377D80}" type="slidenum">
               <a:rPr lang="en-US" smtClean="0"/>
-              <a:t>11</a:t>
+              <a:t>12</a:t>
             </a:fld>
             <a:endParaRPr lang="en-US" dirty="0"/>
           </a:p>
@@ -4551,210 +4816,6 @@
 </p:sld>
 </file>
 
-<file path=ppt/slides/slide12.xml><?xml version="1.0" encoding="utf-8"?>
-<p:sld xmlns:a="http://schemas.openxmlformats.org/drawingml/2006/main" xmlns:r="http://schemas.openxmlformats.org/officeDocument/2006/relationships" xmlns:p="http://schemas.openxmlformats.org/presentationml/2006/main">
-  <p:cSld>
-    <p:spTree>
-      <p:nvGrpSpPr>
-        <p:cNvPr id="1" name=""/>
-        <p:cNvGrpSpPr/>
-        <p:nvPr/>
-      </p:nvGrpSpPr>
-      <p:grpSpPr>
-        <a:xfrm>
-          <a:off x="0" y="0"/>
-          <a:ext cx="0" cy="0"/>
-          <a:chOff x="0" y="0"/>
-          <a:chExt cx="0" cy="0"/>
-        </a:xfrm>
-      </p:grpSpPr>
-      <p:sp>
-        <p:nvSpPr>
-          <p:cNvPr id="2" name="Title 1"/>
-          <p:cNvSpPr>
-            <a:spLocks noGrp="1"/>
-          </p:cNvSpPr>
-          <p:nvPr>
-            <p:ph type="title"/>
-          </p:nvPr>
-        </p:nvSpPr>
-        <p:spPr/>
-        <p:txBody>
-          <a:bodyPr/>
-          <a:lstStyle/>
-          <a:p>
-            <a:r>
-              <a:rPr lang="en-US" dirty="0"/>
-              <a:t>Machine Learning in Many Fields</a:t>
-            </a:r>
-          </a:p>
-        </p:txBody>
-      </p:sp>
-      <p:sp>
-        <p:nvSpPr>
-          <p:cNvPr id="3" name="Content Placeholder 2"/>
-          <p:cNvSpPr>
-            <a:spLocks noGrp="1"/>
-          </p:cNvSpPr>
-          <p:nvPr>
-            <p:ph idx="1"/>
-          </p:nvPr>
-        </p:nvSpPr>
-        <p:spPr/>
-        <p:txBody>
-          <a:bodyPr/>
-          <a:lstStyle/>
-          <a:p>
-            <a:r>
-              <a:rPr lang="tr-TR" dirty="0">
-                <a:solidFill>
-                  <a:schemeClr val="accent1"/>
-                </a:solidFill>
-              </a:rPr>
-              <a:t>Retail:</a:t>
-            </a:r>
-            <a:r>
-              <a:rPr lang="tr-TR" dirty="0"/>
-              <a:t> </a:t>
-            </a:r>
-            <a:r>
-              <a:rPr lang="tr-TR" dirty="0">
-                <a:solidFill>
-                  <a:schemeClr val="tx2"/>
-                </a:solidFill>
-              </a:rPr>
-              <a:t>Market basket analysis, Customer relationship management (CRM)</a:t>
-            </a:r>
-          </a:p>
-          <a:p>
-            <a:r>
-              <a:rPr lang="tr-TR" dirty="0">
-                <a:solidFill>
-                  <a:schemeClr val="accent1"/>
-                </a:solidFill>
-              </a:rPr>
-              <a:t>Finance:</a:t>
-            </a:r>
-            <a:r>
-              <a:rPr lang="tr-TR" dirty="0"/>
-              <a:t> Credit scoring, fraud detection</a:t>
-            </a:r>
-          </a:p>
-          <a:p>
-            <a:r>
-              <a:rPr lang="tr-TR" dirty="0">
-                <a:solidFill>
-                  <a:schemeClr val="accent1"/>
-                </a:solidFill>
-              </a:rPr>
-              <a:t>Manufacturing: </a:t>
-            </a:r>
-            <a:r>
-              <a:rPr lang="tr-TR" dirty="0"/>
-              <a:t>Control, robotics, troubleshooting</a:t>
-            </a:r>
-          </a:p>
-          <a:p>
-            <a:r>
-              <a:rPr lang="tr-TR" dirty="0">
-                <a:solidFill>
-                  <a:schemeClr val="accent1"/>
-                </a:solidFill>
-              </a:rPr>
-              <a:t>Medicine: </a:t>
-            </a:r>
-            <a:r>
-              <a:rPr lang="tr-TR" dirty="0"/>
-              <a:t>Medical diagnosis</a:t>
-            </a:r>
-          </a:p>
-          <a:p>
-            <a:r>
-              <a:rPr lang="tr-TR" dirty="0">
-                <a:solidFill>
-                  <a:schemeClr val="accent1"/>
-                </a:solidFill>
-              </a:rPr>
-              <a:t>Telecommunications:</a:t>
-            </a:r>
-            <a:r>
-              <a:rPr lang="tr-TR" dirty="0"/>
-              <a:t> Spam filters, intrusion detection</a:t>
-            </a:r>
-          </a:p>
-          <a:p>
-            <a:r>
-              <a:rPr lang="tr-TR" dirty="0">
-                <a:solidFill>
-                  <a:schemeClr val="accent1"/>
-                </a:solidFill>
-              </a:rPr>
-              <a:t>Bioinformatics: </a:t>
-            </a:r>
-            <a:r>
-              <a:rPr lang="tr-TR" dirty="0"/>
-              <a:t>Motifs, alignment</a:t>
-            </a:r>
-          </a:p>
-          <a:p>
-            <a:r>
-              <a:rPr lang="tr-TR" dirty="0">
-                <a:solidFill>
-                  <a:schemeClr val="accent1"/>
-                </a:solidFill>
-              </a:rPr>
-              <a:t>Web mining: </a:t>
-            </a:r>
-            <a:r>
-              <a:rPr lang="tr-TR" dirty="0"/>
-              <a:t>Search engines</a:t>
-            </a:r>
-          </a:p>
-          <a:p>
-            <a:r>
-              <a:rPr lang="tr-TR" dirty="0"/>
-              <a:t>...</a:t>
-            </a:r>
-            <a:endParaRPr lang="en-US" dirty="0"/>
-          </a:p>
-        </p:txBody>
-      </p:sp>
-      <p:sp>
-        <p:nvSpPr>
-          <p:cNvPr id="4" name="Slide Number Placeholder 3"/>
-          <p:cNvSpPr>
-            <a:spLocks noGrp="1"/>
-          </p:cNvSpPr>
-          <p:nvPr>
-            <p:ph type="sldNum" sz="quarter" idx="12"/>
-          </p:nvPr>
-        </p:nvSpPr>
-        <p:spPr/>
-        <p:txBody>
-          <a:bodyPr/>
-          <a:lstStyle/>
-          <a:p>
-            <a:fld id="{629637A9-119A-49DA-BD12-AAC58B377D80}" type="slidenum">
-              <a:rPr lang="en-US" smtClean="0"/>
-              <a:t>12</a:t>
-            </a:fld>
-            <a:endParaRPr lang="en-US" dirty="0"/>
-          </a:p>
-        </p:txBody>
-      </p:sp>
-    </p:spTree>
-    <p:extLst>
-      <p:ext uri="{BB962C8B-B14F-4D97-AF65-F5344CB8AC3E}">
-        <p14:creationId xmlns:p14="http://schemas.microsoft.com/office/powerpoint/2010/main" val="3172369853"/>
-      </p:ext>
-    </p:extLst>
-  </p:cSld>
-  <p:clrMapOvr>
-    <a:masterClrMapping/>
-  </p:clrMapOvr>
-</p:sld>
-</file>
-
 <file path=ppt/slides/slide13.xml><?xml version="1.0" encoding="utf-8"?>
 <p:sld xmlns:a="http://schemas.openxmlformats.org/drawingml/2006/main" xmlns:r="http://schemas.openxmlformats.org/officeDocument/2006/relationships" xmlns:p="http://schemas.openxmlformats.org/presentationml/2006/main">
   <p:cSld>
@@ -4789,7 +4850,7 @@
           <a:p>
             <a:r>
               <a:rPr lang="en-US" dirty="0"/>
-              <a:t>Outline</a:t>
+              <a:t>Machine Learning in Many Fields</a:t>
             </a:r>
           </a:p>
         </p:txBody>
@@ -4810,77 +4871,115 @@
           <a:lstStyle/>
           <a:p>
             <a:r>
-              <a:rPr lang="en-US" dirty="0"/>
-              <a:t>What is Machine Learning?</a:t>
-            </a:r>
-          </a:p>
-          <a:p>
-            <a:r>
-              <a:rPr lang="en-US" dirty="0"/>
-              <a:t>Types of machine learning algorithms</a:t>
-            </a:r>
-          </a:p>
-          <a:p>
-            <a:pPr lvl="1"/>
-            <a:r>
-              <a:rPr lang="en-US" dirty="0"/>
-              <a:t>Classification</a:t>
-            </a:r>
-          </a:p>
-          <a:p>
-            <a:pPr lvl="1"/>
-            <a:r>
-              <a:rPr lang="en-US" dirty="0"/>
-              <a:t>Regression</a:t>
-            </a:r>
-          </a:p>
-          <a:p>
-            <a:pPr lvl="1"/>
-            <a:r>
-              <a:rPr lang="en-US" dirty="0"/>
-              <a:t>Unsupervised learning</a:t>
-            </a:r>
-          </a:p>
-          <a:p>
-            <a:r>
-              <a:rPr lang="en-US" dirty="0"/>
-              <a:t>Why the hype today?</a:t>
-            </a:r>
-          </a:p>
-          <a:p>
-            <a:pPr lvl="1"/>
-            <a:endParaRPr lang="en-US" dirty="0"/>
-          </a:p>
-          <a:p>
-            <a:r>
-              <a:rPr lang="en-US" dirty="0"/>
-              <a:t>Some slides from:</a:t>
-            </a:r>
-          </a:p>
-          <a:p>
-            <a:pPr lvl="1"/>
-            <a:r>
-              <a:rPr lang="en-US" dirty="0"/>
-              <a:t>A. Zisserman, “Machine Learning Introduction”</a:t>
-            </a:r>
-          </a:p>
-          <a:p>
-            <a:pPr lvl="1"/>
-            <a:r>
-              <a:rPr lang="en-US" dirty="0"/>
+              <a:rPr lang="tr-TR" dirty="0">
+                <a:solidFill>
+                  <a:schemeClr val="accent1"/>
+                </a:solidFill>
+              </a:rPr>
+              <a:t>Retail:</a:t>
+            </a:r>
+            <a:r>
+              <a:rPr lang="tr-TR" dirty="0"/>
               <a:t> </a:t>
             </a:r>
             <a:r>
-              <a:rPr lang="en-US" dirty="0" err="1"/>
-              <a:t>Alpaydin</a:t>
-            </a:r>
-            <a:r>
-              <a:rPr lang="en-US" dirty="0"/>
-              <a:t>, “Introduction to Machine Learning”</a:t>
-            </a:r>
-          </a:p>
-          <a:p>
-            <a:pPr lvl="1"/>
+              <a:rPr lang="tr-TR" dirty="0">
+                <a:solidFill>
+                  <a:schemeClr val="tx2"/>
+                </a:solidFill>
+              </a:rPr>
+              <a:t>Market basket analysis, Customer relationship management (CRM)</a:t>
+            </a:r>
+          </a:p>
+          <a:p>
+            <a:r>
+              <a:rPr lang="tr-TR" dirty="0">
+                <a:solidFill>
+                  <a:schemeClr val="accent1"/>
+                </a:solidFill>
+              </a:rPr>
+              <a:t>Finance:</a:t>
+            </a:r>
+            <a:r>
+              <a:rPr lang="tr-TR" dirty="0"/>
+              <a:t> Credit scoring, fraud detection</a:t>
+            </a:r>
+          </a:p>
+          <a:p>
+            <a:r>
+              <a:rPr lang="tr-TR" dirty="0">
+                <a:solidFill>
+                  <a:schemeClr val="accent1"/>
+                </a:solidFill>
+              </a:rPr>
+              <a:t>Manufacturing: </a:t>
+            </a:r>
+            <a:r>
+              <a:rPr lang="tr-TR" dirty="0"/>
+              <a:t>Control, robotics, troubleshooting</a:t>
+            </a:r>
+          </a:p>
+          <a:p>
+            <a:r>
+              <a:rPr lang="tr-TR" dirty="0">
+                <a:solidFill>
+                  <a:schemeClr val="accent1"/>
+                </a:solidFill>
+              </a:rPr>
+              <a:t>Medicine: </a:t>
+            </a:r>
+            <a:r>
+              <a:rPr lang="tr-TR" dirty="0"/>
+              <a:t>Medical diagnosis</a:t>
+            </a:r>
+          </a:p>
+          <a:p>
+            <a:r>
+              <a:rPr lang="tr-TR" dirty="0">
+                <a:solidFill>
+                  <a:schemeClr val="accent1"/>
+                </a:solidFill>
+              </a:rPr>
+              <a:t>Telecommunications:</a:t>
+            </a:r>
+            <a:r>
+              <a:rPr lang="tr-TR" dirty="0"/>
+              <a:t> Spam filters, intrusion detection</a:t>
+            </a:r>
+          </a:p>
+          <a:p>
+            <a:r>
+              <a:rPr lang="tr-TR" dirty="0">
+                <a:solidFill>
+                  <a:schemeClr val="accent1"/>
+                </a:solidFill>
+              </a:rPr>
+              <a:t>Bioinformatics: </a:t>
+            </a:r>
+            <a:r>
+              <a:rPr lang="tr-TR" dirty="0"/>
+              <a:t>Motifs, alignment</a:t>
+            </a:r>
+          </a:p>
+          <a:p>
+            <a:r>
+              <a:rPr lang="tr-TR" dirty="0">
+                <a:solidFill>
+                  <a:schemeClr val="accent1"/>
+                </a:solidFill>
+              </a:rPr>
+              <a:t>Web mining: </a:t>
+            </a:r>
+            <a:r>
+              <a:rPr lang="tr-TR" dirty="0"/>
+              <a:t>Search engines</a:t>
+            </a:r>
+          </a:p>
+          <a:p>
+            <a:r>
+              <a:rPr lang="tr-TR" dirty="0"/>
+              <a:t>...</a:t>
+            </a:r>
             <a:endParaRPr lang="en-US" dirty="0"/>
           </a:p>
         </p:txBody>
@@ -4903,6 +5002,172 @@
             <a:fld id="{629637A9-119A-49DA-BD12-AAC58B377D80}" type="slidenum">
               <a:rPr lang="en-US" smtClean="0"/>
               <a:t>13</a:t>
+            </a:fld>
+            <a:endParaRPr lang="en-US" dirty="0"/>
+          </a:p>
+        </p:txBody>
+      </p:sp>
+    </p:spTree>
+    <p:extLst>
+      <p:ext uri="{BB962C8B-B14F-4D97-AF65-F5344CB8AC3E}">
+        <p14:creationId xmlns:p14="http://schemas.microsoft.com/office/powerpoint/2010/main" val="3172369853"/>
+      </p:ext>
+    </p:extLst>
+  </p:cSld>
+  <p:clrMapOvr>
+    <a:masterClrMapping/>
+  </p:clrMapOvr>
+</p:sld>
+</file>
+
+<file path=ppt/slides/slide14.xml><?xml version="1.0" encoding="utf-8"?>
+<p:sld xmlns:a="http://schemas.openxmlformats.org/drawingml/2006/main" xmlns:r="http://schemas.openxmlformats.org/officeDocument/2006/relationships" xmlns:p="http://schemas.openxmlformats.org/presentationml/2006/main">
+  <p:cSld>
+    <p:spTree>
+      <p:nvGrpSpPr>
+        <p:cNvPr id="1" name=""/>
+        <p:cNvGrpSpPr/>
+        <p:nvPr/>
+      </p:nvGrpSpPr>
+      <p:grpSpPr>
+        <a:xfrm>
+          <a:off x="0" y="0"/>
+          <a:ext cx="0" cy="0"/>
+          <a:chOff x="0" y="0"/>
+          <a:chExt cx="0" cy="0"/>
+        </a:xfrm>
+      </p:grpSpPr>
+      <p:sp>
+        <p:nvSpPr>
+          <p:cNvPr id="2" name="Title 1"/>
+          <p:cNvSpPr>
+            <a:spLocks noGrp="1"/>
+          </p:cNvSpPr>
+          <p:nvPr>
+            <p:ph type="title"/>
+          </p:nvPr>
+        </p:nvSpPr>
+        <p:spPr/>
+        <p:txBody>
+          <a:bodyPr/>
+          <a:lstStyle/>
+          <a:p>
+            <a:r>
+              <a:rPr lang="en-US" dirty="0"/>
+              <a:t>Outline</a:t>
+            </a:r>
+          </a:p>
+        </p:txBody>
+      </p:sp>
+      <p:sp>
+        <p:nvSpPr>
+          <p:cNvPr id="3" name="Content Placeholder 2"/>
+          <p:cNvSpPr>
+            <a:spLocks noGrp="1"/>
+          </p:cNvSpPr>
+          <p:nvPr>
+            <p:ph idx="1"/>
+          </p:nvPr>
+        </p:nvSpPr>
+        <p:spPr/>
+        <p:txBody>
+          <a:bodyPr/>
+          <a:lstStyle/>
+          <a:p>
+            <a:r>
+              <a:rPr lang="en-US" dirty="0"/>
+              <a:t>What is Machine Learning?</a:t>
+            </a:r>
+          </a:p>
+          <a:p>
+            <a:r>
+              <a:rPr lang="en-US" dirty="0"/>
+              <a:t>Types of machine learning algorithms</a:t>
+            </a:r>
+          </a:p>
+          <a:p>
+            <a:pPr lvl="1"/>
+            <a:r>
+              <a:rPr lang="en-US" dirty="0"/>
+              <a:t>Classification</a:t>
+            </a:r>
+          </a:p>
+          <a:p>
+            <a:pPr lvl="1"/>
+            <a:r>
+              <a:rPr lang="en-US" dirty="0"/>
+              <a:t>Regression</a:t>
+            </a:r>
+          </a:p>
+          <a:p>
+            <a:pPr lvl="1"/>
+            <a:r>
+              <a:rPr lang="en-US" dirty="0"/>
+              <a:t>Unsupervised learning</a:t>
+            </a:r>
+          </a:p>
+          <a:p>
+            <a:r>
+              <a:rPr lang="en-US" dirty="0"/>
+              <a:t>Why the hype today?</a:t>
+            </a:r>
+          </a:p>
+          <a:p>
+            <a:pPr lvl="1"/>
+            <a:endParaRPr lang="en-US" dirty="0"/>
+          </a:p>
+          <a:p>
+            <a:r>
+              <a:rPr lang="en-US" dirty="0"/>
+              <a:t>Some slides from:</a:t>
+            </a:r>
+          </a:p>
+          <a:p>
+            <a:pPr lvl="1"/>
+            <a:r>
+              <a:rPr lang="en-US" dirty="0"/>
+              <a:t>A. Zisserman, “Machine Learning Introduction”</a:t>
+            </a:r>
+          </a:p>
+          <a:p>
+            <a:pPr lvl="1"/>
+            <a:r>
+              <a:rPr lang="en-US" dirty="0"/>
+              <a:t> </a:t>
+            </a:r>
+            <a:r>
+              <a:rPr lang="en-US" dirty="0" err="1"/>
+              <a:t>Alpaydin</a:t>
+            </a:r>
+            <a:r>
+              <a:rPr lang="en-US" dirty="0"/>
+              <a:t>, “Introduction to Machine Learning”</a:t>
+            </a:r>
+          </a:p>
+          <a:p>
+            <a:pPr lvl="1"/>
+            <a:endParaRPr lang="en-US" dirty="0"/>
+          </a:p>
+        </p:txBody>
+      </p:sp>
+      <p:sp>
+        <p:nvSpPr>
+          <p:cNvPr id="4" name="Slide Number Placeholder 3"/>
+          <p:cNvSpPr>
+            <a:spLocks noGrp="1"/>
+          </p:cNvSpPr>
+          <p:nvPr>
+            <p:ph type="sldNum" sz="quarter" idx="12"/>
+          </p:nvPr>
+        </p:nvSpPr>
+        <p:spPr/>
+        <p:txBody>
+          <a:bodyPr/>
+          <a:lstStyle/>
+          <a:p>
+            <a:fld id="{629637A9-119A-49DA-BD12-AAC58B377D80}" type="slidenum">
+              <a:rPr lang="en-US" smtClean="0"/>
+              <a:t>14</a:t>
             </a:fld>
             <a:endParaRPr lang="en-US" dirty="0"/>
           </a:p>
@@ -4967,7 +5232,7 @@
 </p:sld>
 </file>
 
-<file path=ppt/slides/slide14.xml><?xml version="1.0" encoding="utf-8"?>
+<file path=ppt/slides/slide15.xml><?xml version="1.0" encoding="utf-8"?>
 <p:sld xmlns:a="http://schemas.openxmlformats.org/drawingml/2006/main" xmlns:r="http://schemas.openxmlformats.org/officeDocument/2006/relationships" xmlns:p="http://schemas.openxmlformats.org/presentationml/2006/main">
   <p:cSld>
     <p:spTree>
@@ -5278,7 +5543,7 @@
           <a:p>
             <a:fld id="{629637A9-119A-49DA-BD12-AAC58B377D80}" type="slidenum">
               <a:rPr lang="en-US" smtClean="0"/>
-              <a:t>14</a:t>
+              <a:t>15</a:t>
             </a:fld>
             <a:endParaRPr lang="en-US" dirty="0"/>
           </a:p>
@@ -5322,7 +5587,7 @@
 </p:sld>
 </file>
 
-<file path=ppt/slides/slide15.xml><?xml version="1.0" encoding="utf-8"?>
+<file path=ppt/slides/slide16.xml><?xml version="1.0" encoding="utf-8"?>
 <p:sld xmlns:a="http://schemas.openxmlformats.org/drawingml/2006/main" xmlns:r="http://schemas.openxmlformats.org/officeDocument/2006/relationships" xmlns:p="http://schemas.openxmlformats.org/presentationml/2006/main">
   <p:cSld>
     <p:spTree>
@@ -5700,7 +5965,7 @@
           <a:p>
             <a:fld id="{629637A9-119A-49DA-BD12-AAC58B377D80}" type="slidenum">
               <a:rPr lang="en-US" smtClean="0"/>
-              <a:t>15</a:t>
+              <a:t>16</a:t>
             </a:fld>
             <a:endParaRPr lang="en-US" dirty="0"/>
           </a:p>
@@ -5744,7 +6009,7 @@
 </p:sld>
 </file>
 
-<file path=ppt/slides/slide16.xml><?xml version="1.0" encoding="utf-8"?>
+<file path=ppt/slides/slide17.xml><?xml version="1.0" encoding="utf-8"?>
 <p:sld xmlns:a="http://schemas.openxmlformats.org/drawingml/2006/main" xmlns:r="http://schemas.openxmlformats.org/officeDocument/2006/relationships" xmlns:p="http://schemas.openxmlformats.org/presentationml/2006/main">
   <p:cSld>
     <p:spTree>
@@ -5884,7 +6149,7 @@
           <a:p>
             <a:fld id="{629637A9-119A-49DA-BD12-AAC58B377D80}" type="slidenum">
               <a:rPr lang="en-US" smtClean="0"/>
-              <a:t>16</a:t>
+              <a:t>17</a:t>
             </a:fld>
             <a:endParaRPr lang="en-US" dirty="0"/>
           </a:p>
@@ -5951,7 +6216,7 @@
 </p:sld>
 </file>
 
-<file path=ppt/slides/slide17.xml><?xml version="1.0" encoding="utf-8"?>
+<file path=ppt/slides/slide18.xml><?xml version="1.0" encoding="utf-8"?>
 <p:sld xmlns:a="http://schemas.openxmlformats.org/drawingml/2006/main" xmlns:r="http://schemas.openxmlformats.org/officeDocument/2006/relationships" xmlns:p="http://schemas.openxmlformats.org/presentationml/2006/main">
   <p:cSld>
     <p:spTree>
@@ -6071,7 +6336,7 @@
           <a:p>
             <a:fld id="{629637A9-119A-49DA-BD12-AAC58B377D80}" type="slidenum">
               <a:rPr lang="en-US" smtClean="0"/>
-              <a:t>17</a:t>
+              <a:t>18</a:t>
             </a:fld>
             <a:endParaRPr lang="en-US" dirty="0"/>
           </a:p>
@@ -6182,7 +6447,7 @@
 </p:sld>
 </file>
 
-<file path=ppt/slides/slide18.xml><?xml version="1.0" encoding="utf-8"?>
+<file path=ppt/slides/slide19.xml><?xml version="1.0" encoding="utf-8"?>
 <p:sld xmlns:a="http://schemas.openxmlformats.org/drawingml/2006/main" xmlns:r="http://schemas.openxmlformats.org/officeDocument/2006/relationships" xmlns:p="http://schemas.openxmlformats.org/presentationml/2006/main">
   <p:cSld>
     <p:spTree>
@@ -6329,7 +6594,7 @@
           <a:p>
             <a:fld id="{629637A9-119A-49DA-BD12-AAC58B377D80}" type="slidenum">
               <a:rPr lang="en-US" smtClean="0"/>
-              <a:t>18</a:t>
+              <a:t>19</a:t>
             </a:fld>
             <a:endParaRPr lang="en-US" dirty="0"/>
           </a:p>
@@ -6394,7 +6659,7 @@
 </p:sld>
 </file>
 
-<file path=ppt/slides/slide19.xml><?xml version="1.0" encoding="utf-8"?>
+<file path=ppt/slides/slide2.xml><?xml version="1.0" encoding="utf-8"?>
 <p:sld xmlns:a="http://schemas.openxmlformats.org/drawingml/2006/main" xmlns:r="http://schemas.openxmlformats.org/officeDocument/2006/relationships" xmlns:p="http://schemas.openxmlformats.org/presentationml/2006/main">
   <p:cSld>
     <p:spTree>
@@ -6413,6 +6678,155 @@
       </p:grpSpPr>
       <p:sp>
         <p:nvSpPr>
+          <p:cNvPr id="2" name="Title 1"/>
+          <p:cNvSpPr>
+            <a:spLocks noGrp="1"/>
+          </p:cNvSpPr>
+          <p:nvPr>
+            <p:ph type="title"/>
+          </p:nvPr>
+        </p:nvSpPr>
+        <p:spPr/>
+        <p:txBody>
+          <a:bodyPr/>
+          <a:lstStyle/>
+          <a:p>
+            <a:r>
+              <a:rPr lang="en-US" dirty="0"/>
+              <a:t>Learning Objectives</a:t>
+            </a:r>
+          </a:p>
+        </p:txBody>
+      </p:sp>
+      <p:sp>
+        <p:nvSpPr>
+          <p:cNvPr id="3" name="Content Placeholder 2"/>
+          <p:cNvSpPr>
+            <a:spLocks noGrp="1"/>
+          </p:cNvSpPr>
+          <p:nvPr>
+            <p:ph idx="1"/>
+          </p:nvPr>
+        </p:nvSpPr>
+        <p:spPr/>
+        <p:txBody>
+          <a:bodyPr/>
+          <a:lstStyle/>
+          <a:p>
+            <a:r>
+              <a:rPr lang="en-US" dirty="0"/>
+              <a:t>Provide examples of machine learning used today</a:t>
+            </a:r>
+          </a:p>
+          <a:p>
+            <a:r>
+              <a:rPr lang="en-US" dirty="0"/>
+              <a:t>Given a new problem, qualitatively describe how machine learning can be used</a:t>
+            </a:r>
+          </a:p>
+          <a:p>
+            <a:pPr lvl="1"/>
+            <a:r>
+              <a:rPr lang="en-US" dirty="0"/>
+              <a:t>Formulate a potential machine learning task</a:t>
+            </a:r>
+          </a:p>
+          <a:p>
+            <a:pPr lvl="1"/>
+            <a:r>
+              <a:rPr lang="en-US" dirty="0"/>
+              <a:t>Identify the data needed for the task</a:t>
+            </a:r>
+          </a:p>
+          <a:p>
+            <a:pPr lvl="1"/>
+            <a:r>
+              <a:rPr lang="en-US" dirty="0"/>
+              <a:t>Identify objectives</a:t>
+            </a:r>
+          </a:p>
+          <a:p>
+            <a:r>
+              <a:rPr lang="en-US" dirty="0"/>
+              <a:t>Classify a machine learning task:</a:t>
+            </a:r>
+          </a:p>
+          <a:p>
+            <a:pPr lvl="1"/>
+            <a:r>
+              <a:rPr lang="en-US" dirty="0"/>
+              <a:t>Supervised vs. unsupervised, regression vs. classification</a:t>
+            </a:r>
+          </a:p>
+          <a:p>
+            <a:r>
+              <a:rPr lang="en-US" dirty="0"/>
+              <a:t>For supervised learning, identify the predictors and target variables</a:t>
+            </a:r>
+          </a:p>
+          <a:p>
+            <a:r>
+              <a:rPr lang="en-US" dirty="0"/>
+              <a:t>Determine the role of expert knowledge in the task vs. data-driven learning</a:t>
+            </a:r>
+          </a:p>
+        </p:txBody>
+      </p:sp>
+      <p:sp>
+        <p:nvSpPr>
+          <p:cNvPr id="4" name="Slide Number Placeholder 3"/>
+          <p:cNvSpPr>
+            <a:spLocks noGrp="1"/>
+          </p:cNvSpPr>
+          <p:nvPr>
+            <p:ph type="sldNum" sz="quarter" idx="12"/>
+          </p:nvPr>
+        </p:nvSpPr>
+        <p:spPr/>
+        <p:txBody>
+          <a:bodyPr/>
+          <a:lstStyle/>
+          <a:p>
+            <a:fld id="{629637A9-119A-49DA-BD12-AAC58B377D80}" type="slidenum">
+              <a:rPr lang="en-US" smtClean="0"/>
+              <a:t>2</a:t>
+            </a:fld>
+            <a:endParaRPr lang="en-US" dirty="0"/>
+          </a:p>
+        </p:txBody>
+      </p:sp>
+    </p:spTree>
+    <p:extLst>
+      <p:ext uri="{BB962C8B-B14F-4D97-AF65-F5344CB8AC3E}">
+        <p14:creationId xmlns:p14="http://schemas.microsoft.com/office/powerpoint/2010/main" val="1998553143"/>
+      </p:ext>
+    </p:extLst>
+  </p:cSld>
+  <p:clrMapOvr>
+    <a:masterClrMapping/>
+  </p:clrMapOvr>
+</p:sld>
+</file>
+
+<file path=ppt/slides/slide20.xml><?xml version="1.0" encoding="utf-8"?>
+<p:sld xmlns:a="http://schemas.openxmlformats.org/drawingml/2006/main" xmlns:r="http://schemas.openxmlformats.org/officeDocument/2006/relationships" xmlns:p="http://schemas.openxmlformats.org/presentationml/2006/main">
+  <p:cSld>
+    <p:spTree>
+      <p:nvGrpSpPr>
+        <p:cNvPr id="1" name=""/>
+        <p:cNvGrpSpPr/>
+        <p:nvPr/>
+      </p:nvGrpSpPr>
+      <p:grpSpPr>
+        <a:xfrm>
+          <a:off x="0" y="0"/>
+          <a:ext cx="0" cy="0"/>
+          <a:chOff x="0" y="0"/>
+          <a:chExt cx="0" cy="0"/>
+        </a:xfrm>
+      </p:grpSpPr>
+      <p:sp>
+        <p:nvSpPr>
           <p:cNvPr id="2" name="Title 1">
             <a:extLst>
               <a:ext uri="{FF2B5EF4-FFF2-40B4-BE49-F238E27FC236}">
@@ -6520,7 +6934,7 @@
           <a:p>
             <a:fld id="{629637A9-119A-49DA-BD12-AAC58B377D80}" type="slidenum">
               <a:rPr lang="en-US" smtClean="0"/>
-              <a:t>19</a:t>
+              <a:t>20</a:t>
             </a:fld>
             <a:endParaRPr lang="en-US" dirty="0"/>
           </a:p>
@@ -6659,7 +7073,7 @@
 </p:sld>
 </file>
 
-<file path=ppt/slides/slide2.xml><?xml version="1.0" encoding="utf-8"?>
+<file path=ppt/slides/slide21.xml><?xml version="1.0" encoding="utf-8"?>
 <p:sld xmlns:a="http://schemas.openxmlformats.org/drawingml/2006/main" xmlns:r="http://schemas.openxmlformats.org/officeDocument/2006/relationships" xmlns:p="http://schemas.openxmlformats.org/presentationml/2006/main">
   <p:cSld>
     <p:spTree>
@@ -6678,155 +7092,6 @@
       </p:grpSpPr>
       <p:sp>
         <p:nvSpPr>
-          <p:cNvPr id="2" name="Title 1"/>
-          <p:cNvSpPr>
-            <a:spLocks noGrp="1"/>
-          </p:cNvSpPr>
-          <p:nvPr>
-            <p:ph type="title"/>
-          </p:nvPr>
-        </p:nvSpPr>
-        <p:spPr/>
-        <p:txBody>
-          <a:bodyPr/>
-          <a:lstStyle/>
-          <a:p>
-            <a:r>
-              <a:rPr lang="en-US" dirty="0"/>
-              <a:t>Learning Objectives</a:t>
-            </a:r>
-          </a:p>
-        </p:txBody>
-      </p:sp>
-      <p:sp>
-        <p:nvSpPr>
-          <p:cNvPr id="3" name="Content Placeholder 2"/>
-          <p:cNvSpPr>
-            <a:spLocks noGrp="1"/>
-          </p:cNvSpPr>
-          <p:nvPr>
-            <p:ph idx="1"/>
-          </p:nvPr>
-        </p:nvSpPr>
-        <p:spPr/>
-        <p:txBody>
-          <a:bodyPr/>
-          <a:lstStyle/>
-          <a:p>
-            <a:r>
-              <a:rPr lang="en-US" dirty="0"/>
-              <a:t>Provide examples of machine learning used today</a:t>
-            </a:r>
-          </a:p>
-          <a:p>
-            <a:r>
-              <a:rPr lang="en-US" dirty="0"/>
-              <a:t>Given a new problem, qualitatively describe how machine learning can be used</a:t>
-            </a:r>
-          </a:p>
-          <a:p>
-            <a:pPr lvl="1"/>
-            <a:r>
-              <a:rPr lang="en-US" dirty="0"/>
-              <a:t>Formulate a potential machine learning task</a:t>
-            </a:r>
-          </a:p>
-          <a:p>
-            <a:pPr lvl="1"/>
-            <a:r>
-              <a:rPr lang="en-US" dirty="0"/>
-              <a:t>Identify the data needed for the task</a:t>
-            </a:r>
-          </a:p>
-          <a:p>
-            <a:pPr lvl="1"/>
-            <a:r>
-              <a:rPr lang="en-US" dirty="0"/>
-              <a:t>Identify objectives</a:t>
-            </a:r>
-          </a:p>
-          <a:p>
-            <a:r>
-              <a:rPr lang="en-US" dirty="0"/>
-              <a:t>Classify a machine learning task:</a:t>
-            </a:r>
-          </a:p>
-          <a:p>
-            <a:pPr lvl="1"/>
-            <a:r>
-              <a:rPr lang="en-US" dirty="0"/>
-              <a:t>Supervised vs. unsupervised, regression vs. classification</a:t>
-            </a:r>
-          </a:p>
-          <a:p>
-            <a:r>
-              <a:rPr lang="en-US" dirty="0"/>
-              <a:t>For supervised learning, identify the predictors and target variables</a:t>
-            </a:r>
-          </a:p>
-          <a:p>
-            <a:r>
-              <a:rPr lang="en-US" dirty="0"/>
-              <a:t>Determine the role of expert knowledge in the task vs. data-driven learning</a:t>
-            </a:r>
-          </a:p>
-        </p:txBody>
-      </p:sp>
-      <p:sp>
-        <p:nvSpPr>
-          <p:cNvPr id="4" name="Slide Number Placeholder 3"/>
-          <p:cNvSpPr>
-            <a:spLocks noGrp="1"/>
-          </p:cNvSpPr>
-          <p:nvPr>
-            <p:ph type="sldNum" sz="quarter" idx="12"/>
-          </p:nvPr>
-        </p:nvSpPr>
-        <p:spPr/>
-        <p:txBody>
-          <a:bodyPr/>
-          <a:lstStyle/>
-          <a:p>
-            <a:fld id="{629637A9-119A-49DA-BD12-AAC58B377D80}" type="slidenum">
-              <a:rPr lang="en-US" smtClean="0"/>
-              <a:t>2</a:t>
-            </a:fld>
-            <a:endParaRPr lang="en-US" dirty="0"/>
-          </a:p>
-        </p:txBody>
-      </p:sp>
-    </p:spTree>
-    <p:extLst>
-      <p:ext uri="{BB962C8B-B14F-4D97-AF65-F5344CB8AC3E}">
-        <p14:creationId xmlns:p14="http://schemas.microsoft.com/office/powerpoint/2010/main" val="1998553143"/>
-      </p:ext>
-    </p:extLst>
-  </p:cSld>
-  <p:clrMapOvr>
-    <a:masterClrMapping/>
-  </p:clrMapOvr>
-</p:sld>
-</file>
-
-<file path=ppt/slides/slide20.xml><?xml version="1.0" encoding="utf-8"?>
-<p:sld xmlns:a="http://schemas.openxmlformats.org/drawingml/2006/main" xmlns:r="http://schemas.openxmlformats.org/officeDocument/2006/relationships" xmlns:p="http://schemas.openxmlformats.org/presentationml/2006/main">
-  <p:cSld>
-    <p:spTree>
-      <p:nvGrpSpPr>
-        <p:cNvPr id="1" name=""/>
-        <p:cNvGrpSpPr/>
-        <p:nvPr/>
-      </p:nvGrpSpPr>
-      <p:grpSpPr>
-        <a:xfrm>
-          <a:off x="0" y="0"/>
-          <a:ext cx="0" cy="0"/>
-          <a:chOff x="0" y="0"/>
-          <a:chExt cx="0" cy="0"/>
-        </a:xfrm>
-      </p:grpSpPr>
-      <p:sp>
-        <p:nvSpPr>
           <p:cNvPr id="2" name="Title 1">
             <a:extLst>
               <a:ext uri="{FF2B5EF4-FFF2-40B4-BE49-F238E27FC236}">
@@ -6967,7 +7232,7 @@
           <a:p>
             <a:fld id="{629637A9-119A-49DA-BD12-AAC58B377D80}" type="slidenum">
               <a:rPr lang="en-US" smtClean="0"/>
-              <a:t>20</a:t>
+              <a:t>21</a:t>
             </a:fld>
             <a:endParaRPr lang="en-US" dirty="0"/>
           </a:p>
@@ -7081,149 +7346,6 @@
 </p:sld>
 </file>
 
-<file path=ppt/slides/slide21.xml><?xml version="1.0" encoding="utf-8"?>
-<p:sld xmlns:a="http://schemas.openxmlformats.org/drawingml/2006/main" xmlns:r="http://schemas.openxmlformats.org/officeDocument/2006/relationships" xmlns:p="http://schemas.openxmlformats.org/presentationml/2006/main">
-  <p:cSld>
-    <p:spTree>
-      <p:nvGrpSpPr>
-        <p:cNvPr id="1" name=""/>
-        <p:cNvGrpSpPr/>
-        <p:nvPr/>
-      </p:nvGrpSpPr>
-      <p:grpSpPr>
-        <a:xfrm>
-          <a:off x="0" y="0"/>
-          <a:ext cx="0" cy="0"/>
-          <a:chOff x="0" y="0"/>
-          <a:chExt cx="0" cy="0"/>
-        </a:xfrm>
-      </p:grpSpPr>
-      <p:sp>
-        <p:nvSpPr>
-          <p:cNvPr id="2" name="Title 1"/>
-          <p:cNvSpPr>
-            <a:spLocks noGrp="1"/>
-          </p:cNvSpPr>
-          <p:nvPr>
-            <p:ph type="title"/>
-          </p:nvPr>
-        </p:nvSpPr>
-        <p:spPr/>
-        <p:txBody>
-          <a:bodyPr/>
-          <a:lstStyle/>
-          <a:p>
-            <a:r>
-              <a:rPr lang="en-US" dirty="0"/>
-              <a:t>Top Journals</a:t>
-            </a:r>
-          </a:p>
-        </p:txBody>
-      </p:sp>
-      <p:sp>
-        <p:nvSpPr>
-          <p:cNvPr id="3" name="Content Placeholder 2"/>
-          <p:cNvSpPr>
-            <a:spLocks noGrp="1"/>
-          </p:cNvSpPr>
-          <p:nvPr>
-            <p:ph idx="1"/>
-          </p:nvPr>
-        </p:nvSpPr>
-        <p:spPr/>
-        <p:txBody>
-          <a:bodyPr/>
-          <a:lstStyle/>
-          <a:p>
-            <a:r>
-              <a:rPr lang="tr-TR" dirty="0"/>
-              <a:t>Journal of Machine Learning Research </a:t>
-            </a:r>
-            <a:r>
-              <a:rPr lang="tr-TR" dirty="0">
-                <a:hlinkClick r:id="rId2"/>
-              </a:rPr>
-              <a:t>www.jmlr.org</a:t>
-            </a:r>
-            <a:endParaRPr lang="tr-TR" dirty="0"/>
-          </a:p>
-          <a:p>
-            <a:r>
-              <a:rPr lang="tr-TR" dirty="0"/>
-              <a:t>Machine Learning </a:t>
-            </a:r>
-          </a:p>
-          <a:p>
-            <a:r>
-              <a:rPr lang="tr-TR" dirty="0"/>
-              <a:t>Neural Computation</a:t>
-            </a:r>
-          </a:p>
-          <a:p>
-            <a:r>
-              <a:rPr lang="tr-TR" dirty="0"/>
-              <a:t>Neural Networks</a:t>
-            </a:r>
-          </a:p>
-          <a:p>
-            <a:r>
-              <a:rPr lang="tr-TR" dirty="0"/>
-              <a:t>IEEE Trans on Neural Networks and Learning Systems</a:t>
-            </a:r>
-          </a:p>
-          <a:p>
-            <a:r>
-              <a:rPr lang="tr-TR" dirty="0"/>
-              <a:t>IEEE Trans on Pattern Analysis and Machine Intelligence</a:t>
-            </a:r>
-          </a:p>
-          <a:p>
-            <a:r>
-              <a:rPr lang="tr-TR" dirty="0"/>
-              <a:t>Journals on Statistics/Data Mining/Signal Processing/Natural Language Processing/Bioinformatics/...</a:t>
-            </a:r>
-          </a:p>
-          <a:p>
-            <a:endParaRPr lang="en-US" dirty="0"/>
-          </a:p>
-        </p:txBody>
-      </p:sp>
-      <p:sp>
-        <p:nvSpPr>
-          <p:cNvPr id="4" name="Slide Number Placeholder 3"/>
-          <p:cNvSpPr>
-            <a:spLocks noGrp="1"/>
-          </p:cNvSpPr>
-          <p:nvPr>
-            <p:ph type="sldNum" sz="quarter" idx="12"/>
-          </p:nvPr>
-        </p:nvSpPr>
-        <p:spPr/>
-        <p:txBody>
-          <a:bodyPr/>
-          <a:lstStyle/>
-          <a:p>
-            <a:fld id="{629637A9-119A-49DA-BD12-AAC58B377D80}" type="slidenum">
-              <a:rPr lang="en-US" smtClean="0"/>
-              <a:t>21</a:t>
-            </a:fld>
-            <a:endParaRPr lang="en-US" dirty="0"/>
-          </a:p>
-        </p:txBody>
-      </p:sp>
-    </p:spTree>
-    <p:extLst>
-      <p:ext uri="{BB962C8B-B14F-4D97-AF65-F5344CB8AC3E}">
-        <p14:creationId xmlns:p14="http://schemas.microsoft.com/office/powerpoint/2010/main" val="2662439910"/>
-      </p:ext>
-    </p:extLst>
-  </p:cSld>
-  <p:clrMapOvr>
-    <a:masterClrMapping/>
-  </p:clrMapOvr>
-</p:sld>
-</file>
-
 <file path=ppt/slides/slide22.xml><?xml version="1.0" encoding="utf-8"?>
 <p:sld xmlns:a="http://schemas.openxmlformats.org/drawingml/2006/main" xmlns:r="http://schemas.openxmlformats.org/officeDocument/2006/relationships" xmlns:p="http://schemas.openxmlformats.org/presentationml/2006/main">
   <p:cSld>
@@ -7258,7 +7380,7 @@
           <a:p>
             <a:r>
               <a:rPr lang="en-US" dirty="0"/>
-              <a:t>Top Conferences</a:t>
+              <a:t>Top Journals</a:t>
             </a:r>
           </a:p>
         </p:txBody>
@@ -7275,229 +7397,55 @@
         </p:nvSpPr>
         <p:spPr/>
         <p:txBody>
-          <a:bodyPr>
-            <a:normAutofit lnSpcReduction="10000"/>
-          </a:bodyPr>
+          <a:bodyPr/>
           <a:lstStyle/>
           <a:p>
-            <a:pPr>
-              <a:lnSpc>
-                <a:spcPct val="80000"/>
-              </a:lnSpc>
-            </a:pPr>
             <a:r>
               <a:rPr lang="tr-TR" dirty="0"/>
-              <a:t>International Conference on Machine Learning (ICML) </a:t>
-            </a:r>
-          </a:p>
-          <a:p>
-            <a:pPr>
-              <a:lnSpc>
-                <a:spcPct val="80000"/>
-              </a:lnSpc>
-            </a:pPr>
+              <a:t>Journal of Machine Learning Research </a:t>
+            </a:r>
+            <a:r>
+              <a:rPr lang="tr-TR" dirty="0">
+                <a:hlinkClick r:id="rId2"/>
+              </a:rPr>
+              <a:t>www.jmlr.org</a:t>
+            </a:r>
+            <a:endParaRPr lang="tr-TR" dirty="0"/>
+          </a:p>
+          <a:p>
             <a:r>
               <a:rPr lang="tr-TR" dirty="0"/>
-              <a:t>European Conference on Machine Learning (ECML)</a:t>
-            </a:r>
-          </a:p>
-          <a:p>
-            <a:pPr>
-              <a:lnSpc>
-                <a:spcPct val="80000"/>
-              </a:lnSpc>
-            </a:pPr>
+              <a:t>Machine Learning </a:t>
+            </a:r>
+          </a:p>
+          <a:p>
             <a:r>
               <a:rPr lang="tr-TR" dirty="0"/>
-              <a:t>Neural Information Processing Systems (NIPS)</a:t>
-            </a:r>
-          </a:p>
-          <a:p>
-            <a:pPr>
-              <a:lnSpc>
-                <a:spcPct val="80000"/>
-              </a:lnSpc>
-            </a:pPr>
+              <a:t>Neural Computation</a:t>
+            </a:r>
+          </a:p>
+          <a:p>
             <a:r>
               <a:rPr lang="tr-TR" dirty="0"/>
-              <a:t>Uncertainty in Artificial Intelligence (UAI)</a:t>
-            </a:r>
-          </a:p>
-          <a:p>
-            <a:pPr>
-              <a:lnSpc>
-                <a:spcPct val="80000"/>
-              </a:lnSpc>
-            </a:pPr>
+              <a:t>Neural Networks</a:t>
+            </a:r>
+          </a:p>
+          <a:p>
             <a:r>
               <a:rPr lang="tr-TR" dirty="0"/>
-              <a:t>Computational Learning Theory (COLT)</a:t>
-            </a:r>
-          </a:p>
-          <a:p>
-            <a:pPr>
-              <a:lnSpc>
-                <a:spcPct val="80000"/>
-              </a:lnSpc>
-            </a:pPr>
+              <a:t>IEEE Trans on Neural Networks and Learning Systems</a:t>
+            </a:r>
+          </a:p>
+          <a:p>
             <a:r>
               <a:rPr lang="tr-TR" dirty="0"/>
-              <a:t>International Conference on Artificial Neural Networks (ICANN) </a:t>
-            </a:r>
-          </a:p>
-          <a:p>
-            <a:pPr>
-              <a:lnSpc>
-                <a:spcPct val="80000"/>
-              </a:lnSpc>
-            </a:pPr>
+              <a:t>IEEE Trans on Pattern Analysis and Machine Intelligence</a:t>
+            </a:r>
+          </a:p>
+          <a:p>
             <a:r>
               <a:rPr lang="tr-TR" dirty="0"/>
-              <a:t>International Conference on AI &amp; Statistics (AISTATS)</a:t>
-            </a:r>
-          </a:p>
-          <a:p>
-            <a:pPr>
-              <a:lnSpc>
-                <a:spcPct val="80000"/>
-              </a:lnSpc>
-            </a:pPr>
-            <a:r>
-              <a:rPr lang="tr-TR" dirty="0"/>
-              <a:t>Knowledge </a:t>
-            </a:r>
-            <a:r>
-              <a:rPr lang="tr-TR" dirty="0" err="1"/>
-              <a:t>Discovery</a:t>
-            </a:r>
-            <a:r>
-              <a:rPr lang="tr-TR" dirty="0"/>
-              <a:t> </a:t>
-            </a:r>
-            <a:r>
-              <a:rPr lang="tr-TR" dirty="0" err="1"/>
-              <a:t>and</a:t>
-            </a:r>
-            <a:r>
-              <a:rPr lang="tr-TR" dirty="0"/>
-              <a:t> Data </a:t>
-            </a:r>
-            <a:r>
-              <a:rPr lang="tr-TR" dirty="0" err="1"/>
-              <a:t>Mining</a:t>
-            </a:r>
-            <a:r>
-              <a:rPr lang="tr-TR" dirty="0"/>
-              <a:t> (KDD)</a:t>
-            </a:r>
-          </a:p>
-          <a:p>
-            <a:pPr>
-              <a:lnSpc>
-                <a:spcPct val="80000"/>
-              </a:lnSpc>
-            </a:pPr>
-            <a:r>
-              <a:rPr lang="tr-TR" dirty="0"/>
-              <a:t>International Conference on </a:t>
-            </a:r>
-            <a:r>
-              <a:rPr lang="tr-TR" dirty="0" err="1"/>
-              <a:t>Computer</a:t>
-            </a:r>
-            <a:r>
-              <a:rPr lang="tr-TR" dirty="0"/>
-              <a:t> </a:t>
-            </a:r>
-            <a:r>
-              <a:rPr lang="tr-TR" dirty="0" err="1"/>
-              <a:t>Vision</a:t>
-            </a:r>
-            <a:r>
-              <a:rPr lang="tr-TR" dirty="0"/>
-              <a:t> </a:t>
-            </a:r>
-            <a:r>
-              <a:rPr lang="tr-TR" dirty="0" err="1"/>
-              <a:t>and</a:t>
-            </a:r>
-            <a:r>
-              <a:rPr lang="tr-TR" dirty="0"/>
-              <a:t> </a:t>
-            </a:r>
-            <a:r>
-              <a:rPr lang="tr-TR" dirty="0" err="1"/>
-              <a:t>Pattern</a:t>
-            </a:r>
-            <a:r>
-              <a:rPr lang="tr-TR" dirty="0"/>
-              <a:t> </a:t>
-            </a:r>
-            <a:r>
-              <a:rPr lang="tr-TR" dirty="0" err="1"/>
-              <a:t>Recognition</a:t>
-            </a:r>
-            <a:r>
-              <a:rPr lang="tr-TR" dirty="0"/>
-              <a:t> (CVPR)</a:t>
-            </a:r>
-          </a:p>
-          <a:p>
-            <a:pPr>
-              <a:lnSpc>
-                <a:spcPct val="80000"/>
-              </a:lnSpc>
-            </a:pPr>
-            <a:r>
-              <a:rPr lang="tr-TR" dirty="0"/>
-              <a:t>International Conference on </a:t>
-            </a:r>
-            <a:r>
-              <a:rPr lang="tr-TR" dirty="0" err="1"/>
-              <a:t>Computer</a:t>
-            </a:r>
-            <a:r>
-              <a:rPr lang="tr-TR" dirty="0"/>
-              <a:t> </a:t>
-            </a:r>
-            <a:r>
-              <a:rPr lang="tr-TR" dirty="0" err="1"/>
-              <a:t>Vision</a:t>
-            </a:r>
-            <a:r>
-              <a:rPr lang="tr-TR" dirty="0"/>
-              <a:t> (ICCV)</a:t>
-            </a:r>
-          </a:p>
-          <a:p>
-            <a:pPr>
-              <a:lnSpc>
-                <a:spcPct val="80000"/>
-              </a:lnSpc>
-            </a:pPr>
-            <a:r>
-              <a:rPr lang="tr-TR" dirty="0" err="1"/>
-              <a:t>European</a:t>
-            </a:r>
-            <a:r>
-              <a:rPr lang="tr-TR" dirty="0"/>
-              <a:t> Conference on </a:t>
-            </a:r>
-            <a:r>
-              <a:rPr lang="tr-TR" dirty="0" err="1"/>
-              <a:t>Computer</a:t>
-            </a:r>
-            <a:r>
-              <a:rPr lang="tr-TR" dirty="0"/>
-              <a:t> </a:t>
-            </a:r>
-            <a:r>
-              <a:rPr lang="tr-TR" dirty="0" err="1"/>
-              <a:t>Vision</a:t>
-            </a:r>
-            <a:r>
-              <a:rPr lang="tr-TR" dirty="0"/>
-              <a:t> (ECCV)</a:t>
+              <a:t>Journals on Statistics/Data Mining/Signal Processing/Natural Language Processing/Bioinformatics/...</a:t>
             </a:r>
           </a:p>
           <a:p>
@@ -7531,7 +7479,7 @@
     </p:spTree>
     <p:extLst>
       <p:ext uri="{BB962C8B-B14F-4D97-AF65-F5344CB8AC3E}">
-        <p14:creationId xmlns:p14="http://schemas.microsoft.com/office/powerpoint/2010/main" val="3506267765"/>
+        <p14:creationId xmlns:p14="http://schemas.microsoft.com/office/powerpoint/2010/main" val="2662439910"/>
       </p:ext>
     </p:extLst>
   </p:cSld>
@@ -7575,7 +7523,7 @@
           <a:p>
             <a:r>
               <a:rPr lang="en-US" dirty="0"/>
-              <a:t>Exercise</a:t>
+              <a:t>Top Conferences</a:t>
             </a:r>
           </a:p>
         </p:txBody>
@@ -7592,59 +7540,229 @@
         </p:nvSpPr>
         <p:spPr/>
         <p:txBody>
-          <a:bodyPr/>
+          <a:bodyPr>
+            <a:normAutofit lnSpcReduction="10000"/>
+          </a:bodyPr>
           <a:lstStyle/>
           <a:p>
-            <a:r>
-              <a:rPr lang="en-US" dirty="0"/>
-              <a:t>Break into small groups</a:t>
-            </a:r>
-          </a:p>
-          <a:p>
-            <a:r>
-              <a:rPr lang="en-US" dirty="0"/>
-              <a:t>Take a field that interests you:</a:t>
-            </a:r>
-          </a:p>
-          <a:p>
-            <a:pPr lvl="1"/>
-            <a:r>
-              <a:rPr lang="en-US" dirty="0"/>
-              <a:t>Ex.  Driving a car, understanding social networks, finding a good date, recommend a movie to watch, …</a:t>
-            </a:r>
-          </a:p>
-          <a:p>
-            <a:r>
-              <a:rPr lang="en-US" dirty="0"/>
-              <a:t>Identify a specific task that can be done with machine learning</a:t>
-            </a:r>
-          </a:p>
-          <a:p>
-            <a:pPr lvl="1"/>
-            <a:r>
-              <a:rPr lang="en-US" dirty="0"/>
-              <a:t>What is the objective of the task?</a:t>
-            </a:r>
-          </a:p>
-          <a:p>
-            <a:pPr lvl="1"/>
-            <a:r>
-              <a:rPr lang="en-US" dirty="0"/>
-              <a:t>What is the data you need?</a:t>
-            </a:r>
-          </a:p>
-          <a:p>
-            <a:pPr lvl="1"/>
-            <a:r>
-              <a:rPr lang="en-US" dirty="0"/>
-              <a:t>What type of ML problem is this?  Classification, regression, …</a:t>
-            </a:r>
-          </a:p>
-          <a:p>
-            <a:pPr lvl="1"/>
-            <a:r>
-              <a:rPr lang="en-US" dirty="0"/>
-              <a:t>How would your approach compare to an expert-driven method?</a:t>
+            <a:pPr>
+              <a:lnSpc>
+                <a:spcPct val="80000"/>
+              </a:lnSpc>
+            </a:pPr>
+            <a:r>
+              <a:rPr lang="tr-TR" dirty="0"/>
+              <a:t>International Conference on Machine Learning (ICML) </a:t>
+            </a:r>
+          </a:p>
+          <a:p>
+            <a:pPr>
+              <a:lnSpc>
+                <a:spcPct val="80000"/>
+              </a:lnSpc>
+            </a:pPr>
+            <a:r>
+              <a:rPr lang="tr-TR" dirty="0"/>
+              <a:t>European Conference on Machine Learning (ECML)</a:t>
+            </a:r>
+          </a:p>
+          <a:p>
+            <a:pPr>
+              <a:lnSpc>
+                <a:spcPct val="80000"/>
+              </a:lnSpc>
+            </a:pPr>
+            <a:r>
+              <a:rPr lang="tr-TR" dirty="0"/>
+              <a:t>Neural Information Processing Systems (NIPS)</a:t>
+            </a:r>
+          </a:p>
+          <a:p>
+            <a:pPr>
+              <a:lnSpc>
+                <a:spcPct val="80000"/>
+              </a:lnSpc>
+            </a:pPr>
+            <a:r>
+              <a:rPr lang="tr-TR" dirty="0"/>
+              <a:t>Uncertainty in Artificial Intelligence (UAI)</a:t>
+            </a:r>
+          </a:p>
+          <a:p>
+            <a:pPr>
+              <a:lnSpc>
+                <a:spcPct val="80000"/>
+              </a:lnSpc>
+            </a:pPr>
+            <a:r>
+              <a:rPr lang="tr-TR" dirty="0"/>
+              <a:t>Computational Learning Theory (COLT)</a:t>
+            </a:r>
+          </a:p>
+          <a:p>
+            <a:pPr>
+              <a:lnSpc>
+                <a:spcPct val="80000"/>
+              </a:lnSpc>
+            </a:pPr>
+            <a:r>
+              <a:rPr lang="tr-TR" dirty="0"/>
+              <a:t>International Conference on Artificial Neural Networks (ICANN) </a:t>
+            </a:r>
+          </a:p>
+          <a:p>
+            <a:pPr>
+              <a:lnSpc>
+                <a:spcPct val="80000"/>
+              </a:lnSpc>
+            </a:pPr>
+            <a:r>
+              <a:rPr lang="tr-TR" dirty="0"/>
+              <a:t>International Conference on AI &amp; Statistics (AISTATS)</a:t>
+            </a:r>
+          </a:p>
+          <a:p>
+            <a:pPr>
+              <a:lnSpc>
+                <a:spcPct val="80000"/>
+              </a:lnSpc>
+            </a:pPr>
+            <a:r>
+              <a:rPr lang="tr-TR" dirty="0"/>
+              <a:t>Knowledge </a:t>
+            </a:r>
+            <a:r>
+              <a:rPr lang="tr-TR" dirty="0" err="1"/>
+              <a:t>Discovery</a:t>
+            </a:r>
+            <a:r>
+              <a:rPr lang="tr-TR" dirty="0"/>
+              <a:t> </a:t>
+            </a:r>
+            <a:r>
+              <a:rPr lang="tr-TR" dirty="0" err="1"/>
+              <a:t>and</a:t>
+            </a:r>
+            <a:r>
+              <a:rPr lang="tr-TR" dirty="0"/>
+              <a:t> Data </a:t>
+            </a:r>
+            <a:r>
+              <a:rPr lang="tr-TR" dirty="0" err="1"/>
+              <a:t>Mining</a:t>
+            </a:r>
+            <a:r>
+              <a:rPr lang="tr-TR" dirty="0"/>
+              <a:t> (KDD)</a:t>
+            </a:r>
+          </a:p>
+          <a:p>
+            <a:pPr>
+              <a:lnSpc>
+                <a:spcPct val="80000"/>
+              </a:lnSpc>
+            </a:pPr>
+            <a:r>
+              <a:rPr lang="tr-TR" dirty="0"/>
+              <a:t>International Conference on </a:t>
+            </a:r>
+            <a:r>
+              <a:rPr lang="tr-TR" dirty="0" err="1"/>
+              <a:t>Computer</a:t>
+            </a:r>
+            <a:r>
+              <a:rPr lang="tr-TR" dirty="0"/>
+              <a:t> </a:t>
+            </a:r>
+            <a:r>
+              <a:rPr lang="tr-TR" dirty="0" err="1"/>
+              <a:t>Vision</a:t>
+            </a:r>
+            <a:r>
+              <a:rPr lang="tr-TR" dirty="0"/>
+              <a:t> </a:t>
+            </a:r>
+            <a:r>
+              <a:rPr lang="tr-TR" dirty="0" err="1"/>
+              <a:t>and</a:t>
+            </a:r>
+            <a:r>
+              <a:rPr lang="tr-TR" dirty="0"/>
+              <a:t> </a:t>
+            </a:r>
+            <a:r>
+              <a:rPr lang="tr-TR" dirty="0" err="1"/>
+              <a:t>Pattern</a:t>
+            </a:r>
+            <a:r>
+              <a:rPr lang="tr-TR" dirty="0"/>
+              <a:t> </a:t>
+            </a:r>
+            <a:r>
+              <a:rPr lang="tr-TR" dirty="0" err="1"/>
+              <a:t>Recognition</a:t>
+            </a:r>
+            <a:r>
+              <a:rPr lang="tr-TR" dirty="0"/>
+              <a:t> (CVPR)</a:t>
+            </a:r>
+          </a:p>
+          <a:p>
+            <a:pPr>
+              <a:lnSpc>
+                <a:spcPct val="80000"/>
+              </a:lnSpc>
+            </a:pPr>
+            <a:r>
+              <a:rPr lang="tr-TR" dirty="0"/>
+              <a:t>International Conference on </a:t>
+            </a:r>
+            <a:r>
+              <a:rPr lang="tr-TR" dirty="0" err="1"/>
+              <a:t>Computer</a:t>
+            </a:r>
+            <a:r>
+              <a:rPr lang="tr-TR" dirty="0"/>
+              <a:t> </a:t>
+            </a:r>
+            <a:r>
+              <a:rPr lang="tr-TR" dirty="0" err="1"/>
+              <a:t>Vision</a:t>
+            </a:r>
+            <a:r>
+              <a:rPr lang="tr-TR" dirty="0"/>
+              <a:t> (ICCV)</a:t>
+            </a:r>
+          </a:p>
+          <a:p>
+            <a:pPr>
+              <a:lnSpc>
+                <a:spcPct val="80000"/>
+              </a:lnSpc>
+            </a:pPr>
+            <a:r>
+              <a:rPr lang="tr-TR" dirty="0" err="1"/>
+              <a:t>European</a:t>
+            </a:r>
+            <a:r>
+              <a:rPr lang="tr-TR" dirty="0"/>
+              <a:t> Conference on </a:t>
+            </a:r>
+            <a:r>
+              <a:rPr lang="tr-TR" dirty="0" err="1"/>
+              <a:t>Computer</a:t>
+            </a:r>
+            <a:r>
+              <a:rPr lang="tr-TR" dirty="0"/>
+              <a:t> </a:t>
+            </a:r>
+            <a:r>
+              <a:rPr lang="tr-TR" dirty="0" err="1"/>
+              <a:t>Vision</a:t>
+            </a:r>
+            <a:r>
+              <a:rPr lang="tr-TR" dirty="0"/>
+              <a:t> (ECCV)</a:t>
             </a:r>
           </a:p>
           <a:p>
@@ -7670,6 +7788,153 @@
             <a:fld id="{629637A9-119A-49DA-BD12-AAC58B377D80}" type="slidenum">
               <a:rPr lang="en-US" smtClean="0"/>
               <a:t>23</a:t>
+            </a:fld>
+            <a:endParaRPr lang="en-US" dirty="0"/>
+          </a:p>
+        </p:txBody>
+      </p:sp>
+    </p:spTree>
+    <p:extLst>
+      <p:ext uri="{BB962C8B-B14F-4D97-AF65-F5344CB8AC3E}">
+        <p14:creationId xmlns:p14="http://schemas.microsoft.com/office/powerpoint/2010/main" val="3506267765"/>
+      </p:ext>
+    </p:extLst>
+  </p:cSld>
+  <p:clrMapOvr>
+    <a:masterClrMapping/>
+  </p:clrMapOvr>
+</p:sld>
+</file>
+
+<file path=ppt/slides/slide24.xml><?xml version="1.0" encoding="utf-8"?>
+<p:sld xmlns:a="http://schemas.openxmlformats.org/drawingml/2006/main" xmlns:r="http://schemas.openxmlformats.org/officeDocument/2006/relationships" xmlns:p="http://schemas.openxmlformats.org/presentationml/2006/main">
+  <p:cSld>
+    <p:spTree>
+      <p:nvGrpSpPr>
+        <p:cNvPr id="1" name=""/>
+        <p:cNvGrpSpPr/>
+        <p:nvPr/>
+      </p:nvGrpSpPr>
+      <p:grpSpPr>
+        <a:xfrm>
+          <a:off x="0" y="0"/>
+          <a:ext cx="0" cy="0"/>
+          <a:chOff x="0" y="0"/>
+          <a:chExt cx="0" cy="0"/>
+        </a:xfrm>
+      </p:grpSpPr>
+      <p:sp>
+        <p:nvSpPr>
+          <p:cNvPr id="2" name="Title 1"/>
+          <p:cNvSpPr>
+            <a:spLocks noGrp="1"/>
+          </p:cNvSpPr>
+          <p:nvPr>
+            <p:ph type="title"/>
+          </p:nvPr>
+        </p:nvSpPr>
+        <p:spPr/>
+        <p:txBody>
+          <a:bodyPr/>
+          <a:lstStyle/>
+          <a:p>
+            <a:r>
+              <a:rPr lang="en-US" dirty="0"/>
+              <a:t>Exercise</a:t>
+            </a:r>
+          </a:p>
+        </p:txBody>
+      </p:sp>
+      <p:sp>
+        <p:nvSpPr>
+          <p:cNvPr id="3" name="Content Placeholder 2"/>
+          <p:cNvSpPr>
+            <a:spLocks noGrp="1"/>
+          </p:cNvSpPr>
+          <p:nvPr>
+            <p:ph idx="1"/>
+          </p:nvPr>
+        </p:nvSpPr>
+        <p:spPr/>
+        <p:txBody>
+          <a:bodyPr/>
+          <a:lstStyle/>
+          <a:p>
+            <a:r>
+              <a:rPr lang="en-US" dirty="0"/>
+              <a:t>Break into small groups</a:t>
+            </a:r>
+          </a:p>
+          <a:p>
+            <a:r>
+              <a:rPr lang="en-US" dirty="0"/>
+              <a:t>Take a field that interests you:</a:t>
+            </a:r>
+          </a:p>
+          <a:p>
+            <a:pPr lvl="1"/>
+            <a:r>
+              <a:rPr lang="en-US" dirty="0"/>
+              <a:t>Ex.  Driving a car, understanding social networks, finding a good date, recommend a movie to watch, …</a:t>
+            </a:r>
+          </a:p>
+          <a:p>
+            <a:r>
+              <a:rPr lang="en-US" dirty="0"/>
+              <a:t>Identify a specific task that can be done with machine learning</a:t>
+            </a:r>
+          </a:p>
+          <a:p>
+            <a:pPr lvl="1"/>
+            <a:r>
+              <a:rPr lang="en-US" dirty="0"/>
+              <a:t>What is the objective of the task?</a:t>
+            </a:r>
+          </a:p>
+          <a:p>
+            <a:pPr lvl="1"/>
+            <a:r>
+              <a:rPr lang="en-US" dirty="0"/>
+              <a:t>What is the data you need?</a:t>
+            </a:r>
+          </a:p>
+          <a:p>
+            <a:pPr lvl="1"/>
+            <a:r>
+              <a:rPr lang="en-US" dirty="0"/>
+              <a:t>What type of ML problem is this?  Classification, regression, …</a:t>
+            </a:r>
+          </a:p>
+          <a:p>
+            <a:pPr lvl="1"/>
+            <a:r>
+              <a:rPr lang="en-US" dirty="0"/>
+              <a:t>How would your approach compare to an expert-driven method?</a:t>
+            </a:r>
+          </a:p>
+          <a:p>
+            <a:endParaRPr lang="en-US" dirty="0"/>
+          </a:p>
+        </p:txBody>
+      </p:sp>
+      <p:sp>
+        <p:nvSpPr>
+          <p:cNvPr id="4" name="Slide Number Placeholder 3"/>
+          <p:cNvSpPr>
+            <a:spLocks noGrp="1"/>
+          </p:cNvSpPr>
+          <p:nvPr>
+            <p:ph type="sldNum" sz="quarter" idx="12"/>
+          </p:nvPr>
+        </p:nvSpPr>
+        <p:spPr/>
+        <p:txBody>
+          <a:bodyPr/>
+          <a:lstStyle/>
+          <a:p>
+            <a:fld id="{629637A9-119A-49DA-BD12-AAC58B377D80}" type="slidenum">
+              <a:rPr lang="en-US" smtClean="0"/>
+              <a:t>24</a:t>
             </a:fld>
             <a:endParaRPr lang="en-US" dirty="0"/>
           </a:p>
@@ -8117,7 +8382,7 @@
             </p:nvSpPr>
             <p:spPr>
               <a:xfrm>
-                <a:off x="894522" y="3864864"/>
+                <a:off x="1193460" y="3952787"/>
                 <a:ext cx="10261158" cy="2004230"/>
               </a:xfrm>
             </p:spPr>
@@ -8219,7 +8484,7 @@
             </p:nvSpPr>
             <p:spPr>
               <a:xfrm>
-                <a:off x="894522" y="3864864"/>
+                <a:off x="1193460" y="3952787"/>
                 <a:ext cx="10261158" cy="2004230"/>
               </a:xfrm>
               <a:blipFill>
@@ -8351,7 +8616,7 @@
           <a:p>
             <a:r>
               <a:rPr lang="en-US" dirty="0"/>
-              <a:t>“Expert-Driven” Approach</a:t>
+              <a:t>Classical “Expert” Approach</a:t>
             </a:r>
           </a:p>
         </p:txBody>
@@ -8378,60 +8643,109 @@
           <a:lstStyle/>
           <a:p>
             <a:r>
-              <a:rPr lang="en-US" dirty="0"/>
-              <a:t>Use your knowledge about digits</a:t>
-            </a:r>
-          </a:p>
-          <a:p>
-            <a:r>
-              <a:rPr lang="en-US" dirty="0"/>
-              <a:t>Construct simple rules </a:t>
-            </a:r>
-          </a:p>
-          <a:p>
-            <a:r>
-              <a:rPr lang="en-US" dirty="0"/>
-              <a:t>Example:  It is a digit 7 if:</a:t>
+              <a:rPr lang="en-US" dirty="0">
+                <a:solidFill>
+                  <a:schemeClr val="accent1">
+                    <a:lumMod val="60000"/>
+                    <a:lumOff val="40000"/>
+                  </a:schemeClr>
+                </a:solidFill>
+              </a:rPr>
+              <a:t>Idea</a:t>
+            </a:r>
+            <a:r>
+              <a:rPr lang="en-US" dirty="0"/>
+              <a:t>:  Use your knowledge about digits</a:t>
             </a:r>
           </a:p>
           <a:p>
             <a:pPr lvl="1"/>
             <a:r>
               <a:rPr lang="en-US" dirty="0"/>
-              <a:t>There is a single horizontal line</a:t>
+              <a:t>You are an “expert” since you can do the task</a:t>
             </a:r>
           </a:p>
           <a:p>
             <a:pPr lvl="1"/>
             <a:r>
               <a:rPr lang="en-US" dirty="0"/>
+              <a:t>Construct simple rules and code them</a:t>
+            </a:r>
+          </a:p>
+          <a:p>
+            <a:r>
+              <a:rPr lang="en-US" dirty="0">
+                <a:solidFill>
+                  <a:schemeClr val="accent1">
+                    <a:lumMod val="60000"/>
+                    <a:lumOff val="40000"/>
+                  </a:schemeClr>
+                </a:solidFill>
+              </a:rPr>
+              <a:t>Expert rule </a:t>
+            </a:r>
+            <a:r>
+              <a:rPr lang="en-US" dirty="0"/>
+              <a:t>example:   “</a:t>
+            </a:r>
+            <a:r>
+              <a:rPr lang="en-US" i="1" dirty="0"/>
+              <a:t>Image is a digit 7 if…”</a:t>
+            </a:r>
+            <a:r>
+              <a:rPr lang="en-US" dirty="0"/>
+              <a:t>:</a:t>
+            </a:r>
+          </a:p>
+          <a:p>
+            <a:pPr lvl="1"/>
+            <a:r>
+              <a:rPr lang="en-US" dirty="0"/>
+              <a:t>There is a single horizontal line, and </a:t>
+            </a:r>
+          </a:p>
+          <a:p>
+            <a:pPr lvl="1"/>
+            <a:r>
+              <a:rPr lang="en-US" dirty="0"/>
               <a:t>There is a single vertical line</a:t>
             </a:r>
           </a:p>
           <a:p>
+            <a:r>
+              <a:rPr lang="en-US" dirty="0"/>
+              <a:t>But, very difficult to make work in practice</a:t>
+            </a:r>
+          </a:p>
+          <a:p>
             <a:pPr lvl="1"/>
             <a:r>
               <a:rPr lang="en-US" dirty="0"/>
-              <a:t>The vertical line is above the horizontal line</a:t>
-            </a:r>
-          </a:p>
-          <a:p>
-            <a:r>
-              <a:rPr lang="en-US" dirty="0"/>
-              <a:t>Very difficult to make work in practice</a:t>
+              <a:t>Lacks robustness</a:t>
             </a:r>
           </a:p>
           <a:p>
             <a:pPr lvl="1"/>
             <a:r>
               <a:rPr lang="en-US" dirty="0"/>
-              <a:t>Lacks robustness</a:t>
-            </a:r>
-          </a:p>
-          <a:p>
-            <a:r>
-              <a:rPr lang="en-US" dirty="0"/>
-              <a:t>Cannot easily code our knowledge </a:t>
+              <a:t>Rotations, curves in lines, poorly drawn digits, …</a:t>
+            </a:r>
+          </a:p>
+          <a:p>
+            <a:r>
+              <a:rPr lang="en-US" dirty="0">
+                <a:solidFill>
+                  <a:schemeClr val="accent1">
+                    <a:lumMod val="60000"/>
+                    <a:lumOff val="40000"/>
+                  </a:schemeClr>
+                </a:solidFill>
+              </a:rPr>
+              <a:t>Problem</a:t>
+            </a:r>
+            <a:r>
+              <a:rPr lang="en-US" dirty="0"/>
+              <a:t>:  We cannot easily code our knowledge </a:t>
             </a:r>
           </a:p>
           <a:p>
@@ -8504,10 +8818,10 @@
       </p:pic>
       <p:pic>
         <p:nvPicPr>
-          <p:cNvPr id="6" name="Picture 5">
+          <p:cNvPr id="7" name="Picture 6">
             <a:extLst>
               <a:ext uri="{FF2B5EF4-FFF2-40B4-BE49-F238E27FC236}">
-                <a16:creationId xmlns:a16="http://schemas.microsoft.com/office/drawing/2014/main" id="{080B3E06-EBF5-439B-8606-EF18DA8B1F6A}"/>
+                <a16:creationId xmlns:a16="http://schemas.microsoft.com/office/drawing/2014/main" id="{44E52FF1-0BB6-490B-927C-BCD967047415}"/>
               </a:ext>
             </a:extLst>
           </p:cNvPr>
@@ -8524,8 +8838,8 @@
         </p:blipFill>
         <p:spPr>
           <a:xfrm>
-            <a:off x="7011853" y="3139151"/>
-            <a:ext cx="3676835" cy="3614982"/>
+            <a:off x="6908393" y="3195312"/>
+            <a:ext cx="2697519" cy="2771279"/>
           </a:xfrm>
           <a:prstGeom prst="rect">
             <a:avLst/>
@@ -8579,7 +8893,7 @@
           <a:p>
             <a:r>
               <a:rPr lang="en-US" dirty="0"/>
-              <a:t>ML Approach:  Supervised Learning</a:t>
+              <a:t>ML Approach:  Learn from Data</a:t>
             </a:r>
           </a:p>
         </p:txBody>
@@ -8598,8 +8912,8 @@
             </p:nvSpPr>
             <p:spPr>
               <a:xfrm>
-                <a:off x="1097280" y="1539277"/>
-                <a:ext cx="5090160" cy="4329817"/>
+                <a:off x="1026941" y="3668720"/>
+                <a:ext cx="9822767" cy="2046281"/>
               </a:xfrm>
             </p:spPr>
             <p:txBody>
@@ -8609,21 +8923,26 @@
               <a:lstStyle/>
               <a:p>
                 <a:r>
+                  <a:rPr lang="en-US" dirty="0">
+                    <a:solidFill>
+                      <a:schemeClr val="accent1">
+                        <a:lumMod val="60000"/>
+                        <a:lumOff val="40000"/>
+                      </a:schemeClr>
+                    </a:solidFill>
+                  </a:rPr>
+                  <a:t>Supervised learning</a:t>
+                </a:r>
+                <a:r>
                   <a:rPr lang="en-US" dirty="0"/>
-                  <a:t>Learn the function from data</a:t>
+                  <a:t>:</a:t>
                 </a:r>
               </a:p>
               <a:p>
                 <a:pPr lvl="1"/>
                 <a:r>
                   <a:rPr lang="en-US" dirty="0"/>
-                  <a:t>No manual coding!</a:t>
-                </a:r>
-              </a:p>
-              <a:p>
-                <a:r>
-                  <a:rPr lang="en-US" dirty="0"/>
-                  <a:t>Start with </a:t>
+                  <a:t>Get many </a:t>
                 </a:r>
                 <a:r>
                   <a:rPr lang="en-US" dirty="0">
@@ -8634,17 +8953,180 @@
                       </a:schemeClr>
                     </a:solidFill>
                   </a:rPr>
-                  <a:t>training data</a:t>
+                  <a:t>labeled examples </a:t>
+                </a:r>
+                <a14:m>
+                  <m:oMath xmlns:m="http://schemas.openxmlformats.org/officeDocument/2006/math">
+                    <m:d>
+                      <m:dPr>
+                        <m:ctrlPr>
+                          <a:rPr lang="en-US" b="0" i="1" smtClean="0">
+                            <a:latin typeface="Cambria Math" panose="02040503050406030204" pitchFamily="18" charset="0"/>
+                          </a:rPr>
+                        </m:ctrlPr>
+                      </m:dPr>
+                      <m:e>
+                        <m:sSub>
+                          <m:sSubPr>
+                            <m:ctrlPr>
+                              <a:rPr lang="en-US" b="0" i="1" smtClean="0">
+                                <a:latin typeface="Cambria Math" panose="02040503050406030204" pitchFamily="18" charset="0"/>
+                              </a:rPr>
+                            </m:ctrlPr>
+                          </m:sSubPr>
+                          <m:e>
+                            <m:r>
+                              <a:rPr lang="en-US" b="1" i="1" smtClean="0">
+                                <a:latin typeface="Cambria Math" panose="02040503050406030204" pitchFamily="18" charset="0"/>
+                              </a:rPr>
+                              <m:t>𝒙</m:t>
+                            </m:r>
+                          </m:e>
+                          <m:sub>
+                            <m:r>
+                              <a:rPr lang="en-US" b="0" i="1" smtClean="0">
+                                <a:latin typeface="Cambria Math" panose="02040503050406030204" pitchFamily="18" charset="0"/>
+                              </a:rPr>
+                              <m:t>𝑖</m:t>
+                            </m:r>
+                          </m:sub>
+                        </m:sSub>
+                        <m:r>
+                          <a:rPr lang="en-US" b="0" i="1" smtClean="0">
+                            <a:latin typeface="Cambria Math" panose="02040503050406030204" pitchFamily="18" charset="0"/>
+                          </a:rPr>
+                          <m:t>,</m:t>
+                        </m:r>
+                        <m:sSub>
+                          <m:sSubPr>
+                            <m:ctrlPr>
+                              <a:rPr lang="en-US" b="0" i="1" smtClean="0">
+                                <a:latin typeface="Cambria Math" panose="02040503050406030204" pitchFamily="18" charset="0"/>
+                              </a:rPr>
+                            </m:ctrlPr>
+                          </m:sSubPr>
+                          <m:e>
+                            <m:r>
+                              <a:rPr lang="en-US" b="0" i="1" smtClean="0">
+                                <a:latin typeface="Cambria Math" panose="02040503050406030204" pitchFamily="18" charset="0"/>
+                              </a:rPr>
+                              <m:t>𝑦</m:t>
+                            </m:r>
+                          </m:e>
+                          <m:sub>
+                            <m:r>
+                              <a:rPr lang="en-US" b="0" i="1" smtClean="0">
+                                <a:latin typeface="Cambria Math" panose="02040503050406030204" pitchFamily="18" charset="0"/>
+                              </a:rPr>
+                              <m:t>𝑖</m:t>
+                            </m:r>
+                          </m:sub>
+                        </m:sSub>
+                      </m:e>
+                    </m:d>
+                    <m:r>
+                      <a:rPr lang="en-US" b="0" i="1" smtClean="0">
+                        <a:latin typeface="Cambria Math" panose="02040503050406030204" pitchFamily="18" charset="0"/>
+                      </a:rPr>
+                      <m:t>, </m:t>
+                    </m:r>
+                    <m:r>
+                      <a:rPr lang="en-US" b="0" i="1" smtClean="0">
+                        <a:latin typeface="Cambria Math" panose="02040503050406030204" pitchFamily="18" charset="0"/>
+                      </a:rPr>
+                      <m:t>𝑖</m:t>
+                    </m:r>
+                    <m:r>
+                      <a:rPr lang="en-US" b="0" i="1" smtClean="0">
+                        <a:latin typeface="Cambria Math" panose="02040503050406030204" pitchFamily="18" charset="0"/>
+                      </a:rPr>
+                      <m:t>=1,…,</m:t>
+                    </m:r>
+                    <m:r>
+                      <a:rPr lang="en-US" b="0" i="1" smtClean="0">
+                        <a:latin typeface="Cambria Math" panose="02040503050406030204" pitchFamily="18" charset="0"/>
+                      </a:rPr>
+                      <m:t>𝑁</m:t>
+                    </m:r>
+                  </m:oMath>
+                </a14:m>
+                <a:r>
+                  <a:rPr lang="en-US" dirty="0"/>
+                  <a:t>  (Called the training data)</a:t>
                 </a:r>
               </a:p>
               <a:p>
                 <a:pPr lvl="1"/>
                 <a:r>
                   <a:rPr lang="en-US" dirty="0"/>
-                  <a:t>Ex:  6000 examples of each digit</a:t>
+                  <a:t>Each example has an input </a:t>
                 </a:r>
+                <a14:m>
+                  <m:oMath xmlns:m="http://schemas.openxmlformats.org/officeDocument/2006/math">
+                    <m:sSub>
+                      <m:sSubPr>
+                        <m:ctrlPr>
+                          <a:rPr lang="en-US" i="1">
+                            <a:latin typeface="Cambria Math" panose="02040503050406030204" pitchFamily="18" charset="0"/>
+                          </a:rPr>
+                        </m:ctrlPr>
+                      </m:sSubPr>
+                      <m:e>
+                        <m:r>
+                          <a:rPr lang="en-US" b="1" i="1">
+                            <a:latin typeface="Cambria Math" panose="02040503050406030204" pitchFamily="18" charset="0"/>
+                          </a:rPr>
+                          <m:t>𝒙</m:t>
+                        </m:r>
+                      </m:e>
+                      <m:sub>
+                        <m:r>
+                          <a:rPr lang="en-US" i="1">
+                            <a:latin typeface="Cambria Math" panose="02040503050406030204" pitchFamily="18" charset="0"/>
+                          </a:rPr>
+                          <m:t>𝑖</m:t>
+                        </m:r>
+                      </m:sub>
+                    </m:sSub>
+                  </m:oMath>
+                </a14:m>
+                <a:r>
+                  <a:rPr lang="en-US" dirty="0"/>
+                  <a:t> and output </a:t>
+                </a:r>
+                <a14:m>
+                  <m:oMath xmlns:m="http://schemas.openxmlformats.org/officeDocument/2006/math">
+                    <m:sSub>
+                      <m:sSubPr>
+                        <m:ctrlPr>
+                          <a:rPr lang="en-US" i="1">
+                            <a:latin typeface="Cambria Math" panose="02040503050406030204" pitchFamily="18" charset="0"/>
+                          </a:rPr>
+                        </m:ctrlPr>
+                      </m:sSubPr>
+                      <m:e>
+                        <m:r>
+                          <a:rPr lang="en-US" i="1">
+                            <a:latin typeface="Cambria Math" panose="02040503050406030204" pitchFamily="18" charset="0"/>
+                          </a:rPr>
+                          <m:t>𝑦</m:t>
+                        </m:r>
+                      </m:e>
+                      <m:sub>
+                        <m:r>
+                          <a:rPr lang="en-US" i="1">
+                            <a:latin typeface="Cambria Math" panose="02040503050406030204" pitchFamily="18" charset="0"/>
+                          </a:rPr>
+                          <m:t>𝑖</m:t>
+                        </m:r>
+                      </m:sub>
+                    </m:sSub>
+                  </m:oMath>
+                </a14:m>
+                <a:endParaRPr lang="en-US" dirty="0"/>
               </a:p>
               <a:p>
+                <a:pPr lvl="1"/>
                 <a:r>
                   <a:rPr lang="en-US" dirty="0">
                     <a:solidFill>
@@ -8654,34 +9136,34 @@
                       </a:schemeClr>
                     </a:solidFill>
                   </a:rPr>
-                  <a:t>Learn </a:t>
+                  <a:t>Learn</a:t>
                 </a:r>
                 <a:r>
                   <a:rPr lang="en-US" dirty="0"/>
-                  <a:t>a classifier </a:t>
+                  <a:t> a function </a:t>
                 </a:r>
                 <a14:m>
                   <m:oMath xmlns:m="http://schemas.openxmlformats.org/officeDocument/2006/math">
                     <m:r>
-                      <a:rPr lang="en-US" b="0" i="1" smtClean="0">
+                      <a:rPr lang="en-US" i="1">
                         <a:latin typeface="Cambria Math" panose="02040503050406030204" pitchFamily="18" charset="0"/>
                       </a:rPr>
                       <m:t>𝑓</m:t>
                     </m:r>
                     <m:r>
-                      <a:rPr lang="en-US" b="0" i="1" smtClean="0">
+                      <a:rPr lang="en-US" i="1">
                         <a:latin typeface="Cambria Math" panose="02040503050406030204" pitchFamily="18" charset="0"/>
                       </a:rPr>
                       <m:t>(</m:t>
                     </m:r>
                     <m:r>
-                      <a:rPr lang="en-US" b="1" i="1" smtClean="0">
+                      <a:rPr lang="en-US" b="1" i="1">
                         <a:latin typeface="Cambria Math" panose="02040503050406030204" pitchFamily="18" charset="0"/>
                       </a:rPr>
                       <m:t>𝒙</m:t>
                     </m:r>
                     <m:r>
-                      <a:rPr lang="en-US" b="0" i="1" smtClean="0">
+                      <a:rPr lang="en-US" i="1">
                         <a:latin typeface="Cambria Math" panose="02040503050406030204" pitchFamily="18" charset="0"/>
                       </a:rPr>
                       <m:t>)</m:t>
@@ -8690,42 +9172,95 @@
                 </a14:m>
                 <a:r>
                   <a:rPr lang="en-US" dirty="0"/>
-                  <a:t> </a:t>
+                  <a:t> such that:   </a:t>
+                </a:r>
+                <a14:m>
+                  <m:oMath xmlns:m="http://schemas.openxmlformats.org/officeDocument/2006/math">
+                    <m:r>
+                      <a:rPr lang="en-US" i="1">
+                        <a:latin typeface="Cambria Math" panose="02040503050406030204" pitchFamily="18" charset="0"/>
+                      </a:rPr>
+                      <m:t>𝑓</m:t>
+                    </m:r>
+                    <m:d>
+                      <m:dPr>
+                        <m:ctrlPr>
+                          <a:rPr lang="en-US" i="1">
+                            <a:latin typeface="Cambria Math" panose="02040503050406030204" pitchFamily="18" charset="0"/>
+                          </a:rPr>
+                        </m:ctrlPr>
+                      </m:dPr>
+                      <m:e>
+                        <m:sSub>
+                          <m:sSubPr>
+                            <m:ctrlPr>
+                              <a:rPr lang="en-US" b="0" i="1" smtClean="0">
+                                <a:latin typeface="Cambria Math" panose="02040503050406030204" pitchFamily="18" charset="0"/>
+                              </a:rPr>
+                            </m:ctrlPr>
+                          </m:sSubPr>
+                          <m:e>
+                            <m:r>
+                              <a:rPr lang="en-US" b="1" i="1">
+                                <a:latin typeface="Cambria Math" panose="02040503050406030204" pitchFamily="18" charset="0"/>
+                              </a:rPr>
+                              <m:t>𝒙</m:t>
+                            </m:r>
+                          </m:e>
+                          <m:sub>
+                            <m:r>
+                              <a:rPr lang="en-US" b="0" i="1" smtClean="0">
+                                <a:latin typeface="Cambria Math" panose="02040503050406030204" pitchFamily="18" charset="0"/>
+                              </a:rPr>
+                              <m:t>𝑖</m:t>
+                            </m:r>
+                          </m:sub>
+                        </m:sSub>
+                      </m:e>
+                    </m:d>
+                    <m:r>
+                      <a:rPr lang="en-US" b="0" i="1" smtClean="0">
+                        <a:latin typeface="Cambria Math" panose="02040503050406030204" pitchFamily="18" charset="0"/>
+                      </a:rPr>
+                      <m:t>=</m:t>
+                    </m:r>
+                    <m:sSub>
+                      <m:sSubPr>
+                        <m:ctrlPr>
+                          <a:rPr lang="en-US" b="0" i="1" smtClean="0">
+                            <a:latin typeface="Cambria Math" panose="02040503050406030204" pitchFamily="18" charset="0"/>
+                          </a:rPr>
+                        </m:ctrlPr>
+                      </m:sSubPr>
+                      <m:e>
+                        <m:r>
+                          <a:rPr lang="en-US" b="0" i="1" smtClean="0">
+                            <a:latin typeface="Cambria Math" panose="02040503050406030204" pitchFamily="18" charset="0"/>
+                          </a:rPr>
+                          <m:t>𝑦</m:t>
+                        </m:r>
+                      </m:e>
+                      <m:sub>
+                        <m:r>
+                          <a:rPr lang="en-US" b="0" i="1" smtClean="0">
+                            <a:latin typeface="Cambria Math" panose="02040503050406030204" pitchFamily="18" charset="0"/>
+                          </a:rPr>
+                          <m:t>𝑖</m:t>
+                        </m:r>
+                      </m:sub>
+                    </m:sSub>
+                  </m:oMath>
+                </a14:m>
+                <a:r>
+                  <a:rPr lang="en-US" dirty="0"/>
+                  <a:t> for “most” training examples</a:t>
                 </a:r>
               </a:p>
               <a:p>
                 <a:pPr lvl="1"/>
                 <a:r>
                   <a:rPr lang="en-US" dirty="0"/>
-                  <a:t>Should match label well  on training data</a:t>
-                </a:r>
-              </a:p>
-              <a:p>
-                <a:pPr lvl="1"/>
-                <a:r>
-                  <a:rPr lang="en-US" dirty="0"/>
-                  <a:t>Generally fit </a:t>
-                </a:r>
-                <a:r>
-                  <a:rPr lang="en-US" dirty="0">
-                    <a:solidFill>
-                      <a:schemeClr val="accent1">
-                        <a:lumMod val="60000"/>
-                        <a:lumOff val="40000"/>
-                      </a:schemeClr>
-                    </a:solidFill>
-                  </a:rPr>
-                  <a:t>parameters</a:t>
-                </a:r>
-                <a:r>
-                  <a:rPr lang="en-US" dirty="0"/>
-                  <a:t> in the function</a:t>
-                </a:r>
-              </a:p>
-              <a:p>
-                <a:r>
-                  <a:rPr lang="en-US" dirty="0"/>
-                  <a:t>Given new data </a:t>
+                  <a:t>Use this function on new </a:t>
                 </a:r>
                 <a14:m>
                   <m:oMath xmlns:m="http://schemas.openxmlformats.org/officeDocument/2006/math">
@@ -8737,45 +9272,12 @@
                     </m:r>
                   </m:oMath>
                 </a14:m>
-                <a:r>
-                  <a:rPr lang="en-US" b="1" dirty="0"/>
-                  <a:t> </a:t>
-                </a:r>
-                <a:r>
-                  <a:rPr lang="en-US" dirty="0"/>
-                  <a:t>use function to guess digit</a:t>
-                </a:r>
-              </a:p>
-              <a:p>
-                <a:r>
-                  <a:rPr lang="en-US" dirty="0">
-                    <a:hlinkClick r:id="rId2"/>
-                  </a:rPr>
-                  <a:t>Current systems</a:t>
-                </a:r>
-                <a:r>
-                  <a:rPr lang="en-US" dirty="0"/>
-                  <a:t> get &lt;0.21% errors </a:t>
-                </a:r>
-              </a:p>
-              <a:p>
-                <a:pPr lvl="1"/>
-                <a:r>
-                  <a:rPr lang="en-US" dirty="0"/>
-                  <a:t>(as of 1/20/2018)</a:t>
-                </a:r>
+                <a:endParaRPr lang="en-US" dirty="0"/>
               </a:p>
               <a:p>
                 <a:r>
                   <a:rPr lang="en-US" dirty="0"/>
-                  <a:t>First commercial application:  </a:t>
-                </a:r>
-              </a:p>
-              <a:p>
-                <a:pPr lvl="1"/>
-                <a:r>
-                  <a:rPr lang="en-US" dirty="0"/>
-                  <a:t>Used by USPS for recognizing zip codes on letters</a:t>
+                  <a:t>No manual coding!</a:t>
                 </a:r>
               </a:p>
               <a:p>
@@ -8797,13 +9299,13 @@
             </p:nvSpPr>
             <p:spPr>
               <a:xfrm>
-                <a:off x="1097280" y="1539277"/>
-                <a:ext cx="5090160" cy="4329817"/>
+                <a:off x="1026941" y="3668720"/>
+                <a:ext cx="9822767" cy="2046281"/>
               </a:xfrm>
               <a:blipFill>
-                <a:blip r:embed="rId3"/>
+                <a:blip r:embed="rId2"/>
                 <a:stretch>
-                  <a:fillRect l="-2874" t="-2113"/>
+                  <a:fillRect l="-1489" t="-4464" b="-298"/>
                 </a:stretch>
               </a:blipFill>
             </p:spPr>
@@ -8854,31 +9356,435 @@
           <p:nvPr/>
         </p:nvPicPr>
         <p:blipFill>
-          <a:blip r:embed="rId4"/>
+          <a:blip r:embed="rId3"/>
           <a:stretch>
             <a:fillRect/>
           </a:stretch>
         </p:blipFill>
         <p:spPr>
           <a:xfrm>
-            <a:off x="6332770" y="1666199"/>
-            <a:ext cx="4207141" cy="2846165"/>
+            <a:off x="1466389" y="1927431"/>
+            <a:ext cx="2138457" cy="1446683"/>
           </a:xfrm>
           <a:prstGeom prst="rect">
             <a:avLst/>
           </a:prstGeom>
         </p:spPr>
       </p:pic>
-      <p:sp>
-        <p:nvSpPr>
-          <p:cNvPr id="6" name="TextBox 5"/>
+      <mc:AlternateContent xmlns:mc="http://schemas.openxmlformats.org/markup-compatibility/2006">
+        <mc:Choice xmlns:a14="http://schemas.microsoft.com/office/drawing/2010/main" Requires="a14">
+          <p:sp>
+            <p:nvSpPr>
+              <p:cNvPr id="6" name="TextBox 5"/>
+              <p:cNvSpPr txBox="1"/>
+              <p:nvPr/>
+            </p:nvSpPr>
+            <p:spPr>
+              <a:xfrm>
+                <a:off x="1026941" y="1473300"/>
+                <a:ext cx="4766305" cy="369332"/>
+              </a:xfrm>
+              <a:prstGeom prst="rect">
+                <a:avLst/>
+              </a:prstGeom>
+              <a:noFill/>
+            </p:spPr>
+            <p:txBody>
+              <a:bodyPr wrap="none" rtlCol="0">
+                <a:spAutoFit/>
+              </a:bodyPr>
+              <a:lstStyle/>
+              <a:p>
+                <a:r>
+                  <a:rPr lang="en-US" dirty="0"/>
+                  <a:t>Training inputs images  </a:t>
+                </a:r>
+                <a14:m>
+                  <m:oMath xmlns:m="http://schemas.openxmlformats.org/officeDocument/2006/math">
+                    <m:sSub>
+                      <m:sSubPr>
+                        <m:ctrlPr>
+                          <a:rPr lang="en-US" b="0" i="1" smtClean="0">
+                            <a:latin typeface="Cambria Math" panose="02040503050406030204" pitchFamily="18" charset="0"/>
+                          </a:rPr>
+                        </m:ctrlPr>
+                      </m:sSubPr>
+                      <m:e>
+                        <m:r>
+                          <a:rPr lang="en-US" b="1" i="1" smtClean="0">
+                            <a:latin typeface="Cambria Math" panose="02040503050406030204" pitchFamily="18" charset="0"/>
+                          </a:rPr>
+                          <m:t>𝒙</m:t>
+                        </m:r>
+                      </m:e>
+                      <m:sub>
+                        <m:r>
+                          <a:rPr lang="en-US" b="0" i="1" smtClean="0">
+                            <a:latin typeface="Cambria Math" panose="02040503050406030204" pitchFamily="18" charset="0"/>
+                          </a:rPr>
+                          <m:t>𝑖</m:t>
+                        </m:r>
+                      </m:sub>
+                    </m:sSub>
+                  </m:oMath>
+                </a14:m>
+                <a:r>
+                  <a:rPr lang="en-US" dirty="0"/>
+                  <a:t> (ex. 5000 ex per class)</a:t>
+                </a:r>
+              </a:p>
+            </p:txBody>
+          </p:sp>
+        </mc:Choice>
+        <mc:Fallback>
+          <p:sp>
+            <p:nvSpPr>
+              <p:cNvPr id="6" name="TextBox 5"/>
+              <p:cNvSpPr txBox="1">
+                <a:spLocks noRot="1" noChangeAspect="1" noMove="1" noResize="1" noEditPoints="1" noAdjustHandles="1" noChangeArrowheads="1" noChangeShapeType="1" noTextEdit="1"/>
+              </p:cNvSpPr>
+              <p:nvPr/>
+            </p:nvSpPr>
+            <p:spPr>
+              <a:xfrm>
+                <a:off x="1026941" y="1473300"/>
+                <a:ext cx="4766305" cy="369332"/>
+              </a:xfrm>
+              <a:prstGeom prst="rect">
+                <a:avLst/>
+              </a:prstGeom>
+              <a:blipFill>
+                <a:blip r:embed="rId4"/>
+                <a:stretch>
+                  <a:fillRect l="-1023" t="-10000" b="-26667"/>
+                </a:stretch>
+              </a:blipFill>
+            </p:spPr>
+            <p:txBody>
+              <a:bodyPr/>
+              <a:lstStyle/>
+              <a:p>
+                <a:r>
+                  <a:rPr lang="en-US">
+                    <a:noFill/>
+                  </a:rPr>
+                  <a:t> </a:t>
+                </a:r>
+              </a:p>
+            </p:txBody>
+          </p:sp>
+        </mc:Fallback>
+      </mc:AlternateContent>
+      <p:sp>
+        <p:nvSpPr>
+          <p:cNvPr id="7" name="Arrow: Right 6">
+            <a:extLst>
+              <a:ext uri="{FF2B5EF4-FFF2-40B4-BE49-F238E27FC236}">
+                <a16:creationId xmlns:a16="http://schemas.microsoft.com/office/drawing/2014/main" id="{576FACCB-EE1F-43D1-A8D6-DD1F3CE6D8D7}"/>
+              </a:ext>
+            </a:extLst>
+          </p:cNvPr>
+          <p:cNvSpPr/>
+          <p:nvPr/>
+        </p:nvSpPr>
+        <p:spPr>
+          <a:xfrm>
+            <a:off x="5449120" y="2178325"/>
+            <a:ext cx="978408" cy="484632"/>
+          </a:xfrm>
+          <a:prstGeom prst="rightArrow">
+            <a:avLst/>
+          </a:prstGeom>
+          <a:solidFill>
+            <a:schemeClr val="accent1">
+              <a:lumMod val="40000"/>
+              <a:lumOff val="60000"/>
+            </a:schemeClr>
+          </a:solidFill>
+        </p:spPr>
+        <p:style>
+          <a:lnRef idx="2">
+            <a:schemeClr val="accent1">
+              <a:shade val="50000"/>
+            </a:schemeClr>
+          </a:lnRef>
+          <a:fillRef idx="1">
+            <a:schemeClr val="accent1"/>
+          </a:fillRef>
+          <a:effectRef idx="0">
+            <a:schemeClr val="accent1"/>
+          </a:effectRef>
+          <a:fontRef idx="minor">
+            <a:schemeClr val="lt1"/>
+          </a:fontRef>
+        </p:style>
+        <p:txBody>
+          <a:bodyPr rtlCol="0" anchor="ctr"/>
+          <a:lstStyle/>
+          <a:p>
+            <a:pPr algn="ctr"/>
+            <a:endParaRPr lang="en-US"/>
+          </a:p>
+        </p:txBody>
+      </p:sp>
+      <mc:AlternateContent xmlns:mc="http://schemas.openxmlformats.org/markup-compatibility/2006">
+        <mc:Choice xmlns:a14="http://schemas.microsoft.com/office/drawing/2010/main" Requires="a14">
+          <p:sp>
+            <p:nvSpPr>
+              <p:cNvPr id="8" name="TextBox 7">
+                <a:extLst>
+                  <a:ext uri="{FF2B5EF4-FFF2-40B4-BE49-F238E27FC236}">
+                    <a16:creationId xmlns:a16="http://schemas.microsoft.com/office/drawing/2014/main" id="{D231B379-1050-429B-BA41-2EAF6B136BF8}"/>
+                  </a:ext>
+                </a:extLst>
+              </p:cNvPr>
+              <p:cNvSpPr txBox="1"/>
+              <p:nvPr/>
+            </p:nvSpPr>
+            <p:spPr>
+              <a:xfrm>
+                <a:off x="7411915" y="2016626"/>
+                <a:ext cx="3872086" cy="646331"/>
+              </a:xfrm>
+              <a:prstGeom prst="rect">
+                <a:avLst/>
+              </a:prstGeom>
+              <a:noFill/>
+            </p:spPr>
+            <p:txBody>
+              <a:bodyPr wrap="none" rtlCol="0">
+                <a:spAutoFit/>
+              </a:bodyPr>
+              <a:lstStyle/>
+              <a:p>
+                <a:r>
+                  <a:rPr lang="en-US" dirty="0"/>
+                  <a:t>Training output labels </a:t>
+                </a:r>
+                <a14:m>
+                  <m:oMath xmlns:m="http://schemas.openxmlformats.org/officeDocument/2006/math">
+                    <m:sSub>
+                      <m:sSubPr>
+                        <m:ctrlPr>
+                          <a:rPr lang="en-US" b="0" i="1" smtClean="0">
+                            <a:latin typeface="Cambria Math" panose="02040503050406030204" pitchFamily="18" charset="0"/>
+                          </a:rPr>
+                        </m:ctrlPr>
+                      </m:sSubPr>
+                      <m:e>
+                        <m:r>
+                          <a:rPr lang="en-US" b="0" i="1" smtClean="0">
+                            <a:latin typeface="Cambria Math" panose="02040503050406030204" pitchFamily="18" charset="0"/>
+                          </a:rPr>
+                          <m:t>𝑦</m:t>
+                        </m:r>
+                      </m:e>
+                      <m:sub>
+                        <m:r>
+                          <a:rPr lang="en-US" b="0" i="1" smtClean="0">
+                            <a:latin typeface="Cambria Math" panose="02040503050406030204" pitchFamily="18" charset="0"/>
+                          </a:rPr>
+                          <m:t>𝑖</m:t>
+                        </m:r>
+                      </m:sub>
+                    </m:sSub>
+                    <m:r>
+                      <a:rPr lang="en-US" b="0" i="1" smtClean="0">
+                        <a:latin typeface="Cambria Math" panose="02040503050406030204" pitchFamily="18" charset="0"/>
+                      </a:rPr>
+                      <m:t>∈{0,1,…,9}</m:t>
+                    </m:r>
+                  </m:oMath>
+                </a14:m>
+                <a:endParaRPr lang="en-US" dirty="0"/>
+              </a:p>
+              <a:p>
+                <a:endParaRPr lang="en-US" dirty="0"/>
+              </a:p>
+            </p:txBody>
+          </p:sp>
+        </mc:Choice>
+        <mc:Fallback>
+          <p:sp>
+            <p:nvSpPr>
+              <p:cNvPr id="8" name="TextBox 7">
+                <a:extLst>
+                  <a:ext uri="{FF2B5EF4-FFF2-40B4-BE49-F238E27FC236}">
+                    <a16:creationId xmlns:a16="http://schemas.microsoft.com/office/drawing/2014/main" id="{D231B379-1050-429B-BA41-2EAF6B136BF8}"/>
+                  </a:ext>
+                </a:extLst>
+              </p:cNvPr>
+              <p:cNvSpPr txBox="1">
+                <a:spLocks noRot="1" noChangeAspect="1" noMove="1" noResize="1" noEditPoints="1" noAdjustHandles="1" noChangeArrowheads="1" noChangeShapeType="1" noTextEdit="1"/>
+              </p:cNvSpPr>
+              <p:nvPr/>
+            </p:nvSpPr>
+            <p:spPr>
+              <a:xfrm>
+                <a:off x="7411915" y="2016626"/>
+                <a:ext cx="3872086" cy="646331"/>
+              </a:xfrm>
+              <a:prstGeom prst="rect">
+                <a:avLst/>
+              </a:prstGeom>
+              <a:blipFill>
+                <a:blip r:embed="rId5"/>
+                <a:stretch>
+                  <a:fillRect l="-1417" t="-5660"/>
+                </a:stretch>
+              </a:blipFill>
+            </p:spPr>
+            <p:txBody>
+              <a:bodyPr/>
+              <a:lstStyle/>
+              <a:p>
+                <a:r>
+                  <a:rPr lang="en-US">
+                    <a:noFill/>
+                  </a:rPr>
+                  <a:t> </a:t>
+                </a:r>
+              </a:p>
+            </p:txBody>
+          </p:sp>
+        </mc:Fallback>
+      </mc:AlternateContent>
+      <mc:AlternateContent xmlns:mc="http://schemas.openxmlformats.org/markup-compatibility/2006">
+        <mc:Choice xmlns:a14="http://schemas.microsoft.com/office/drawing/2010/main" Requires="a14">
+          <p:sp>
+            <p:nvSpPr>
+              <p:cNvPr id="9" name="TextBox 8">
+                <a:extLst>
+                  <a:ext uri="{FF2B5EF4-FFF2-40B4-BE49-F238E27FC236}">
+                    <a16:creationId xmlns:a16="http://schemas.microsoft.com/office/drawing/2014/main" id="{ECF5795D-38AA-427D-9577-26FC2ECE58FF}"/>
+                  </a:ext>
+                </a:extLst>
+              </p:cNvPr>
+              <p:cNvSpPr txBox="1"/>
+              <p:nvPr/>
+            </p:nvSpPr>
+            <p:spPr>
+              <a:xfrm>
+                <a:off x="5005215" y="2727783"/>
+                <a:ext cx="1866217" cy="646331"/>
+              </a:xfrm>
+              <a:prstGeom prst="rect">
+                <a:avLst/>
+              </a:prstGeom>
+              <a:noFill/>
+            </p:spPr>
+            <p:txBody>
+              <a:bodyPr wrap="none" rtlCol="0">
+                <a:spAutoFit/>
+              </a:bodyPr>
+              <a:lstStyle/>
+              <a:p>
+                <a:r>
+                  <a:rPr lang="en-US" b="0" dirty="0"/>
+                  <a:t>Learned classifier </a:t>
+                </a:r>
+                <a:br>
+                  <a:rPr lang="en-US" b="0" dirty="0"/>
+                </a:br>
+                <a14:m>
+                  <m:oMathPara xmlns:m="http://schemas.openxmlformats.org/officeDocument/2006/math">
+                    <m:oMathParaPr>
+                      <m:jc m:val="centerGroup"/>
+                    </m:oMathParaPr>
+                    <m:oMath xmlns:m="http://schemas.openxmlformats.org/officeDocument/2006/math">
+                      <m:r>
+                        <a:rPr lang="en-US" b="0" i="1" smtClean="0">
+                          <a:latin typeface="Cambria Math" panose="02040503050406030204" pitchFamily="18" charset="0"/>
+                        </a:rPr>
+                        <m:t>𝑓</m:t>
+                      </m:r>
+                      <m:r>
+                        <a:rPr lang="en-US" b="0" i="1" smtClean="0">
+                          <a:latin typeface="Cambria Math" panose="02040503050406030204" pitchFamily="18" charset="0"/>
+                        </a:rPr>
+                        <m:t>(</m:t>
+                      </m:r>
+                      <m:r>
+                        <a:rPr lang="en-US" b="1" i="1" smtClean="0">
+                          <a:latin typeface="Cambria Math" panose="02040503050406030204" pitchFamily="18" charset="0"/>
+                        </a:rPr>
+                        <m:t>𝒙</m:t>
+                      </m:r>
+                      <m:r>
+                        <a:rPr lang="en-US" b="0" i="1" smtClean="0">
+                          <a:latin typeface="Cambria Math" panose="02040503050406030204" pitchFamily="18" charset="0"/>
+                        </a:rPr>
+                        <m:t>)</m:t>
+                      </m:r>
+                    </m:oMath>
+                  </m:oMathPara>
+                </a14:m>
+                <a:endParaRPr lang="en-US" dirty="0"/>
+              </a:p>
+            </p:txBody>
+          </p:sp>
+        </mc:Choice>
+        <mc:Fallback>
+          <p:sp>
+            <p:nvSpPr>
+              <p:cNvPr id="9" name="TextBox 8">
+                <a:extLst>
+                  <a:ext uri="{FF2B5EF4-FFF2-40B4-BE49-F238E27FC236}">
+                    <a16:creationId xmlns:a16="http://schemas.microsoft.com/office/drawing/2014/main" id="{ECF5795D-38AA-427D-9577-26FC2ECE58FF}"/>
+                  </a:ext>
+                </a:extLst>
+              </p:cNvPr>
+              <p:cNvSpPr txBox="1">
+                <a:spLocks noRot="1" noChangeAspect="1" noMove="1" noResize="1" noEditPoints="1" noAdjustHandles="1" noChangeArrowheads="1" noChangeShapeType="1" noTextEdit="1"/>
+              </p:cNvSpPr>
+              <p:nvPr/>
+            </p:nvSpPr>
+            <p:spPr>
+              <a:xfrm>
+                <a:off x="5005215" y="2727783"/>
+                <a:ext cx="1866217" cy="646331"/>
+              </a:xfrm>
+              <a:prstGeom prst="rect">
+                <a:avLst/>
+              </a:prstGeom>
+              <a:blipFill>
+                <a:blip r:embed="rId6"/>
+                <a:stretch>
+                  <a:fillRect l="-2614" t="-4717" r="-1961" b="-7547"/>
+                </a:stretch>
+              </a:blipFill>
+            </p:spPr>
+            <p:txBody>
+              <a:bodyPr/>
+              <a:lstStyle/>
+              <a:p>
+                <a:r>
+                  <a:rPr lang="en-US">
+                    <a:noFill/>
+                  </a:rPr>
+                  <a:t> </a:t>
+                </a:r>
+              </a:p>
+            </p:txBody>
+          </p:sp>
+        </mc:Fallback>
+      </mc:AlternateContent>
+      <p:sp>
+        <p:nvSpPr>
+          <p:cNvPr id="10" name="TextBox 9">
+            <a:extLst>
+              <a:ext uri="{FF2B5EF4-FFF2-40B4-BE49-F238E27FC236}">
+                <a16:creationId xmlns:a16="http://schemas.microsoft.com/office/drawing/2014/main" id="{AA144721-C5A4-43A6-BE9F-F34964315315}"/>
+              </a:ext>
+            </a:extLst>
+          </p:cNvPr>
           <p:cNvSpPr txBox="1"/>
           <p:nvPr/>
         </p:nvSpPr>
         <p:spPr>
           <a:xfrm>
-            <a:off x="6332770" y="4645612"/>
-            <a:ext cx="5359865" cy="646331"/>
+            <a:off x="5775102" y="1671798"/>
+            <a:ext cx="351378" cy="523220"/>
           </a:xfrm>
           <a:prstGeom prst="rect">
             <a:avLst/>
@@ -8892,22 +9798,31 @@
           <a:lstStyle/>
           <a:p>
             <a:r>
-              <a:rPr lang="en-US" dirty="0"/>
-              <a:t>Training examples</a:t>
-            </a:r>
-          </a:p>
-          <a:p>
-            <a:r>
-              <a:rPr lang="en-US" dirty="0"/>
-              <a:t>Each sample must be labeled by hand who knows truth</a:t>
-            </a:r>
+              <a:rPr lang="en-US" sz="2800" b="1" dirty="0">
+                <a:solidFill>
+                  <a:schemeClr val="accent1">
+                    <a:lumMod val="60000"/>
+                    <a:lumOff val="40000"/>
+                  </a:schemeClr>
+                </a:solidFill>
+              </a:rPr>
+              <a:t>?</a:t>
+            </a:r>
+            <a:endParaRPr lang="en-US" b="1" dirty="0">
+              <a:solidFill>
+                <a:schemeClr val="accent1">
+                  <a:lumMod val="60000"/>
+                  <a:lumOff val="40000"/>
+                </a:schemeClr>
+              </a:solidFill>
+            </a:endParaRPr>
           </a:p>
         </p:txBody>
       </p:sp>
     </p:spTree>
     <p:extLst>
       <p:ext uri="{BB962C8B-B14F-4D97-AF65-F5344CB8AC3E}">
-        <p14:creationId xmlns:p14="http://schemas.microsoft.com/office/powerpoint/2010/main" val="1632895224"/>
+        <p14:creationId xmlns:p14="http://schemas.microsoft.com/office/powerpoint/2010/main" val="2361631645"/>
       </p:ext>
     </p:extLst>
   </p:cSld>
@@ -8936,6 +9851,362 @@
       </p:grpSpPr>
       <p:sp>
         <p:nvSpPr>
+          <p:cNvPr id="2" name="Title 1">
+            <a:extLst>
+              <a:ext uri="{FF2B5EF4-FFF2-40B4-BE49-F238E27FC236}">
+                <a16:creationId xmlns:a16="http://schemas.microsoft.com/office/drawing/2014/main" id="{081F5BCA-428A-47D2-B985-1C5D6236A077}"/>
+              </a:ext>
+            </a:extLst>
+          </p:cNvPr>
+          <p:cNvSpPr>
+            <a:spLocks noGrp="1"/>
+          </p:cNvSpPr>
+          <p:nvPr>
+            <p:ph type="title"/>
+          </p:nvPr>
+        </p:nvSpPr>
+        <p:spPr/>
+        <p:txBody>
+          <a:bodyPr/>
+          <a:lstStyle/>
+          <a:p>
+            <a:r>
+              <a:rPr lang="en-US" dirty="0"/>
+              <a:t>ML Approach Challenges</a:t>
+            </a:r>
+          </a:p>
+        </p:txBody>
+      </p:sp>
+      <mc:AlternateContent xmlns:mc="http://schemas.openxmlformats.org/markup-compatibility/2006">
+        <mc:Choice xmlns:a14="http://schemas.microsoft.com/office/drawing/2010/main" Requires="a14">
+          <p:sp>
+            <p:nvSpPr>
+              <p:cNvPr id="3" name="Content Placeholder 2">
+                <a:extLst>
+                  <a:ext uri="{FF2B5EF4-FFF2-40B4-BE49-F238E27FC236}">
+                    <a16:creationId xmlns:a16="http://schemas.microsoft.com/office/drawing/2014/main" id="{3F8599F5-79E2-4AD4-8C0E-51A2BFDB68CF}"/>
+                  </a:ext>
+                </a:extLst>
+              </p:cNvPr>
+              <p:cNvSpPr>
+                <a:spLocks noGrp="1"/>
+              </p:cNvSpPr>
+              <p:nvPr>
+                <p:ph idx="1"/>
+              </p:nvPr>
+            </p:nvSpPr>
+            <p:spPr/>
+            <p:txBody>
+              <a:bodyPr>
+                <a:normAutofit/>
+              </a:bodyPr>
+              <a:lstStyle/>
+              <a:p>
+                <a:r>
+                  <a:rPr lang="en-US" dirty="0"/>
+                  <a:t>Learned systems do very well on image recognition problems</a:t>
+                </a:r>
+              </a:p>
+              <a:p>
+                <a:pPr lvl="1"/>
+                <a:r>
+                  <a:rPr lang="en-US" dirty="0"/>
+                  <a:t>On digit recognition,  </a:t>
+                </a:r>
+                <a:r>
+                  <a:rPr lang="en-US" dirty="0">
+                    <a:hlinkClick r:id="rId2"/>
+                  </a:rPr>
+                  <a:t>current systems</a:t>
+                </a:r>
+                <a:r>
+                  <a:rPr lang="en-US" dirty="0"/>
+                  <a:t> get &lt;0.21% errors (as of 1/20/2018)</a:t>
+                </a:r>
+              </a:p>
+              <a:p>
+                <a:pPr lvl="1"/>
+                <a:r>
+                  <a:rPr lang="en-US" dirty="0"/>
+                  <a:t>Used widely in commercial systems today (e.g. OCR)</a:t>
+                </a:r>
+              </a:p>
+              <a:p>
+                <a:pPr lvl="1"/>
+                <a:r>
+                  <a:rPr lang="en-US" dirty="0"/>
+                  <a:t>Cannot match this performance with an expert system</a:t>
+                </a:r>
+              </a:p>
+              <a:p>
+                <a:r>
+                  <a:rPr lang="en-US" dirty="0"/>
+                  <a:t>But, there are challenges:</a:t>
+                </a:r>
+              </a:p>
+              <a:p>
+                <a:pPr lvl="1"/>
+                <a:r>
+                  <a:rPr lang="en-US" dirty="0"/>
+                  <a:t>Need labeled data.  Someone has to manually create this.</a:t>
+                </a:r>
+              </a:p>
+              <a:p>
+                <a:pPr lvl="1"/>
+                <a:r>
+                  <a:rPr lang="en-US" dirty="0"/>
+                  <a:t>How do we search over a set of functions </a:t>
+                </a:r>
+                <a14:m>
+                  <m:oMath xmlns:m="http://schemas.openxmlformats.org/officeDocument/2006/math">
+                    <m:r>
+                      <a:rPr lang="en-US" i="1">
+                        <a:latin typeface="Cambria Math" panose="02040503050406030204" pitchFamily="18" charset="0"/>
+                      </a:rPr>
+                      <m:t>𝑓</m:t>
+                    </m:r>
+                    <m:r>
+                      <a:rPr lang="en-US" i="1">
+                        <a:latin typeface="Cambria Math" panose="02040503050406030204" pitchFamily="18" charset="0"/>
+                      </a:rPr>
+                      <m:t>(</m:t>
+                    </m:r>
+                    <m:r>
+                      <a:rPr lang="en-US" b="1" i="1">
+                        <a:latin typeface="Cambria Math" panose="02040503050406030204" pitchFamily="18" charset="0"/>
+                      </a:rPr>
+                      <m:t>𝒙</m:t>
+                    </m:r>
+                    <m:r>
+                      <a:rPr lang="en-US" i="1">
+                        <a:latin typeface="Cambria Math" panose="02040503050406030204" pitchFamily="18" charset="0"/>
+                      </a:rPr>
+                      <m:t>)</m:t>
+                    </m:r>
+                  </m:oMath>
+                </a14:m>
+                <a:r>
+                  <a:rPr lang="en-US" dirty="0"/>
+                  <a:t>?</a:t>
+                </a:r>
+              </a:p>
+              <a:p>
+                <a:pPr lvl="1"/>
+                <a:r>
+                  <a:rPr lang="en-US" dirty="0"/>
+                  <a:t>If a function works on training example, will it work on new data?</a:t>
+                </a:r>
+              </a:p>
+              <a:p>
+                <a:r>
+                  <a:rPr lang="en-US" dirty="0"/>
+                  <a:t>Some things you will learn in this course</a:t>
+                </a:r>
+              </a:p>
+              <a:p>
+                <a:pPr lvl="1"/>
+                <a:r>
+                  <a:rPr lang="en-US" dirty="0"/>
+                  <a:t>How to </a:t>
+                </a:r>
+                <a:r>
+                  <a:rPr lang="en-US" dirty="0">
+                    <a:solidFill>
+                      <a:schemeClr val="accent1">
+                        <a:lumMod val="60000"/>
+                        <a:lumOff val="40000"/>
+                      </a:schemeClr>
+                    </a:solidFill>
+                  </a:rPr>
+                  <a:t>parametrize</a:t>
+                </a:r>
+                <a:r>
+                  <a:rPr lang="en-US" dirty="0"/>
+                  <a:t> a set functions</a:t>
+                </a:r>
+              </a:p>
+              <a:p>
+                <a:pPr lvl="1"/>
+                <a:r>
+                  <a:rPr lang="en-US" dirty="0"/>
+                  <a:t>How to </a:t>
+                </a:r>
+                <a:r>
+                  <a:rPr lang="en-US" dirty="0">
+                    <a:solidFill>
+                      <a:schemeClr val="accent1">
+                        <a:lumMod val="60000"/>
+                        <a:lumOff val="40000"/>
+                      </a:schemeClr>
+                    </a:solidFill>
+                  </a:rPr>
+                  <a:t>fit</a:t>
+                </a:r>
+                <a:r>
+                  <a:rPr lang="en-US" dirty="0"/>
+                  <a:t> a function</a:t>
+                </a:r>
+              </a:p>
+              <a:p>
+                <a:pPr lvl="1"/>
+                <a:r>
+                  <a:rPr lang="en-US" dirty="0"/>
+                  <a:t>How to ensure it </a:t>
+                </a:r>
+                <a:r>
+                  <a:rPr lang="en-US" dirty="0">
+                    <a:solidFill>
+                      <a:schemeClr val="accent1">
+                        <a:lumMod val="60000"/>
+                        <a:lumOff val="40000"/>
+                      </a:schemeClr>
+                    </a:solidFill>
+                  </a:rPr>
+                  <a:t>generalizes</a:t>
+                </a:r>
+                <a:r>
+                  <a:rPr lang="en-US" dirty="0"/>
+                  <a:t> to new examples</a:t>
+                </a:r>
+              </a:p>
+              <a:p>
+                <a:pPr lvl="1"/>
+                <a:endParaRPr lang="en-US" dirty="0"/>
+              </a:p>
+            </p:txBody>
+          </p:sp>
+        </mc:Choice>
+        <mc:Fallback>
+          <p:sp>
+            <p:nvSpPr>
+              <p:cNvPr id="3" name="Content Placeholder 2">
+                <a:extLst>
+                  <a:ext uri="{FF2B5EF4-FFF2-40B4-BE49-F238E27FC236}">
+                    <a16:creationId xmlns:a16="http://schemas.microsoft.com/office/drawing/2014/main" id="{3F8599F5-79E2-4AD4-8C0E-51A2BFDB68CF}"/>
+                  </a:ext>
+                </a:extLst>
+              </p:cNvPr>
+              <p:cNvSpPr>
+                <a:spLocks noGrp="1" noRot="1" noChangeAspect="1" noMove="1" noResize="1" noEditPoints="1" noAdjustHandles="1" noChangeArrowheads="1" noChangeShapeType="1" noTextEdit="1"/>
+              </p:cNvSpPr>
+              <p:nvPr>
+                <p:ph idx="1"/>
+              </p:nvPr>
+            </p:nvSpPr>
+            <p:spPr>
+              <a:blipFill>
+                <a:blip r:embed="rId3"/>
+                <a:stretch>
+                  <a:fillRect l="-1455" t="-1549"/>
+                </a:stretch>
+              </a:blipFill>
+            </p:spPr>
+            <p:txBody>
+              <a:bodyPr/>
+              <a:lstStyle/>
+              <a:p>
+                <a:r>
+                  <a:rPr lang="en-US">
+                    <a:noFill/>
+                  </a:rPr>
+                  <a:t> </a:t>
+                </a:r>
+              </a:p>
+            </p:txBody>
+          </p:sp>
+        </mc:Fallback>
+      </mc:AlternateContent>
+      <p:sp>
+        <p:nvSpPr>
+          <p:cNvPr id="4" name="Slide Number Placeholder 3">
+            <a:extLst>
+              <a:ext uri="{FF2B5EF4-FFF2-40B4-BE49-F238E27FC236}">
+                <a16:creationId xmlns:a16="http://schemas.microsoft.com/office/drawing/2014/main" id="{A851A026-F41E-421B-957F-D8F6A7FFEA6E}"/>
+              </a:ext>
+            </a:extLst>
+          </p:cNvPr>
+          <p:cNvSpPr>
+            <a:spLocks noGrp="1"/>
+          </p:cNvSpPr>
+          <p:nvPr>
+            <p:ph type="sldNum" sz="quarter" idx="12"/>
+          </p:nvPr>
+        </p:nvSpPr>
+        <p:spPr/>
+        <p:txBody>
+          <a:bodyPr/>
+          <a:lstStyle/>
+          <a:p>
+            <a:fld id="{629637A9-119A-49DA-BD12-AAC58B377D80}" type="slidenum">
+              <a:rPr lang="en-US" smtClean="0"/>
+              <a:t>8</a:t>
+            </a:fld>
+            <a:endParaRPr lang="en-US" dirty="0"/>
+          </a:p>
+        </p:txBody>
+      </p:sp>
+      <p:pic>
+        <p:nvPicPr>
+          <p:cNvPr id="5" name="Picture 4">
+            <a:extLst>
+              <a:ext uri="{FF2B5EF4-FFF2-40B4-BE49-F238E27FC236}">
+                <a16:creationId xmlns:a16="http://schemas.microsoft.com/office/drawing/2014/main" id="{F4CCFF14-B302-4D06-AE62-17CA0AD725F4}"/>
+              </a:ext>
+            </a:extLst>
+          </p:cNvPr>
+          <p:cNvPicPr>
+            <a:picLocks noChangeAspect="1"/>
+          </p:cNvPicPr>
+          <p:nvPr/>
+        </p:nvPicPr>
+        <p:blipFill>
+          <a:blip r:embed="rId4"/>
+          <a:stretch>
+            <a:fillRect/>
+          </a:stretch>
+        </p:blipFill>
+        <p:spPr>
+          <a:xfrm>
+            <a:off x="8149993" y="2550745"/>
+            <a:ext cx="3409981" cy="2306879"/>
+          </a:xfrm>
+          <a:prstGeom prst="rect">
+            <a:avLst/>
+          </a:prstGeom>
+        </p:spPr>
+      </p:pic>
+    </p:spTree>
+    <p:extLst>
+      <p:ext uri="{BB962C8B-B14F-4D97-AF65-F5344CB8AC3E}">
+        <p14:creationId xmlns:p14="http://schemas.microsoft.com/office/powerpoint/2010/main" val="961105563"/>
+      </p:ext>
+    </p:extLst>
+  </p:cSld>
+  <p:clrMapOvr>
+    <a:masterClrMapping/>
+  </p:clrMapOvr>
+</p:sld>
+</file>
+
+<file path=ppt/slides/slide9.xml><?xml version="1.0" encoding="utf-8"?>
+<p:sld xmlns:a="http://schemas.openxmlformats.org/drawingml/2006/main" xmlns:r="http://schemas.openxmlformats.org/officeDocument/2006/relationships" xmlns:p="http://schemas.openxmlformats.org/presentationml/2006/main">
+  <p:cSld>
+    <p:spTree>
+      <p:nvGrpSpPr>
+        <p:cNvPr id="1" name=""/>
+        <p:cNvGrpSpPr/>
+        <p:nvPr/>
+      </p:nvGrpSpPr>
+      <p:grpSpPr>
+        <a:xfrm>
+          <a:off x="0" y="0"/>
+          <a:ext cx="0" cy="0"/>
+          <a:chOff x="0" y="0"/>
+          <a:chExt cx="0" cy="0"/>
+        </a:xfrm>
+      </p:grpSpPr>
+      <p:sp>
+        <p:nvSpPr>
           <p:cNvPr id="2" name="Title 1"/>
           <p:cNvSpPr>
             <a:spLocks noGrp="1"/>
@@ -9013,7 +10284,7 @@
           <a:p>
             <a:fld id="{629637A9-119A-49DA-BD12-AAC58B377D80}" type="slidenum">
               <a:rPr lang="en-US" smtClean="0"/>
-              <a:t>8</a:t>
+              <a:t>9</a:t>
             </a:fld>
             <a:endParaRPr lang="en-US" dirty="0"/>
           </a:p>
@@ -9047,270 +10318,6 @@
     <p:extLst>
       <p:ext uri="{BB962C8B-B14F-4D97-AF65-F5344CB8AC3E}">
         <p14:creationId xmlns:p14="http://schemas.microsoft.com/office/powerpoint/2010/main" val="2884451023"/>
-      </p:ext>
-    </p:extLst>
-  </p:cSld>
-  <p:clrMapOvr>
-    <a:masterClrMapping/>
-  </p:clrMapOvr>
-</p:sld>
-</file>
-
-<file path=ppt/slides/slide9.xml><?xml version="1.0" encoding="utf-8"?>
-<p:sld xmlns:a="http://schemas.openxmlformats.org/drawingml/2006/main" xmlns:r="http://schemas.openxmlformats.org/officeDocument/2006/relationships" xmlns:p="http://schemas.openxmlformats.org/presentationml/2006/main">
-  <p:cSld>
-    <p:spTree>
-      <p:nvGrpSpPr>
-        <p:cNvPr id="1" name=""/>
-        <p:cNvGrpSpPr/>
-        <p:nvPr/>
-      </p:nvGrpSpPr>
-      <p:grpSpPr>
-        <a:xfrm>
-          <a:off x="0" y="0"/>
-          <a:ext cx="0" cy="0"/>
-          <a:chOff x="0" y="0"/>
-          <a:chExt cx="0" cy="0"/>
-        </a:xfrm>
-      </p:grpSpPr>
-      <p:sp>
-        <p:nvSpPr>
-          <p:cNvPr id="2" name="Title 1"/>
-          <p:cNvSpPr>
-            <a:spLocks noGrp="1"/>
-          </p:cNvSpPr>
-          <p:nvPr>
-            <p:ph type="title"/>
-          </p:nvPr>
-        </p:nvSpPr>
-        <p:spPr/>
-        <p:txBody>
-          <a:bodyPr/>
-          <a:lstStyle/>
-          <a:p>
-            <a:r>
-              <a:rPr lang="en-US" dirty="0"/>
-              <a:t>Training Data</a:t>
-            </a:r>
-          </a:p>
-        </p:txBody>
-      </p:sp>
-      <p:sp>
-        <p:nvSpPr>
-          <p:cNvPr id="3" name="Content Placeholder 2"/>
-          <p:cNvSpPr>
-            <a:spLocks noGrp="1"/>
-          </p:cNvSpPr>
-          <p:nvPr>
-            <p:ph idx="1"/>
-          </p:nvPr>
-        </p:nvSpPr>
-        <p:spPr>
-          <a:xfrm>
-            <a:off x="1097280" y="1539277"/>
-            <a:ext cx="6244424" cy="4329817"/>
-          </a:xfrm>
-        </p:spPr>
-        <p:txBody>
-          <a:bodyPr/>
-          <a:lstStyle/>
-          <a:p>
-            <a:r>
-              <a:rPr lang="en-US" dirty="0"/>
-              <a:t>Typical early face recognition datasets:</a:t>
-            </a:r>
-          </a:p>
-          <a:p>
-            <a:r>
-              <a:rPr lang="en-US" dirty="0"/>
-              <a:t>5000 faces</a:t>
-            </a:r>
-          </a:p>
-          <a:p>
-            <a:pPr lvl="1"/>
-            <a:r>
-              <a:rPr lang="en-US" dirty="0"/>
-              <a:t>All near frontal</a:t>
-            </a:r>
-          </a:p>
-          <a:p>
-            <a:pPr lvl="1"/>
-            <a:r>
-              <a:rPr lang="en-US" dirty="0"/>
-              <a:t>Vary age, race, gender, lighting</a:t>
-            </a:r>
-          </a:p>
-          <a:p>
-            <a:r>
-              <a:rPr lang="en-US" dirty="0"/>
-              <a:t> 10^8 non faces</a:t>
-            </a:r>
-          </a:p>
-          <a:p>
-            <a:r>
-              <a:rPr lang="en-US" dirty="0"/>
-              <a:t>Faces are normalized (scale, translation)</a:t>
-            </a:r>
-          </a:p>
-          <a:p>
-            <a:r>
-              <a:rPr lang="en-US" dirty="0"/>
-              <a:t>“functions” that work well may be very complex</a:t>
-            </a:r>
-          </a:p>
-          <a:p>
-            <a:pPr lvl="1"/>
-            <a:endParaRPr lang="en-US" dirty="0"/>
-          </a:p>
-          <a:p>
-            <a:r>
-              <a:rPr lang="en-US" dirty="0"/>
-              <a:t>Many more datasets are available now:</a:t>
-            </a:r>
-          </a:p>
-          <a:p>
-            <a:pPr lvl="1"/>
-            <a:r>
-              <a:rPr lang="en-US" dirty="0"/>
-              <a:t>See </a:t>
-            </a:r>
-            <a:r>
-              <a:rPr lang="en-US" dirty="0">
-                <a:hlinkClick r:id="rId2"/>
-              </a:rPr>
-              <a:t>http://www.face-rec.org/databases/</a:t>
-            </a:r>
-            <a:endParaRPr lang="en-US" dirty="0"/>
-          </a:p>
-          <a:p>
-            <a:pPr lvl="1"/>
-            <a:r>
-              <a:rPr lang="en-US" dirty="0"/>
-              <a:t>You can use this for your project!</a:t>
-            </a:r>
-          </a:p>
-        </p:txBody>
-      </p:sp>
-      <p:sp>
-        <p:nvSpPr>
-          <p:cNvPr id="4" name="Slide Number Placeholder 3"/>
-          <p:cNvSpPr>
-            <a:spLocks noGrp="1"/>
-          </p:cNvSpPr>
-          <p:nvPr>
-            <p:ph type="sldNum" sz="quarter" idx="12"/>
-          </p:nvPr>
-        </p:nvSpPr>
-        <p:spPr/>
-        <p:txBody>
-          <a:bodyPr/>
-          <a:lstStyle/>
-          <a:p>
-            <a:fld id="{629637A9-119A-49DA-BD12-AAC58B377D80}" type="slidenum">
-              <a:rPr lang="en-US" smtClean="0"/>
-              <a:t>9</a:t>
-            </a:fld>
-            <a:endParaRPr lang="en-US" dirty="0"/>
-          </a:p>
-        </p:txBody>
-      </p:sp>
-      <p:pic>
-        <p:nvPicPr>
-          <p:cNvPr id="5" name="Picture 4"/>
-          <p:cNvPicPr>
-            <a:picLocks noChangeAspect="1"/>
-          </p:cNvPicPr>
-          <p:nvPr/>
-        </p:nvPicPr>
-        <p:blipFill>
-          <a:blip r:embed="rId3"/>
-          <a:stretch>
-            <a:fillRect/>
-          </a:stretch>
-        </p:blipFill>
-        <p:spPr>
-          <a:xfrm>
-            <a:off x="8377093" y="1539277"/>
-            <a:ext cx="2281726" cy="2276819"/>
-          </a:xfrm>
-          <a:prstGeom prst="rect">
-            <a:avLst/>
-          </a:prstGeom>
-        </p:spPr>
-      </p:pic>
-      <p:pic>
-        <p:nvPicPr>
-          <p:cNvPr id="6" name="Picture 5"/>
-          <p:cNvPicPr>
-            <a:picLocks noChangeAspect="1"/>
-          </p:cNvPicPr>
-          <p:nvPr/>
-        </p:nvPicPr>
-        <p:blipFill>
-          <a:blip r:embed="rId4"/>
-          <a:stretch>
-            <a:fillRect/>
-          </a:stretch>
-        </p:blipFill>
-        <p:spPr>
-          <a:xfrm>
-            <a:off x="6694063" y="3965353"/>
-            <a:ext cx="4155083" cy="1494541"/>
-          </a:xfrm>
-          <a:prstGeom prst="rect">
-            <a:avLst/>
-          </a:prstGeom>
-        </p:spPr>
-      </p:pic>
-      <p:sp>
-        <p:nvSpPr>
-          <p:cNvPr id="7" name="TextBox 6"/>
-          <p:cNvSpPr txBox="1"/>
-          <p:nvPr/>
-        </p:nvSpPr>
-        <p:spPr>
-          <a:xfrm>
-            <a:off x="6694063" y="5499762"/>
-            <a:ext cx="3319948" cy="369332"/>
-          </a:xfrm>
-          <a:prstGeom prst="rect">
-            <a:avLst/>
-          </a:prstGeom>
-          <a:noFill/>
-        </p:spPr>
-        <p:txBody>
-          <a:bodyPr wrap="none" rtlCol="0">
-            <a:spAutoFit/>
-          </a:bodyPr>
-          <a:lstStyle/>
-          <a:p>
-            <a:r>
-              <a:rPr lang="en-US" dirty="0"/>
-              <a:t>Rowley, </a:t>
-            </a:r>
-            <a:r>
-              <a:rPr lang="en-US" dirty="0" err="1"/>
-              <a:t>Baluja</a:t>
-            </a:r>
-            <a:r>
-              <a:rPr lang="en-US" dirty="0"/>
-              <a:t> and </a:t>
-            </a:r>
-            <a:r>
-              <a:rPr lang="en-US" dirty="0" err="1"/>
-              <a:t>Kanade</a:t>
-            </a:r>
-            <a:r>
-              <a:rPr lang="en-US" dirty="0"/>
-              <a:t>, 1998 </a:t>
-            </a:r>
-          </a:p>
-        </p:txBody>
-      </p:sp>
-    </p:spTree>
-    <p:extLst>
-      <p:ext uri="{BB962C8B-B14F-4D97-AF65-F5344CB8AC3E}">
-        <p14:creationId xmlns:p14="http://schemas.microsoft.com/office/powerpoint/2010/main" val="3701493468"/>
       </p:ext>
     </p:extLst>
   </p:cSld>

</xml_diff>

<commit_message>
Updated lectures for units 1 and 3
</commit_message>
<xml_diff>
--- a/lectures/Lect01_IntroML.pptx
+++ b/lectures/Lect01_IntroML.pptx
@@ -5,7 +5,7 @@
     <p:sldMasterId id="2147483648" r:id="rId1"/>
   </p:sldMasterIdLst>
   <p:notesMasterIdLst>
-    <p:notesMasterId r:id="rId26"/>
+    <p:notesMasterId r:id="rId27"/>
   </p:notesMasterIdLst>
   <p:sldIdLst>
     <p:sldId id="258" r:id="rId2"/>
@@ -14,24 +14,25 @@
     <p:sldId id="260" r:id="rId5"/>
     <p:sldId id="261" r:id="rId6"/>
     <p:sldId id="281" r:id="rId7"/>
-    <p:sldId id="282" r:id="rId8"/>
-    <p:sldId id="283" r:id="rId9"/>
-    <p:sldId id="263" r:id="rId10"/>
-    <p:sldId id="264" r:id="rId11"/>
-    <p:sldId id="265" r:id="rId12"/>
-    <p:sldId id="266" r:id="rId13"/>
-    <p:sldId id="267" r:id="rId14"/>
-    <p:sldId id="278" r:id="rId15"/>
-    <p:sldId id="268" r:id="rId16"/>
-    <p:sldId id="269" r:id="rId17"/>
-    <p:sldId id="270" r:id="rId18"/>
-    <p:sldId id="272" r:id="rId19"/>
-    <p:sldId id="279" r:id="rId20"/>
-    <p:sldId id="277" r:id="rId21"/>
-    <p:sldId id="280" r:id="rId22"/>
-    <p:sldId id="274" r:id="rId23"/>
-    <p:sldId id="273" r:id="rId24"/>
-    <p:sldId id="276" r:id="rId25"/>
+    <p:sldId id="284" r:id="rId8"/>
+    <p:sldId id="282" r:id="rId9"/>
+    <p:sldId id="283" r:id="rId10"/>
+    <p:sldId id="263" r:id="rId11"/>
+    <p:sldId id="264" r:id="rId12"/>
+    <p:sldId id="265" r:id="rId13"/>
+    <p:sldId id="266" r:id="rId14"/>
+    <p:sldId id="267" r:id="rId15"/>
+    <p:sldId id="278" r:id="rId16"/>
+    <p:sldId id="268" r:id="rId17"/>
+    <p:sldId id="269" r:id="rId18"/>
+    <p:sldId id="270" r:id="rId19"/>
+    <p:sldId id="272" r:id="rId20"/>
+    <p:sldId id="279" r:id="rId21"/>
+    <p:sldId id="277" r:id="rId22"/>
+    <p:sldId id="280" r:id="rId23"/>
+    <p:sldId id="274" r:id="rId24"/>
+    <p:sldId id="273" r:id="rId25"/>
+    <p:sldId id="276" r:id="rId26"/>
   </p:sldIdLst>
   <p:sldSz cx="12192000" cy="6858000"/>
   <p:notesSz cx="7315200" cy="9601200"/>
@@ -231,7 +232,7 @@
           <a:p>
             <a:fld id="{B7D6DDD3-D7E9-488B-B626-1E8285E424D8}" type="datetimeFigureOut">
               <a:rPr lang="en-US" smtClean="0"/>
-              <a:t>9/4/2018</a:t>
+              <a:t>9/9/2018</a:t>
             </a:fld>
             <a:endParaRPr lang="en-US"/>
           </a:p>
@@ -4133,7 +4134,164 @@
           <a:p>
             <a:r>
               <a:rPr lang="en-US" dirty="0"/>
-              <a:t>Training Data</a:t>
+              <a:t>Example 2:  Face Detection</a:t>
+            </a:r>
+          </a:p>
+        </p:txBody>
+      </p:sp>
+      <p:sp>
+        <p:nvSpPr>
+          <p:cNvPr id="3" name="Content Placeholder 2"/>
+          <p:cNvSpPr>
+            <a:spLocks noGrp="1"/>
+          </p:cNvSpPr>
+          <p:nvPr>
+            <p:ph idx="1"/>
+          </p:nvPr>
+        </p:nvSpPr>
+        <p:spPr>
+          <a:xfrm>
+            <a:off x="1097280" y="4032718"/>
+            <a:ext cx="10058400" cy="1668950"/>
+          </a:xfrm>
+        </p:spPr>
+        <p:txBody>
+          <a:bodyPr>
+            <a:normAutofit/>
+          </a:bodyPr>
+          <a:lstStyle/>
+          <a:p>
+            <a:r>
+              <a:rPr lang="en-US" dirty="0">
+                <a:solidFill>
+                  <a:schemeClr val="accent1">
+                    <a:lumMod val="60000"/>
+                    <a:lumOff val="40000"/>
+                  </a:schemeClr>
+                </a:solidFill>
+              </a:rPr>
+              <a:t>Problem</a:t>
+            </a:r>
+            <a:r>
+              <a:rPr lang="en-US" dirty="0"/>
+              <a:t>:  For each image region, determine if face or non-face</a:t>
+            </a:r>
+          </a:p>
+          <a:p>
+            <a:r>
+              <a:rPr lang="en-US" dirty="0"/>
+              <a:t>More challenging than digit recognition</a:t>
+            </a:r>
+          </a:p>
+          <a:p>
+            <a:pPr lvl="1"/>
+            <a:r>
+              <a:rPr lang="en-US" dirty="0"/>
+              <a:t>Even harder to describe a face via “rules” in a robust way</a:t>
+            </a:r>
+          </a:p>
+          <a:p>
+            <a:endParaRPr lang="en-US" dirty="0"/>
+          </a:p>
+        </p:txBody>
+      </p:sp>
+      <p:sp>
+        <p:nvSpPr>
+          <p:cNvPr id="4" name="Slide Number Placeholder 3"/>
+          <p:cNvSpPr>
+            <a:spLocks noGrp="1"/>
+          </p:cNvSpPr>
+          <p:nvPr>
+            <p:ph type="sldNum" sz="quarter" idx="12"/>
+          </p:nvPr>
+        </p:nvSpPr>
+        <p:spPr/>
+        <p:txBody>
+          <a:bodyPr/>
+          <a:lstStyle/>
+          <a:p>
+            <a:fld id="{629637A9-119A-49DA-BD12-AAC58B377D80}" type="slidenum">
+              <a:rPr lang="en-US" smtClean="0"/>
+              <a:t>10</a:t>
+            </a:fld>
+            <a:endParaRPr lang="en-US" dirty="0"/>
+          </a:p>
+        </p:txBody>
+      </p:sp>
+      <p:pic>
+        <p:nvPicPr>
+          <p:cNvPr id="5" name="Picture 4"/>
+          <p:cNvPicPr>
+            <a:picLocks noChangeAspect="1"/>
+          </p:cNvPicPr>
+          <p:nvPr/>
+        </p:nvPicPr>
+        <p:blipFill>
+          <a:blip r:embed="rId2"/>
+          <a:stretch>
+            <a:fillRect/>
+          </a:stretch>
+        </p:blipFill>
+        <p:spPr>
+          <a:xfrm>
+            <a:off x="1269379" y="1643491"/>
+            <a:ext cx="6974506" cy="2219518"/>
+          </a:xfrm>
+          <a:prstGeom prst="rect">
+            <a:avLst/>
+          </a:prstGeom>
+        </p:spPr>
+      </p:pic>
+    </p:spTree>
+    <p:extLst>
+      <p:ext uri="{BB962C8B-B14F-4D97-AF65-F5344CB8AC3E}">
+        <p14:creationId xmlns:p14="http://schemas.microsoft.com/office/powerpoint/2010/main" val="2884451023"/>
+      </p:ext>
+    </p:extLst>
+  </p:cSld>
+  <p:clrMapOvr>
+    <a:masterClrMapping/>
+  </p:clrMapOvr>
+</p:sld>
+</file>
+
+<file path=ppt/slides/slide11.xml><?xml version="1.0" encoding="utf-8"?>
+<p:sld xmlns:a="http://schemas.openxmlformats.org/drawingml/2006/main" xmlns:r="http://schemas.openxmlformats.org/officeDocument/2006/relationships" xmlns:p="http://schemas.openxmlformats.org/presentationml/2006/main">
+  <p:cSld>
+    <p:spTree>
+      <p:nvGrpSpPr>
+        <p:cNvPr id="1" name=""/>
+        <p:cNvGrpSpPr/>
+        <p:nvPr/>
+      </p:nvGrpSpPr>
+      <p:grpSpPr>
+        <a:xfrm>
+          <a:off x="0" y="0"/>
+          <a:ext cx="0" cy="0"/>
+          <a:chOff x="0" y="0"/>
+          <a:chExt cx="0" cy="0"/>
+        </a:xfrm>
+      </p:grpSpPr>
+      <p:sp>
+        <p:nvSpPr>
+          <p:cNvPr id="2" name="Title 1"/>
+          <p:cNvSpPr>
+            <a:spLocks noGrp="1"/>
+          </p:cNvSpPr>
+          <p:nvPr>
+            <p:ph type="title"/>
+          </p:nvPr>
+        </p:nvSpPr>
+        <p:spPr/>
+        <p:txBody>
+          <a:bodyPr>
+            <a:normAutofit/>
+          </a:bodyPr>
+          <a:lstStyle/>
+          <a:p>
+            <a:r>
+              <a:rPr lang="en-US" dirty="0"/>
+              <a:t>Supervised Learning Approach</a:t>
             </a:r>
           </a:p>
         </p:txBody>
@@ -4155,41 +4313,49 @@
           </a:xfrm>
         </p:spPr>
         <p:txBody>
-          <a:bodyPr/>
+          <a:bodyPr>
+            <a:normAutofit fontScale="92500" lnSpcReduction="10000"/>
+          </a:bodyPr>
           <a:lstStyle/>
           <a:p>
             <a:r>
-              <a:rPr lang="en-US" dirty="0"/>
-              <a:t>Typical early face recognition datasets:</a:t>
-            </a:r>
-          </a:p>
-          <a:p>
-            <a:r>
-              <a:rPr lang="en-US" dirty="0"/>
-              <a:t>5000 faces</a:t>
+              <a:rPr lang="en-US" dirty="0">
+                <a:solidFill>
+                  <a:schemeClr val="accent1">
+                    <a:lumMod val="60000"/>
+                    <a:lumOff val="40000"/>
+                  </a:schemeClr>
+                </a:solidFill>
+              </a:rPr>
+              <a:t>Data:</a:t>
+            </a:r>
+            <a:r>
+              <a:rPr lang="en-US" dirty="0"/>
+              <a:t>  Get large number of face and non-face examples</a:t>
+            </a:r>
+          </a:p>
+          <a:p>
+            <a:r>
+              <a:rPr lang="en-US" dirty="0"/>
+              <a:t>Typical early dataset </a:t>
             </a:r>
           </a:p>
           <a:p>
             <a:pPr lvl="1"/>
             <a:r>
               <a:rPr lang="en-US" dirty="0"/>
-              <a:t>All near frontal</a:t>
+              <a:t>5000 faces (all near frontal, vary age, race, gender, lighting)</a:t>
             </a:r>
           </a:p>
           <a:p>
             <a:pPr lvl="1"/>
             <a:r>
               <a:rPr lang="en-US" dirty="0"/>
-              <a:t>Vary age, race, gender, lighting</a:t>
-            </a:r>
-          </a:p>
-          <a:p>
-            <a:r>
-              <a:rPr lang="en-US" dirty="0"/>
               <a:t> 10^8 non faces</a:t>
             </a:r>
           </a:p>
           <a:p>
+            <a:pPr lvl="1"/>
             <a:r>
               <a:rPr lang="en-US" dirty="0"/>
               <a:t>Faces are normalized (scale, translation)</a:t>
@@ -4197,13 +4363,74 @@
           </a:p>
           <a:p>
             <a:r>
-              <a:rPr lang="en-US" dirty="0"/>
-              <a:t>“functions” that work well may be very complex</a:t>
+              <a:rPr lang="en-US" dirty="0">
+                <a:solidFill>
+                  <a:schemeClr val="accent1">
+                    <a:lumMod val="60000"/>
+                    <a:lumOff val="40000"/>
+                  </a:schemeClr>
+                </a:solidFill>
+              </a:rPr>
+              <a:t>Learn</a:t>
+            </a:r>
+            <a:r>
+              <a:rPr lang="en-US" dirty="0"/>
+              <a:t> a classifier from a </a:t>
+            </a:r>
+            <a:r>
+              <a:rPr lang="en-US" dirty="0">
+                <a:solidFill>
+                  <a:schemeClr val="accent1">
+                    <a:lumMod val="60000"/>
+                    <a:lumOff val="40000"/>
+                  </a:schemeClr>
+                </a:solidFill>
+              </a:rPr>
+              <a:t>class</a:t>
+            </a:r>
+            <a:r>
+              <a:rPr lang="en-US" dirty="0"/>
+              <a:t> of functions </a:t>
             </a:r>
           </a:p>
           <a:p>
             <a:pPr lvl="1"/>
-            <a:endParaRPr lang="en-US" dirty="0"/>
+            <a:r>
+              <a:rPr lang="en-US" dirty="0"/>
+              <a:t>Each function maps image to binary value “face” or “non-face”</a:t>
+            </a:r>
+          </a:p>
+          <a:p>
+            <a:pPr lvl="1"/>
+            <a:r>
+              <a:rPr lang="en-US" dirty="0"/>
+              <a:t>Select function that works well on training data</a:t>
+            </a:r>
+          </a:p>
+          <a:p>
+            <a:pPr lvl="1"/>
+            <a:r>
+              <a:rPr lang="en-US" dirty="0"/>
+              <a:t>For good performance, functions may be complex</a:t>
+            </a:r>
+          </a:p>
+          <a:p>
+            <a:pPr lvl="1"/>
+            <a:r>
+              <a:rPr lang="en-US" dirty="0"/>
+              <a:t>Many </a:t>
+            </a:r>
+            <a:r>
+              <a:rPr lang="en-US" dirty="0">
+                <a:solidFill>
+                  <a:schemeClr val="accent1">
+                    <a:lumMod val="60000"/>
+                    <a:lumOff val="40000"/>
+                  </a:schemeClr>
+                </a:solidFill>
+              </a:rPr>
+              <a:t>parameters</a:t>
+            </a:r>
           </a:p>
           <a:p>
             <a:r>
@@ -4251,7 +4478,7 @@
           <a:p>
             <a:fld id="{629637A9-119A-49DA-BD12-AAC58B377D80}" type="slidenum">
               <a:rPr lang="en-US" smtClean="0"/>
-              <a:t>10</a:t>
+              <a:t>11</a:t>
             </a:fld>
             <a:endParaRPr lang="en-US" dirty="0"/>
           </a:p>
@@ -4363,7 +4590,7 @@
 </p:sld>
 </file>
 
-<file path=ppt/slides/slide11.xml><?xml version="1.0" encoding="utf-8"?>
+<file path=ppt/slides/slide12.xml><?xml version="1.0" encoding="utf-8"?>
 <p:sld xmlns:a="http://schemas.openxmlformats.org/drawingml/2006/main" xmlns:r="http://schemas.openxmlformats.org/officeDocument/2006/relationships" xmlns:p="http://schemas.openxmlformats.org/presentationml/2006/main">
   <p:cSld>
     <p:spTree>
@@ -4632,7 +4859,7 @@
           <a:p>
             <a:fld id="{629637A9-119A-49DA-BD12-AAC58B377D80}" type="slidenum">
               <a:rPr lang="en-US" smtClean="0"/>
-              <a:t>11</a:t>
+              <a:t>12</a:t>
             </a:fld>
             <a:endParaRPr lang="en-US" dirty="0"/>
           </a:p>
@@ -4675,7 +4902,7 @@
 </p:sld>
 </file>
 
-<file path=ppt/slides/slide12.xml><?xml version="1.0" encoding="utf-8"?>
+<file path=ppt/slides/slide13.xml><?xml version="1.0" encoding="utf-8"?>
 <p:sld xmlns:a="http://schemas.openxmlformats.org/drawingml/2006/main" xmlns:r="http://schemas.openxmlformats.org/officeDocument/2006/relationships" xmlns:p="http://schemas.openxmlformats.org/presentationml/2006/main">
   <p:cSld>
     <p:spTree>
@@ -4773,7 +5000,7 @@
           <a:p>
             <a:fld id="{629637A9-119A-49DA-BD12-AAC58B377D80}" type="slidenum">
               <a:rPr lang="en-US" smtClean="0"/>
-              <a:t>12</a:t>
+              <a:t>13</a:t>
             </a:fld>
             <a:endParaRPr lang="en-US" dirty="0"/>
           </a:p>
@@ -4816,210 +5043,6 @@
 </p:sld>
 </file>
 
-<file path=ppt/slides/slide13.xml><?xml version="1.0" encoding="utf-8"?>
-<p:sld xmlns:a="http://schemas.openxmlformats.org/drawingml/2006/main" xmlns:r="http://schemas.openxmlformats.org/officeDocument/2006/relationships" xmlns:p="http://schemas.openxmlformats.org/presentationml/2006/main">
-  <p:cSld>
-    <p:spTree>
-      <p:nvGrpSpPr>
-        <p:cNvPr id="1" name=""/>
-        <p:cNvGrpSpPr/>
-        <p:nvPr/>
-      </p:nvGrpSpPr>
-      <p:grpSpPr>
-        <a:xfrm>
-          <a:off x="0" y="0"/>
-          <a:ext cx="0" cy="0"/>
-          <a:chOff x="0" y="0"/>
-          <a:chExt cx="0" cy="0"/>
-        </a:xfrm>
-      </p:grpSpPr>
-      <p:sp>
-        <p:nvSpPr>
-          <p:cNvPr id="2" name="Title 1"/>
-          <p:cNvSpPr>
-            <a:spLocks noGrp="1"/>
-          </p:cNvSpPr>
-          <p:nvPr>
-            <p:ph type="title"/>
-          </p:nvPr>
-        </p:nvSpPr>
-        <p:spPr/>
-        <p:txBody>
-          <a:bodyPr/>
-          <a:lstStyle/>
-          <a:p>
-            <a:r>
-              <a:rPr lang="en-US" dirty="0"/>
-              <a:t>Machine Learning in Many Fields</a:t>
-            </a:r>
-          </a:p>
-        </p:txBody>
-      </p:sp>
-      <p:sp>
-        <p:nvSpPr>
-          <p:cNvPr id="3" name="Content Placeholder 2"/>
-          <p:cNvSpPr>
-            <a:spLocks noGrp="1"/>
-          </p:cNvSpPr>
-          <p:nvPr>
-            <p:ph idx="1"/>
-          </p:nvPr>
-        </p:nvSpPr>
-        <p:spPr/>
-        <p:txBody>
-          <a:bodyPr/>
-          <a:lstStyle/>
-          <a:p>
-            <a:r>
-              <a:rPr lang="tr-TR" dirty="0">
-                <a:solidFill>
-                  <a:schemeClr val="accent1"/>
-                </a:solidFill>
-              </a:rPr>
-              <a:t>Retail:</a:t>
-            </a:r>
-            <a:r>
-              <a:rPr lang="tr-TR" dirty="0"/>
-              <a:t> </a:t>
-            </a:r>
-            <a:r>
-              <a:rPr lang="tr-TR" dirty="0">
-                <a:solidFill>
-                  <a:schemeClr val="tx2"/>
-                </a:solidFill>
-              </a:rPr>
-              <a:t>Market basket analysis, Customer relationship management (CRM)</a:t>
-            </a:r>
-          </a:p>
-          <a:p>
-            <a:r>
-              <a:rPr lang="tr-TR" dirty="0">
-                <a:solidFill>
-                  <a:schemeClr val="accent1"/>
-                </a:solidFill>
-              </a:rPr>
-              <a:t>Finance:</a:t>
-            </a:r>
-            <a:r>
-              <a:rPr lang="tr-TR" dirty="0"/>
-              <a:t> Credit scoring, fraud detection</a:t>
-            </a:r>
-          </a:p>
-          <a:p>
-            <a:r>
-              <a:rPr lang="tr-TR" dirty="0">
-                <a:solidFill>
-                  <a:schemeClr val="accent1"/>
-                </a:solidFill>
-              </a:rPr>
-              <a:t>Manufacturing: </a:t>
-            </a:r>
-            <a:r>
-              <a:rPr lang="tr-TR" dirty="0"/>
-              <a:t>Control, robotics, troubleshooting</a:t>
-            </a:r>
-          </a:p>
-          <a:p>
-            <a:r>
-              <a:rPr lang="tr-TR" dirty="0">
-                <a:solidFill>
-                  <a:schemeClr val="accent1"/>
-                </a:solidFill>
-              </a:rPr>
-              <a:t>Medicine: </a:t>
-            </a:r>
-            <a:r>
-              <a:rPr lang="tr-TR" dirty="0"/>
-              <a:t>Medical diagnosis</a:t>
-            </a:r>
-          </a:p>
-          <a:p>
-            <a:r>
-              <a:rPr lang="tr-TR" dirty="0">
-                <a:solidFill>
-                  <a:schemeClr val="accent1"/>
-                </a:solidFill>
-              </a:rPr>
-              <a:t>Telecommunications:</a:t>
-            </a:r>
-            <a:r>
-              <a:rPr lang="tr-TR" dirty="0"/>
-              <a:t> Spam filters, intrusion detection</a:t>
-            </a:r>
-          </a:p>
-          <a:p>
-            <a:r>
-              <a:rPr lang="tr-TR" dirty="0">
-                <a:solidFill>
-                  <a:schemeClr val="accent1"/>
-                </a:solidFill>
-              </a:rPr>
-              <a:t>Bioinformatics: </a:t>
-            </a:r>
-            <a:r>
-              <a:rPr lang="tr-TR" dirty="0"/>
-              <a:t>Motifs, alignment</a:t>
-            </a:r>
-          </a:p>
-          <a:p>
-            <a:r>
-              <a:rPr lang="tr-TR" dirty="0">
-                <a:solidFill>
-                  <a:schemeClr val="accent1"/>
-                </a:solidFill>
-              </a:rPr>
-              <a:t>Web mining: </a:t>
-            </a:r>
-            <a:r>
-              <a:rPr lang="tr-TR" dirty="0"/>
-              <a:t>Search engines</a:t>
-            </a:r>
-          </a:p>
-          <a:p>
-            <a:r>
-              <a:rPr lang="tr-TR" dirty="0"/>
-              <a:t>...</a:t>
-            </a:r>
-            <a:endParaRPr lang="en-US" dirty="0"/>
-          </a:p>
-        </p:txBody>
-      </p:sp>
-      <p:sp>
-        <p:nvSpPr>
-          <p:cNvPr id="4" name="Slide Number Placeholder 3"/>
-          <p:cNvSpPr>
-            <a:spLocks noGrp="1"/>
-          </p:cNvSpPr>
-          <p:nvPr>
-            <p:ph type="sldNum" sz="quarter" idx="12"/>
-          </p:nvPr>
-        </p:nvSpPr>
-        <p:spPr/>
-        <p:txBody>
-          <a:bodyPr/>
-          <a:lstStyle/>
-          <a:p>
-            <a:fld id="{629637A9-119A-49DA-BD12-AAC58B377D80}" type="slidenum">
-              <a:rPr lang="en-US" smtClean="0"/>
-              <a:t>13</a:t>
-            </a:fld>
-            <a:endParaRPr lang="en-US" dirty="0"/>
-          </a:p>
-        </p:txBody>
-      </p:sp>
-    </p:spTree>
-    <p:extLst>
-      <p:ext uri="{BB962C8B-B14F-4D97-AF65-F5344CB8AC3E}">
-        <p14:creationId xmlns:p14="http://schemas.microsoft.com/office/powerpoint/2010/main" val="3172369853"/>
-      </p:ext>
-    </p:extLst>
-  </p:cSld>
-  <p:clrMapOvr>
-    <a:masterClrMapping/>
-  </p:clrMapOvr>
-</p:sld>
-</file>
-
 <file path=ppt/slides/slide14.xml><?xml version="1.0" encoding="utf-8"?>
 <p:sld xmlns:a="http://schemas.openxmlformats.org/drawingml/2006/main" xmlns:r="http://schemas.openxmlformats.org/officeDocument/2006/relationships" xmlns:p="http://schemas.openxmlformats.org/presentationml/2006/main">
   <p:cSld>
@@ -5054,7 +5077,7 @@
           <a:p>
             <a:r>
               <a:rPr lang="en-US" dirty="0"/>
-              <a:t>Outline</a:t>
+              <a:t>Machine Learning in Many Fields</a:t>
             </a:r>
           </a:p>
         </p:txBody>
@@ -5075,77 +5098,115 @@
           <a:lstStyle/>
           <a:p>
             <a:r>
-              <a:rPr lang="en-US" dirty="0"/>
-              <a:t>What is Machine Learning?</a:t>
-            </a:r>
-          </a:p>
-          <a:p>
-            <a:r>
-              <a:rPr lang="en-US" dirty="0"/>
-              <a:t>Types of machine learning algorithms</a:t>
-            </a:r>
-          </a:p>
-          <a:p>
-            <a:pPr lvl="1"/>
-            <a:r>
-              <a:rPr lang="en-US" dirty="0"/>
-              <a:t>Classification</a:t>
-            </a:r>
-          </a:p>
-          <a:p>
-            <a:pPr lvl="1"/>
-            <a:r>
-              <a:rPr lang="en-US" dirty="0"/>
-              <a:t>Regression</a:t>
-            </a:r>
-          </a:p>
-          <a:p>
-            <a:pPr lvl="1"/>
-            <a:r>
-              <a:rPr lang="en-US" dirty="0"/>
-              <a:t>Unsupervised learning</a:t>
-            </a:r>
-          </a:p>
-          <a:p>
-            <a:r>
-              <a:rPr lang="en-US" dirty="0"/>
-              <a:t>Why the hype today?</a:t>
-            </a:r>
-          </a:p>
-          <a:p>
-            <a:pPr lvl="1"/>
-            <a:endParaRPr lang="en-US" dirty="0"/>
-          </a:p>
-          <a:p>
-            <a:r>
-              <a:rPr lang="en-US" dirty="0"/>
-              <a:t>Some slides from:</a:t>
-            </a:r>
-          </a:p>
-          <a:p>
-            <a:pPr lvl="1"/>
-            <a:r>
-              <a:rPr lang="en-US" dirty="0"/>
-              <a:t>A. Zisserman, “Machine Learning Introduction”</a:t>
-            </a:r>
-          </a:p>
-          <a:p>
-            <a:pPr lvl="1"/>
-            <a:r>
-              <a:rPr lang="en-US" dirty="0"/>
+              <a:rPr lang="tr-TR" dirty="0">
+                <a:solidFill>
+                  <a:schemeClr val="accent1"/>
+                </a:solidFill>
+              </a:rPr>
+              <a:t>Retail:</a:t>
+            </a:r>
+            <a:r>
+              <a:rPr lang="tr-TR" dirty="0"/>
               <a:t> </a:t>
             </a:r>
             <a:r>
-              <a:rPr lang="en-US" dirty="0" err="1"/>
-              <a:t>Alpaydin</a:t>
-            </a:r>
-            <a:r>
-              <a:rPr lang="en-US" dirty="0"/>
-              <a:t>, “Introduction to Machine Learning”</a:t>
-            </a:r>
-          </a:p>
-          <a:p>
-            <a:pPr lvl="1"/>
+              <a:rPr lang="tr-TR" dirty="0">
+                <a:solidFill>
+                  <a:schemeClr val="tx2"/>
+                </a:solidFill>
+              </a:rPr>
+              <a:t>Market basket analysis, Customer relationship management (CRM)</a:t>
+            </a:r>
+          </a:p>
+          <a:p>
+            <a:r>
+              <a:rPr lang="tr-TR" dirty="0">
+                <a:solidFill>
+                  <a:schemeClr val="accent1"/>
+                </a:solidFill>
+              </a:rPr>
+              <a:t>Finance:</a:t>
+            </a:r>
+            <a:r>
+              <a:rPr lang="tr-TR" dirty="0"/>
+              <a:t> Credit scoring, fraud detection</a:t>
+            </a:r>
+          </a:p>
+          <a:p>
+            <a:r>
+              <a:rPr lang="tr-TR" dirty="0">
+                <a:solidFill>
+                  <a:schemeClr val="accent1"/>
+                </a:solidFill>
+              </a:rPr>
+              <a:t>Manufacturing: </a:t>
+            </a:r>
+            <a:r>
+              <a:rPr lang="tr-TR" dirty="0"/>
+              <a:t>Control, robotics, troubleshooting</a:t>
+            </a:r>
+          </a:p>
+          <a:p>
+            <a:r>
+              <a:rPr lang="tr-TR" dirty="0">
+                <a:solidFill>
+                  <a:schemeClr val="accent1"/>
+                </a:solidFill>
+              </a:rPr>
+              <a:t>Medicine: </a:t>
+            </a:r>
+            <a:r>
+              <a:rPr lang="tr-TR" dirty="0"/>
+              <a:t>Medical diagnosis</a:t>
+            </a:r>
+          </a:p>
+          <a:p>
+            <a:r>
+              <a:rPr lang="tr-TR" dirty="0">
+                <a:solidFill>
+                  <a:schemeClr val="accent1"/>
+                </a:solidFill>
+              </a:rPr>
+              <a:t>Telecommunications:</a:t>
+            </a:r>
+            <a:r>
+              <a:rPr lang="tr-TR" dirty="0"/>
+              <a:t> Spam filters, intrusion detection</a:t>
+            </a:r>
+          </a:p>
+          <a:p>
+            <a:r>
+              <a:rPr lang="tr-TR" dirty="0">
+                <a:solidFill>
+                  <a:schemeClr val="accent1"/>
+                </a:solidFill>
+              </a:rPr>
+              <a:t>Bioinformatics: </a:t>
+            </a:r>
+            <a:r>
+              <a:rPr lang="tr-TR" dirty="0"/>
+              <a:t>Motifs, alignment</a:t>
+            </a:r>
+          </a:p>
+          <a:p>
+            <a:r>
+              <a:rPr lang="tr-TR" dirty="0">
+                <a:solidFill>
+                  <a:schemeClr val="accent1"/>
+                </a:solidFill>
+              </a:rPr>
+              <a:t>Web mining: </a:t>
+            </a:r>
+            <a:r>
+              <a:rPr lang="tr-TR" dirty="0"/>
+              <a:t>Search engines</a:t>
+            </a:r>
+          </a:p>
+          <a:p>
+            <a:r>
+              <a:rPr lang="tr-TR" dirty="0"/>
+              <a:t>...</a:t>
+            </a:r>
             <a:endParaRPr lang="en-US" dirty="0"/>
           </a:p>
         </p:txBody>
@@ -5168,6 +5229,172 @@
             <a:fld id="{629637A9-119A-49DA-BD12-AAC58B377D80}" type="slidenum">
               <a:rPr lang="en-US" smtClean="0"/>
               <a:t>14</a:t>
+            </a:fld>
+            <a:endParaRPr lang="en-US" dirty="0"/>
+          </a:p>
+        </p:txBody>
+      </p:sp>
+    </p:spTree>
+    <p:extLst>
+      <p:ext uri="{BB962C8B-B14F-4D97-AF65-F5344CB8AC3E}">
+        <p14:creationId xmlns:p14="http://schemas.microsoft.com/office/powerpoint/2010/main" val="3172369853"/>
+      </p:ext>
+    </p:extLst>
+  </p:cSld>
+  <p:clrMapOvr>
+    <a:masterClrMapping/>
+  </p:clrMapOvr>
+</p:sld>
+</file>
+
+<file path=ppt/slides/slide15.xml><?xml version="1.0" encoding="utf-8"?>
+<p:sld xmlns:a="http://schemas.openxmlformats.org/drawingml/2006/main" xmlns:r="http://schemas.openxmlformats.org/officeDocument/2006/relationships" xmlns:p="http://schemas.openxmlformats.org/presentationml/2006/main">
+  <p:cSld>
+    <p:spTree>
+      <p:nvGrpSpPr>
+        <p:cNvPr id="1" name=""/>
+        <p:cNvGrpSpPr/>
+        <p:nvPr/>
+      </p:nvGrpSpPr>
+      <p:grpSpPr>
+        <a:xfrm>
+          <a:off x="0" y="0"/>
+          <a:ext cx="0" cy="0"/>
+          <a:chOff x="0" y="0"/>
+          <a:chExt cx="0" cy="0"/>
+        </a:xfrm>
+      </p:grpSpPr>
+      <p:sp>
+        <p:nvSpPr>
+          <p:cNvPr id="2" name="Title 1"/>
+          <p:cNvSpPr>
+            <a:spLocks noGrp="1"/>
+          </p:cNvSpPr>
+          <p:nvPr>
+            <p:ph type="title"/>
+          </p:nvPr>
+        </p:nvSpPr>
+        <p:spPr/>
+        <p:txBody>
+          <a:bodyPr/>
+          <a:lstStyle/>
+          <a:p>
+            <a:r>
+              <a:rPr lang="en-US" dirty="0"/>
+              <a:t>Outline</a:t>
+            </a:r>
+          </a:p>
+        </p:txBody>
+      </p:sp>
+      <p:sp>
+        <p:nvSpPr>
+          <p:cNvPr id="3" name="Content Placeholder 2"/>
+          <p:cNvSpPr>
+            <a:spLocks noGrp="1"/>
+          </p:cNvSpPr>
+          <p:nvPr>
+            <p:ph idx="1"/>
+          </p:nvPr>
+        </p:nvSpPr>
+        <p:spPr/>
+        <p:txBody>
+          <a:bodyPr/>
+          <a:lstStyle/>
+          <a:p>
+            <a:r>
+              <a:rPr lang="en-US" dirty="0"/>
+              <a:t>What is Machine Learning?</a:t>
+            </a:r>
+          </a:p>
+          <a:p>
+            <a:r>
+              <a:rPr lang="en-US" dirty="0"/>
+              <a:t>Types of machine learning algorithms</a:t>
+            </a:r>
+          </a:p>
+          <a:p>
+            <a:pPr lvl="1"/>
+            <a:r>
+              <a:rPr lang="en-US" dirty="0"/>
+              <a:t>Classification</a:t>
+            </a:r>
+          </a:p>
+          <a:p>
+            <a:pPr lvl="1"/>
+            <a:r>
+              <a:rPr lang="en-US" dirty="0"/>
+              <a:t>Regression</a:t>
+            </a:r>
+          </a:p>
+          <a:p>
+            <a:pPr lvl="1"/>
+            <a:r>
+              <a:rPr lang="en-US" dirty="0"/>
+              <a:t>Unsupervised learning</a:t>
+            </a:r>
+          </a:p>
+          <a:p>
+            <a:r>
+              <a:rPr lang="en-US" dirty="0"/>
+              <a:t>Why the hype today?</a:t>
+            </a:r>
+          </a:p>
+          <a:p>
+            <a:pPr lvl="1"/>
+            <a:endParaRPr lang="en-US" dirty="0"/>
+          </a:p>
+          <a:p>
+            <a:r>
+              <a:rPr lang="en-US" dirty="0"/>
+              <a:t>Some slides from:</a:t>
+            </a:r>
+          </a:p>
+          <a:p>
+            <a:pPr lvl="1"/>
+            <a:r>
+              <a:rPr lang="en-US" dirty="0"/>
+              <a:t>A. Zisserman, “Machine Learning Introduction”</a:t>
+            </a:r>
+          </a:p>
+          <a:p>
+            <a:pPr lvl="1"/>
+            <a:r>
+              <a:rPr lang="en-US" dirty="0"/>
+              <a:t> </a:t>
+            </a:r>
+            <a:r>
+              <a:rPr lang="en-US" dirty="0" err="1"/>
+              <a:t>Alpaydin</a:t>
+            </a:r>
+            <a:r>
+              <a:rPr lang="en-US" dirty="0"/>
+              <a:t>, “Introduction to Machine Learning”</a:t>
+            </a:r>
+          </a:p>
+          <a:p>
+            <a:pPr lvl="1"/>
+            <a:endParaRPr lang="en-US" dirty="0"/>
+          </a:p>
+        </p:txBody>
+      </p:sp>
+      <p:sp>
+        <p:nvSpPr>
+          <p:cNvPr id="4" name="Slide Number Placeholder 3"/>
+          <p:cNvSpPr>
+            <a:spLocks noGrp="1"/>
+          </p:cNvSpPr>
+          <p:nvPr>
+            <p:ph type="sldNum" sz="quarter" idx="12"/>
+          </p:nvPr>
+        </p:nvSpPr>
+        <p:spPr/>
+        <p:txBody>
+          <a:bodyPr/>
+          <a:lstStyle/>
+          <a:p>
+            <a:fld id="{629637A9-119A-49DA-BD12-AAC58B377D80}" type="slidenum">
+              <a:rPr lang="en-US" smtClean="0"/>
+              <a:t>15</a:t>
             </a:fld>
             <a:endParaRPr lang="en-US" dirty="0"/>
           </a:p>
@@ -5232,7 +5459,7 @@
 </p:sld>
 </file>
 
-<file path=ppt/slides/slide15.xml><?xml version="1.0" encoding="utf-8"?>
+<file path=ppt/slides/slide16.xml><?xml version="1.0" encoding="utf-8"?>
 <p:sld xmlns:a="http://schemas.openxmlformats.org/drawingml/2006/main" xmlns:r="http://schemas.openxmlformats.org/officeDocument/2006/relationships" xmlns:p="http://schemas.openxmlformats.org/presentationml/2006/main">
   <p:cSld>
     <p:spTree>
@@ -5271,8 +5498,8 @@
           </a:p>
         </p:txBody>
       </p:sp>
-      <mc:AlternateContent xmlns:mc="http://schemas.openxmlformats.org/markup-compatibility/2006">
-        <mc:Choice xmlns:a14="http://schemas.microsoft.com/office/drawing/2010/main" Requires="a14">
+      <mc:AlternateContent xmlns:mc="http://schemas.openxmlformats.org/markup-compatibility/2006" xmlns:a14="http://schemas.microsoft.com/office/drawing/2010/main">
+        <mc:Choice Requires="a14">
           <p:sp>
             <p:nvSpPr>
               <p:cNvPr id="3" name="Content Placeholder 2"/>
@@ -5488,7 +5715,7 @@
             </p:txBody>
           </p:sp>
         </mc:Choice>
-        <mc:Fallback>
+        <mc:Fallback xmlns="">
           <p:sp>
             <p:nvSpPr>
               <p:cNvPr id="3" name="Content Placeholder 2"/>
@@ -5543,7 +5770,7 @@
           <a:p>
             <a:fld id="{629637A9-119A-49DA-BD12-AAC58B377D80}" type="slidenum">
               <a:rPr lang="en-US" smtClean="0"/>
-              <a:t>15</a:t>
+              <a:t>16</a:t>
             </a:fld>
             <a:endParaRPr lang="en-US" dirty="0"/>
           </a:p>
@@ -5587,7 +5814,7 @@
 </p:sld>
 </file>
 
-<file path=ppt/slides/slide16.xml><?xml version="1.0" encoding="utf-8"?>
+<file path=ppt/slides/slide17.xml><?xml version="1.0" encoding="utf-8"?>
 <p:sld xmlns:a="http://schemas.openxmlformats.org/drawingml/2006/main" xmlns:r="http://schemas.openxmlformats.org/officeDocument/2006/relationships" xmlns:p="http://schemas.openxmlformats.org/presentationml/2006/main">
   <p:cSld>
     <p:spTree>
@@ -5965,7 +6192,7 @@
           <a:p>
             <a:fld id="{629637A9-119A-49DA-BD12-AAC58B377D80}" type="slidenum">
               <a:rPr lang="en-US" smtClean="0"/>
-              <a:t>16</a:t>
+              <a:t>17</a:t>
             </a:fld>
             <a:endParaRPr lang="en-US" dirty="0"/>
           </a:p>
@@ -6009,7 +6236,7 @@
 </p:sld>
 </file>
 
-<file path=ppt/slides/slide17.xml><?xml version="1.0" encoding="utf-8"?>
+<file path=ppt/slides/slide18.xml><?xml version="1.0" encoding="utf-8"?>
 <p:sld xmlns:a="http://schemas.openxmlformats.org/drawingml/2006/main" xmlns:r="http://schemas.openxmlformats.org/officeDocument/2006/relationships" xmlns:p="http://schemas.openxmlformats.org/presentationml/2006/main">
   <p:cSld>
     <p:spTree>
@@ -6149,7 +6376,7 @@
           <a:p>
             <a:fld id="{629637A9-119A-49DA-BD12-AAC58B377D80}" type="slidenum">
               <a:rPr lang="en-US" smtClean="0"/>
-              <a:t>17</a:t>
+              <a:t>18</a:t>
             </a:fld>
             <a:endParaRPr lang="en-US" dirty="0"/>
           </a:p>
@@ -6216,7 +6443,7 @@
 </p:sld>
 </file>
 
-<file path=ppt/slides/slide18.xml><?xml version="1.0" encoding="utf-8"?>
+<file path=ppt/slides/slide19.xml><?xml version="1.0" encoding="utf-8"?>
 <p:sld xmlns:a="http://schemas.openxmlformats.org/drawingml/2006/main" xmlns:r="http://schemas.openxmlformats.org/officeDocument/2006/relationships" xmlns:p="http://schemas.openxmlformats.org/presentationml/2006/main">
   <p:cSld>
     <p:spTree>
@@ -6336,7 +6563,7 @@
           <a:p>
             <a:fld id="{629637A9-119A-49DA-BD12-AAC58B377D80}" type="slidenum">
               <a:rPr lang="en-US" smtClean="0"/>
-              <a:t>18</a:t>
+              <a:t>19</a:t>
             </a:fld>
             <a:endParaRPr lang="en-US" dirty="0"/>
           </a:p>
@@ -6447,7 +6674,7 @@
 </p:sld>
 </file>
 
-<file path=ppt/slides/slide19.xml><?xml version="1.0" encoding="utf-8"?>
+<file path=ppt/slides/slide2.xml><?xml version="1.0" encoding="utf-8"?>
 <p:sld xmlns:a="http://schemas.openxmlformats.org/drawingml/2006/main" xmlns:r="http://schemas.openxmlformats.org/officeDocument/2006/relationships" xmlns:p="http://schemas.openxmlformats.org/presentationml/2006/main">
   <p:cSld>
     <p:spTree>
@@ -6481,7 +6708,7 @@
           <a:p>
             <a:r>
               <a:rPr lang="en-US" dirty="0"/>
-              <a:t>Outline</a:t>
+              <a:t>Learning Objectives</a:t>
             </a:r>
           </a:p>
         </p:txBody>
@@ -6503,6 +6730,155 @@
           <a:p>
             <a:r>
               <a:rPr lang="en-US" dirty="0"/>
+              <a:t>Provide examples of machine learning used today</a:t>
+            </a:r>
+          </a:p>
+          <a:p>
+            <a:r>
+              <a:rPr lang="en-US" dirty="0"/>
+              <a:t>Given a new problem, qualitatively describe how machine learning can be used</a:t>
+            </a:r>
+          </a:p>
+          <a:p>
+            <a:pPr lvl="1"/>
+            <a:r>
+              <a:rPr lang="en-US" dirty="0"/>
+              <a:t>Formulate a potential machine learning task</a:t>
+            </a:r>
+          </a:p>
+          <a:p>
+            <a:pPr lvl="1"/>
+            <a:r>
+              <a:rPr lang="en-US" dirty="0"/>
+              <a:t>Identify the data needed for the task</a:t>
+            </a:r>
+          </a:p>
+          <a:p>
+            <a:pPr lvl="1"/>
+            <a:r>
+              <a:rPr lang="en-US" dirty="0"/>
+              <a:t>Identify objectives</a:t>
+            </a:r>
+          </a:p>
+          <a:p>
+            <a:r>
+              <a:rPr lang="en-US" dirty="0"/>
+              <a:t>Classify a machine learning task:</a:t>
+            </a:r>
+          </a:p>
+          <a:p>
+            <a:pPr lvl="1"/>
+            <a:r>
+              <a:rPr lang="en-US" dirty="0"/>
+              <a:t>Supervised vs. unsupervised, regression vs. classification</a:t>
+            </a:r>
+          </a:p>
+          <a:p>
+            <a:r>
+              <a:rPr lang="en-US" dirty="0"/>
+              <a:t>For supervised learning, identify the predictors and target variables</a:t>
+            </a:r>
+          </a:p>
+          <a:p>
+            <a:r>
+              <a:rPr lang="en-US" dirty="0"/>
+              <a:t>Determine the role of expert knowledge in the task vs. data-driven learning</a:t>
+            </a:r>
+          </a:p>
+        </p:txBody>
+      </p:sp>
+      <p:sp>
+        <p:nvSpPr>
+          <p:cNvPr id="4" name="Slide Number Placeholder 3"/>
+          <p:cNvSpPr>
+            <a:spLocks noGrp="1"/>
+          </p:cNvSpPr>
+          <p:nvPr>
+            <p:ph type="sldNum" sz="quarter" idx="12"/>
+          </p:nvPr>
+        </p:nvSpPr>
+        <p:spPr/>
+        <p:txBody>
+          <a:bodyPr/>
+          <a:lstStyle/>
+          <a:p>
+            <a:fld id="{629637A9-119A-49DA-BD12-AAC58B377D80}" type="slidenum">
+              <a:rPr lang="en-US" smtClean="0"/>
+              <a:t>2</a:t>
+            </a:fld>
+            <a:endParaRPr lang="en-US" dirty="0"/>
+          </a:p>
+        </p:txBody>
+      </p:sp>
+    </p:spTree>
+    <p:extLst>
+      <p:ext uri="{BB962C8B-B14F-4D97-AF65-F5344CB8AC3E}">
+        <p14:creationId xmlns:p14="http://schemas.microsoft.com/office/powerpoint/2010/main" val="1998553143"/>
+      </p:ext>
+    </p:extLst>
+  </p:cSld>
+  <p:clrMapOvr>
+    <a:masterClrMapping/>
+  </p:clrMapOvr>
+</p:sld>
+</file>
+
+<file path=ppt/slides/slide20.xml><?xml version="1.0" encoding="utf-8"?>
+<p:sld xmlns:a="http://schemas.openxmlformats.org/drawingml/2006/main" xmlns:r="http://schemas.openxmlformats.org/officeDocument/2006/relationships" xmlns:p="http://schemas.openxmlformats.org/presentationml/2006/main">
+  <p:cSld>
+    <p:spTree>
+      <p:nvGrpSpPr>
+        <p:cNvPr id="1" name=""/>
+        <p:cNvGrpSpPr/>
+        <p:nvPr/>
+      </p:nvGrpSpPr>
+      <p:grpSpPr>
+        <a:xfrm>
+          <a:off x="0" y="0"/>
+          <a:ext cx="0" cy="0"/>
+          <a:chOff x="0" y="0"/>
+          <a:chExt cx="0" cy="0"/>
+        </a:xfrm>
+      </p:grpSpPr>
+      <p:sp>
+        <p:nvSpPr>
+          <p:cNvPr id="2" name="Title 1"/>
+          <p:cNvSpPr>
+            <a:spLocks noGrp="1"/>
+          </p:cNvSpPr>
+          <p:nvPr>
+            <p:ph type="title"/>
+          </p:nvPr>
+        </p:nvSpPr>
+        <p:spPr/>
+        <p:txBody>
+          <a:bodyPr/>
+          <a:lstStyle/>
+          <a:p>
+            <a:r>
+              <a:rPr lang="en-US" dirty="0"/>
+              <a:t>Outline</a:t>
+            </a:r>
+          </a:p>
+        </p:txBody>
+      </p:sp>
+      <p:sp>
+        <p:nvSpPr>
+          <p:cNvPr id="3" name="Content Placeholder 2"/>
+          <p:cNvSpPr>
+            <a:spLocks noGrp="1"/>
+          </p:cNvSpPr>
+          <p:nvPr>
+            <p:ph idx="1"/>
+          </p:nvPr>
+        </p:nvSpPr>
+        <p:spPr/>
+        <p:txBody>
+          <a:bodyPr/>
+          <a:lstStyle/>
+          <a:p>
+            <a:r>
+              <a:rPr lang="en-US" dirty="0"/>
               <a:t>What is Machine Learning?</a:t>
             </a:r>
           </a:p>
@@ -6594,7 +6970,7 @@
           <a:p>
             <a:fld id="{629637A9-119A-49DA-BD12-AAC58B377D80}" type="slidenum">
               <a:rPr lang="en-US" smtClean="0"/>
-              <a:t>19</a:t>
+              <a:t>20</a:t>
             </a:fld>
             <a:endParaRPr lang="en-US" dirty="0"/>
           </a:p>
@@ -6659,7 +7035,7 @@
 </p:sld>
 </file>
 
-<file path=ppt/slides/slide2.xml><?xml version="1.0" encoding="utf-8"?>
+<file path=ppt/slides/slide21.xml><?xml version="1.0" encoding="utf-8"?>
 <p:sld xmlns:a="http://schemas.openxmlformats.org/drawingml/2006/main" xmlns:r="http://schemas.openxmlformats.org/officeDocument/2006/relationships" xmlns:p="http://schemas.openxmlformats.org/presentationml/2006/main">
   <p:cSld>
     <p:spTree>
@@ -6678,155 +7054,6 @@
       </p:grpSpPr>
       <p:sp>
         <p:nvSpPr>
-          <p:cNvPr id="2" name="Title 1"/>
-          <p:cNvSpPr>
-            <a:spLocks noGrp="1"/>
-          </p:cNvSpPr>
-          <p:nvPr>
-            <p:ph type="title"/>
-          </p:nvPr>
-        </p:nvSpPr>
-        <p:spPr/>
-        <p:txBody>
-          <a:bodyPr/>
-          <a:lstStyle/>
-          <a:p>
-            <a:r>
-              <a:rPr lang="en-US" dirty="0"/>
-              <a:t>Learning Objectives</a:t>
-            </a:r>
-          </a:p>
-        </p:txBody>
-      </p:sp>
-      <p:sp>
-        <p:nvSpPr>
-          <p:cNvPr id="3" name="Content Placeholder 2"/>
-          <p:cNvSpPr>
-            <a:spLocks noGrp="1"/>
-          </p:cNvSpPr>
-          <p:nvPr>
-            <p:ph idx="1"/>
-          </p:nvPr>
-        </p:nvSpPr>
-        <p:spPr/>
-        <p:txBody>
-          <a:bodyPr/>
-          <a:lstStyle/>
-          <a:p>
-            <a:r>
-              <a:rPr lang="en-US" dirty="0"/>
-              <a:t>Provide examples of machine learning used today</a:t>
-            </a:r>
-          </a:p>
-          <a:p>
-            <a:r>
-              <a:rPr lang="en-US" dirty="0"/>
-              <a:t>Given a new problem, qualitatively describe how machine learning can be used</a:t>
-            </a:r>
-          </a:p>
-          <a:p>
-            <a:pPr lvl="1"/>
-            <a:r>
-              <a:rPr lang="en-US" dirty="0"/>
-              <a:t>Formulate a potential machine learning task</a:t>
-            </a:r>
-          </a:p>
-          <a:p>
-            <a:pPr lvl="1"/>
-            <a:r>
-              <a:rPr lang="en-US" dirty="0"/>
-              <a:t>Identify the data needed for the task</a:t>
-            </a:r>
-          </a:p>
-          <a:p>
-            <a:pPr lvl="1"/>
-            <a:r>
-              <a:rPr lang="en-US" dirty="0"/>
-              <a:t>Identify objectives</a:t>
-            </a:r>
-          </a:p>
-          <a:p>
-            <a:r>
-              <a:rPr lang="en-US" dirty="0"/>
-              <a:t>Classify a machine learning task:</a:t>
-            </a:r>
-          </a:p>
-          <a:p>
-            <a:pPr lvl="1"/>
-            <a:r>
-              <a:rPr lang="en-US" dirty="0"/>
-              <a:t>Supervised vs. unsupervised, regression vs. classification</a:t>
-            </a:r>
-          </a:p>
-          <a:p>
-            <a:r>
-              <a:rPr lang="en-US" dirty="0"/>
-              <a:t>For supervised learning, identify the predictors and target variables</a:t>
-            </a:r>
-          </a:p>
-          <a:p>
-            <a:r>
-              <a:rPr lang="en-US" dirty="0"/>
-              <a:t>Determine the role of expert knowledge in the task vs. data-driven learning</a:t>
-            </a:r>
-          </a:p>
-        </p:txBody>
-      </p:sp>
-      <p:sp>
-        <p:nvSpPr>
-          <p:cNvPr id="4" name="Slide Number Placeholder 3"/>
-          <p:cNvSpPr>
-            <a:spLocks noGrp="1"/>
-          </p:cNvSpPr>
-          <p:nvPr>
-            <p:ph type="sldNum" sz="quarter" idx="12"/>
-          </p:nvPr>
-        </p:nvSpPr>
-        <p:spPr/>
-        <p:txBody>
-          <a:bodyPr/>
-          <a:lstStyle/>
-          <a:p>
-            <a:fld id="{629637A9-119A-49DA-BD12-AAC58B377D80}" type="slidenum">
-              <a:rPr lang="en-US" smtClean="0"/>
-              <a:t>2</a:t>
-            </a:fld>
-            <a:endParaRPr lang="en-US" dirty="0"/>
-          </a:p>
-        </p:txBody>
-      </p:sp>
-    </p:spTree>
-    <p:extLst>
-      <p:ext uri="{BB962C8B-B14F-4D97-AF65-F5344CB8AC3E}">
-        <p14:creationId xmlns:p14="http://schemas.microsoft.com/office/powerpoint/2010/main" val="1998553143"/>
-      </p:ext>
-    </p:extLst>
-  </p:cSld>
-  <p:clrMapOvr>
-    <a:masterClrMapping/>
-  </p:clrMapOvr>
-</p:sld>
-</file>
-
-<file path=ppt/slides/slide20.xml><?xml version="1.0" encoding="utf-8"?>
-<p:sld xmlns:a="http://schemas.openxmlformats.org/drawingml/2006/main" xmlns:r="http://schemas.openxmlformats.org/officeDocument/2006/relationships" xmlns:p="http://schemas.openxmlformats.org/presentationml/2006/main">
-  <p:cSld>
-    <p:spTree>
-      <p:nvGrpSpPr>
-        <p:cNvPr id="1" name=""/>
-        <p:cNvGrpSpPr/>
-        <p:nvPr/>
-      </p:nvGrpSpPr>
-      <p:grpSpPr>
-        <a:xfrm>
-          <a:off x="0" y="0"/>
-          <a:ext cx="0" cy="0"/>
-          <a:chOff x="0" y="0"/>
-          <a:chExt cx="0" cy="0"/>
-        </a:xfrm>
-      </p:grpSpPr>
-      <p:sp>
-        <p:nvSpPr>
           <p:cNvPr id="2" name="Title 1">
             <a:extLst>
               <a:ext uri="{FF2B5EF4-FFF2-40B4-BE49-F238E27FC236}">
@@ -6934,7 +7161,7 @@
           <a:p>
             <a:fld id="{629637A9-119A-49DA-BD12-AAC58B377D80}" type="slidenum">
               <a:rPr lang="en-US" smtClean="0"/>
-              <a:t>20</a:t>
+              <a:t>21</a:t>
             </a:fld>
             <a:endParaRPr lang="en-US" dirty="0"/>
           </a:p>
@@ -7073,7 +7300,7 @@
 </p:sld>
 </file>
 
-<file path=ppt/slides/slide21.xml><?xml version="1.0" encoding="utf-8"?>
+<file path=ppt/slides/slide22.xml><?xml version="1.0" encoding="utf-8"?>
 <p:sld xmlns:a="http://schemas.openxmlformats.org/drawingml/2006/main" xmlns:r="http://schemas.openxmlformats.org/officeDocument/2006/relationships" xmlns:p="http://schemas.openxmlformats.org/presentationml/2006/main">
   <p:cSld>
     <p:spTree>
@@ -7159,8 +7386,19 @@
           </a:p>
           <a:p>
             <a:r>
-              <a:rPr lang="en-US" dirty="0"/>
-              <a:t>Big Data:</a:t>
+              <a:rPr lang="en-US" dirty="0">
+                <a:solidFill>
+                  <a:schemeClr val="accent1">
+                    <a:lumMod val="60000"/>
+                    <a:lumOff val="40000"/>
+                  </a:schemeClr>
+                </a:solidFill>
+              </a:rPr>
+              <a:t>Big Data</a:t>
+            </a:r>
+            <a:r>
+              <a:rPr lang="en-US" dirty="0"/>
+              <a:t>:</a:t>
             </a:r>
           </a:p>
           <a:p>
@@ -7186,7 +7424,14 @@
           </a:p>
           <a:p>
             <a:r>
-              <a:rPr lang="en-US" dirty="0"/>
+              <a:rPr lang="en-US" dirty="0">
+                <a:solidFill>
+                  <a:schemeClr val="accent1">
+                    <a:lumMod val="60000"/>
+                    <a:lumOff val="40000"/>
+                  </a:schemeClr>
+                </a:solidFill>
+              </a:rPr>
               <a:t>Computational advances</a:t>
             </a:r>
           </a:p>
@@ -7232,7 +7477,7 @@
           <a:p>
             <a:fld id="{629637A9-119A-49DA-BD12-AAC58B377D80}" type="slidenum">
               <a:rPr lang="en-US" smtClean="0"/>
-              <a:t>21</a:t>
+              <a:t>22</a:t>
             </a:fld>
             <a:endParaRPr lang="en-US" dirty="0"/>
           </a:p>
@@ -7346,149 +7591,6 @@
 </p:sld>
 </file>
 
-<file path=ppt/slides/slide22.xml><?xml version="1.0" encoding="utf-8"?>
-<p:sld xmlns:a="http://schemas.openxmlformats.org/drawingml/2006/main" xmlns:r="http://schemas.openxmlformats.org/officeDocument/2006/relationships" xmlns:p="http://schemas.openxmlformats.org/presentationml/2006/main">
-  <p:cSld>
-    <p:spTree>
-      <p:nvGrpSpPr>
-        <p:cNvPr id="1" name=""/>
-        <p:cNvGrpSpPr/>
-        <p:nvPr/>
-      </p:nvGrpSpPr>
-      <p:grpSpPr>
-        <a:xfrm>
-          <a:off x="0" y="0"/>
-          <a:ext cx="0" cy="0"/>
-          <a:chOff x="0" y="0"/>
-          <a:chExt cx="0" cy="0"/>
-        </a:xfrm>
-      </p:grpSpPr>
-      <p:sp>
-        <p:nvSpPr>
-          <p:cNvPr id="2" name="Title 1"/>
-          <p:cNvSpPr>
-            <a:spLocks noGrp="1"/>
-          </p:cNvSpPr>
-          <p:nvPr>
-            <p:ph type="title"/>
-          </p:nvPr>
-        </p:nvSpPr>
-        <p:spPr/>
-        <p:txBody>
-          <a:bodyPr/>
-          <a:lstStyle/>
-          <a:p>
-            <a:r>
-              <a:rPr lang="en-US" dirty="0"/>
-              <a:t>Top Journals</a:t>
-            </a:r>
-          </a:p>
-        </p:txBody>
-      </p:sp>
-      <p:sp>
-        <p:nvSpPr>
-          <p:cNvPr id="3" name="Content Placeholder 2"/>
-          <p:cNvSpPr>
-            <a:spLocks noGrp="1"/>
-          </p:cNvSpPr>
-          <p:nvPr>
-            <p:ph idx="1"/>
-          </p:nvPr>
-        </p:nvSpPr>
-        <p:spPr/>
-        <p:txBody>
-          <a:bodyPr/>
-          <a:lstStyle/>
-          <a:p>
-            <a:r>
-              <a:rPr lang="tr-TR" dirty="0"/>
-              <a:t>Journal of Machine Learning Research </a:t>
-            </a:r>
-            <a:r>
-              <a:rPr lang="tr-TR" dirty="0">
-                <a:hlinkClick r:id="rId2"/>
-              </a:rPr>
-              <a:t>www.jmlr.org</a:t>
-            </a:r>
-            <a:endParaRPr lang="tr-TR" dirty="0"/>
-          </a:p>
-          <a:p>
-            <a:r>
-              <a:rPr lang="tr-TR" dirty="0"/>
-              <a:t>Machine Learning </a:t>
-            </a:r>
-          </a:p>
-          <a:p>
-            <a:r>
-              <a:rPr lang="tr-TR" dirty="0"/>
-              <a:t>Neural Computation</a:t>
-            </a:r>
-          </a:p>
-          <a:p>
-            <a:r>
-              <a:rPr lang="tr-TR" dirty="0"/>
-              <a:t>Neural Networks</a:t>
-            </a:r>
-          </a:p>
-          <a:p>
-            <a:r>
-              <a:rPr lang="tr-TR" dirty="0"/>
-              <a:t>IEEE Trans on Neural Networks and Learning Systems</a:t>
-            </a:r>
-          </a:p>
-          <a:p>
-            <a:r>
-              <a:rPr lang="tr-TR" dirty="0"/>
-              <a:t>IEEE Trans on Pattern Analysis and Machine Intelligence</a:t>
-            </a:r>
-          </a:p>
-          <a:p>
-            <a:r>
-              <a:rPr lang="tr-TR" dirty="0"/>
-              <a:t>Journals on Statistics/Data Mining/Signal Processing/Natural Language Processing/Bioinformatics/...</a:t>
-            </a:r>
-          </a:p>
-          <a:p>
-            <a:endParaRPr lang="en-US" dirty="0"/>
-          </a:p>
-        </p:txBody>
-      </p:sp>
-      <p:sp>
-        <p:nvSpPr>
-          <p:cNvPr id="4" name="Slide Number Placeholder 3"/>
-          <p:cNvSpPr>
-            <a:spLocks noGrp="1"/>
-          </p:cNvSpPr>
-          <p:nvPr>
-            <p:ph type="sldNum" sz="quarter" idx="12"/>
-          </p:nvPr>
-        </p:nvSpPr>
-        <p:spPr/>
-        <p:txBody>
-          <a:bodyPr/>
-          <a:lstStyle/>
-          <a:p>
-            <a:fld id="{629637A9-119A-49DA-BD12-AAC58B377D80}" type="slidenum">
-              <a:rPr lang="en-US" smtClean="0"/>
-              <a:t>22</a:t>
-            </a:fld>
-            <a:endParaRPr lang="en-US" dirty="0"/>
-          </a:p>
-        </p:txBody>
-      </p:sp>
-    </p:spTree>
-    <p:extLst>
-      <p:ext uri="{BB962C8B-B14F-4D97-AF65-F5344CB8AC3E}">
-        <p14:creationId xmlns:p14="http://schemas.microsoft.com/office/powerpoint/2010/main" val="2662439910"/>
-      </p:ext>
-    </p:extLst>
-  </p:cSld>
-  <p:clrMapOvr>
-    <a:masterClrMapping/>
-  </p:clrMapOvr>
-</p:sld>
-</file>
-
 <file path=ppt/slides/slide23.xml><?xml version="1.0" encoding="utf-8"?>
 <p:sld xmlns:a="http://schemas.openxmlformats.org/drawingml/2006/main" xmlns:r="http://schemas.openxmlformats.org/officeDocument/2006/relationships" xmlns:p="http://schemas.openxmlformats.org/presentationml/2006/main">
   <p:cSld>
@@ -7523,7 +7625,7 @@
           <a:p>
             <a:r>
               <a:rPr lang="en-US" dirty="0"/>
-              <a:t>Top Conferences</a:t>
+              <a:t>Top Journals</a:t>
             </a:r>
           </a:p>
         </p:txBody>
@@ -7540,229 +7642,55 @@
         </p:nvSpPr>
         <p:spPr/>
         <p:txBody>
-          <a:bodyPr>
-            <a:normAutofit lnSpcReduction="10000"/>
-          </a:bodyPr>
+          <a:bodyPr/>
           <a:lstStyle/>
           <a:p>
-            <a:pPr>
-              <a:lnSpc>
-                <a:spcPct val="80000"/>
-              </a:lnSpc>
-            </a:pPr>
             <a:r>
               <a:rPr lang="tr-TR" dirty="0"/>
-              <a:t>International Conference on Machine Learning (ICML) </a:t>
-            </a:r>
-          </a:p>
-          <a:p>
-            <a:pPr>
-              <a:lnSpc>
-                <a:spcPct val="80000"/>
-              </a:lnSpc>
-            </a:pPr>
+              <a:t>Journal of Machine Learning Research </a:t>
+            </a:r>
+            <a:r>
+              <a:rPr lang="tr-TR" dirty="0">
+                <a:hlinkClick r:id="rId2"/>
+              </a:rPr>
+              <a:t>www.jmlr.org</a:t>
+            </a:r>
+            <a:endParaRPr lang="tr-TR" dirty="0"/>
+          </a:p>
+          <a:p>
             <a:r>
               <a:rPr lang="tr-TR" dirty="0"/>
-              <a:t>European Conference on Machine Learning (ECML)</a:t>
-            </a:r>
-          </a:p>
-          <a:p>
-            <a:pPr>
-              <a:lnSpc>
-                <a:spcPct val="80000"/>
-              </a:lnSpc>
-            </a:pPr>
+              <a:t>Machine Learning </a:t>
+            </a:r>
+          </a:p>
+          <a:p>
             <a:r>
               <a:rPr lang="tr-TR" dirty="0"/>
-              <a:t>Neural Information Processing Systems (NIPS)</a:t>
-            </a:r>
-          </a:p>
-          <a:p>
-            <a:pPr>
-              <a:lnSpc>
-                <a:spcPct val="80000"/>
-              </a:lnSpc>
-            </a:pPr>
+              <a:t>Neural Computation</a:t>
+            </a:r>
+          </a:p>
+          <a:p>
             <a:r>
               <a:rPr lang="tr-TR" dirty="0"/>
-              <a:t>Uncertainty in Artificial Intelligence (UAI)</a:t>
-            </a:r>
-          </a:p>
-          <a:p>
-            <a:pPr>
-              <a:lnSpc>
-                <a:spcPct val="80000"/>
-              </a:lnSpc>
-            </a:pPr>
+              <a:t>Neural Networks</a:t>
+            </a:r>
+          </a:p>
+          <a:p>
             <a:r>
               <a:rPr lang="tr-TR" dirty="0"/>
-              <a:t>Computational Learning Theory (COLT)</a:t>
-            </a:r>
-          </a:p>
-          <a:p>
-            <a:pPr>
-              <a:lnSpc>
-                <a:spcPct val="80000"/>
-              </a:lnSpc>
-            </a:pPr>
+              <a:t>IEEE Trans on Neural Networks and Learning Systems</a:t>
+            </a:r>
+          </a:p>
+          <a:p>
             <a:r>
               <a:rPr lang="tr-TR" dirty="0"/>
-              <a:t>International Conference on Artificial Neural Networks (ICANN) </a:t>
-            </a:r>
-          </a:p>
-          <a:p>
-            <a:pPr>
-              <a:lnSpc>
-                <a:spcPct val="80000"/>
-              </a:lnSpc>
-            </a:pPr>
+              <a:t>IEEE Trans on Pattern Analysis and Machine Intelligence</a:t>
+            </a:r>
+          </a:p>
+          <a:p>
             <a:r>
               <a:rPr lang="tr-TR" dirty="0"/>
-              <a:t>International Conference on AI &amp; Statistics (AISTATS)</a:t>
-            </a:r>
-          </a:p>
-          <a:p>
-            <a:pPr>
-              <a:lnSpc>
-                <a:spcPct val="80000"/>
-              </a:lnSpc>
-            </a:pPr>
-            <a:r>
-              <a:rPr lang="tr-TR" dirty="0"/>
-              <a:t>Knowledge </a:t>
-            </a:r>
-            <a:r>
-              <a:rPr lang="tr-TR" dirty="0" err="1"/>
-              <a:t>Discovery</a:t>
-            </a:r>
-            <a:r>
-              <a:rPr lang="tr-TR" dirty="0"/>
-              <a:t> </a:t>
-            </a:r>
-            <a:r>
-              <a:rPr lang="tr-TR" dirty="0" err="1"/>
-              <a:t>and</a:t>
-            </a:r>
-            <a:r>
-              <a:rPr lang="tr-TR" dirty="0"/>
-              <a:t> Data </a:t>
-            </a:r>
-            <a:r>
-              <a:rPr lang="tr-TR" dirty="0" err="1"/>
-              <a:t>Mining</a:t>
-            </a:r>
-            <a:r>
-              <a:rPr lang="tr-TR" dirty="0"/>
-              <a:t> (KDD)</a:t>
-            </a:r>
-          </a:p>
-          <a:p>
-            <a:pPr>
-              <a:lnSpc>
-                <a:spcPct val="80000"/>
-              </a:lnSpc>
-            </a:pPr>
-            <a:r>
-              <a:rPr lang="tr-TR" dirty="0"/>
-              <a:t>International Conference on </a:t>
-            </a:r>
-            <a:r>
-              <a:rPr lang="tr-TR" dirty="0" err="1"/>
-              <a:t>Computer</a:t>
-            </a:r>
-            <a:r>
-              <a:rPr lang="tr-TR" dirty="0"/>
-              <a:t> </a:t>
-            </a:r>
-            <a:r>
-              <a:rPr lang="tr-TR" dirty="0" err="1"/>
-              <a:t>Vision</a:t>
-            </a:r>
-            <a:r>
-              <a:rPr lang="tr-TR" dirty="0"/>
-              <a:t> </a:t>
-            </a:r>
-            <a:r>
-              <a:rPr lang="tr-TR" dirty="0" err="1"/>
-              <a:t>and</a:t>
-            </a:r>
-            <a:r>
-              <a:rPr lang="tr-TR" dirty="0"/>
-              <a:t> </a:t>
-            </a:r>
-            <a:r>
-              <a:rPr lang="tr-TR" dirty="0" err="1"/>
-              <a:t>Pattern</a:t>
-            </a:r>
-            <a:r>
-              <a:rPr lang="tr-TR" dirty="0"/>
-              <a:t> </a:t>
-            </a:r>
-            <a:r>
-              <a:rPr lang="tr-TR" dirty="0" err="1"/>
-              <a:t>Recognition</a:t>
-            </a:r>
-            <a:r>
-              <a:rPr lang="tr-TR" dirty="0"/>
-              <a:t> (CVPR)</a:t>
-            </a:r>
-          </a:p>
-          <a:p>
-            <a:pPr>
-              <a:lnSpc>
-                <a:spcPct val="80000"/>
-              </a:lnSpc>
-            </a:pPr>
-            <a:r>
-              <a:rPr lang="tr-TR" dirty="0"/>
-              <a:t>International Conference on </a:t>
-            </a:r>
-            <a:r>
-              <a:rPr lang="tr-TR" dirty="0" err="1"/>
-              <a:t>Computer</a:t>
-            </a:r>
-            <a:r>
-              <a:rPr lang="tr-TR" dirty="0"/>
-              <a:t> </a:t>
-            </a:r>
-            <a:r>
-              <a:rPr lang="tr-TR" dirty="0" err="1"/>
-              <a:t>Vision</a:t>
-            </a:r>
-            <a:r>
-              <a:rPr lang="tr-TR" dirty="0"/>
-              <a:t> (ICCV)</a:t>
-            </a:r>
-          </a:p>
-          <a:p>
-            <a:pPr>
-              <a:lnSpc>
-                <a:spcPct val="80000"/>
-              </a:lnSpc>
-            </a:pPr>
-            <a:r>
-              <a:rPr lang="tr-TR" dirty="0" err="1"/>
-              <a:t>European</a:t>
-            </a:r>
-            <a:r>
-              <a:rPr lang="tr-TR" dirty="0"/>
-              <a:t> Conference on </a:t>
-            </a:r>
-            <a:r>
-              <a:rPr lang="tr-TR" dirty="0" err="1"/>
-              <a:t>Computer</a:t>
-            </a:r>
-            <a:r>
-              <a:rPr lang="tr-TR" dirty="0"/>
-              <a:t> </a:t>
-            </a:r>
-            <a:r>
-              <a:rPr lang="tr-TR" dirty="0" err="1"/>
-              <a:t>Vision</a:t>
-            </a:r>
-            <a:r>
-              <a:rPr lang="tr-TR" dirty="0"/>
-              <a:t> (ECCV)</a:t>
+              <a:t>Journals on Statistics/Data Mining/Signal Processing/Natural Language Processing/Bioinformatics/...</a:t>
             </a:r>
           </a:p>
           <a:p>
@@ -7796,7 +7724,7 @@
     </p:spTree>
     <p:extLst>
       <p:ext uri="{BB962C8B-B14F-4D97-AF65-F5344CB8AC3E}">
-        <p14:creationId xmlns:p14="http://schemas.microsoft.com/office/powerpoint/2010/main" val="3506267765"/>
+        <p14:creationId xmlns:p14="http://schemas.microsoft.com/office/powerpoint/2010/main" val="2662439910"/>
       </p:ext>
     </p:extLst>
   </p:cSld>
@@ -7840,7 +7768,7 @@
           <a:p>
             <a:r>
               <a:rPr lang="en-US" dirty="0"/>
-              <a:t>Exercise</a:t>
+              <a:t>Top Conferences</a:t>
             </a:r>
           </a:p>
         </p:txBody>
@@ -7857,59 +7785,229 @@
         </p:nvSpPr>
         <p:spPr/>
         <p:txBody>
-          <a:bodyPr/>
+          <a:bodyPr>
+            <a:normAutofit lnSpcReduction="10000"/>
+          </a:bodyPr>
           <a:lstStyle/>
           <a:p>
-            <a:r>
-              <a:rPr lang="en-US" dirty="0"/>
-              <a:t>Break into small groups</a:t>
-            </a:r>
-          </a:p>
-          <a:p>
-            <a:r>
-              <a:rPr lang="en-US" dirty="0"/>
-              <a:t>Take a field that interests you:</a:t>
-            </a:r>
-          </a:p>
-          <a:p>
-            <a:pPr lvl="1"/>
-            <a:r>
-              <a:rPr lang="en-US" dirty="0"/>
-              <a:t>Ex.  Driving a car, understanding social networks, finding a good date, recommend a movie to watch, …</a:t>
-            </a:r>
-          </a:p>
-          <a:p>
-            <a:r>
-              <a:rPr lang="en-US" dirty="0"/>
-              <a:t>Identify a specific task that can be done with machine learning</a:t>
-            </a:r>
-          </a:p>
-          <a:p>
-            <a:pPr lvl="1"/>
-            <a:r>
-              <a:rPr lang="en-US" dirty="0"/>
-              <a:t>What is the objective of the task?</a:t>
-            </a:r>
-          </a:p>
-          <a:p>
-            <a:pPr lvl="1"/>
-            <a:r>
-              <a:rPr lang="en-US" dirty="0"/>
-              <a:t>What is the data you need?</a:t>
-            </a:r>
-          </a:p>
-          <a:p>
-            <a:pPr lvl="1"/>
-            <a:r>
-              <a:rPr lang="en-US" dirty="0"/>
-              <a:t>What type of ML problem is this?  Classification, regression, …</a:t>
-            </a:r>
-          </a:p>
-          <a:p>
-            <a:pPr lvl="1"/>
-            <a:r>
-              <a:rPr lang="en-US" dirty="0"/>
-              <a:t>How would your approach compare to an expert-driven method?</a:t>
+            <a:pPr>
+              <a:lnSpc>
+                <a:spcPct val="80000"/>
+              </a:lnSpc>
+            </a:pPr>
+            <a:r>
+              <a:rPr lang="tr-TR" dirty="0"/>
+              <a:t>International Conference on Machine Learning (ICML) </a:t>
+            </a:r>
+          </a:p>
+          <a:p>
+            <a:pPr>
+              <a:lnSpc>
+                <a:spcPct val="80000"/>
+              </a:lnSpc>
+            </a:pPr>
+            <a:r>
+              <a:rPr lang="tr-TR" dirty="0"/>
+              <a:t>European Conference on Machine Learning (ECML)</a:t>
+            </a:r>
+          </a:p>
+          <a:p>
+            <a:pPr>
+              <a:lnSpc>
+                <a:spcPct val="80000"/>
+              </a:lnSpc>
+            </a:pPr>
+            <a:r>
+              <a:rPr lang="tr-TR" dirty="0"/>
+              <a:t>Neural Information Processing Systems (NIPS)</a:t>
+            </a:r>
+          </a:p>
+          <a:p>
+            <a:pPr>
+              <a:lnSpc>
+                <a:spcPct val="80000"/>
+              </a:lnSpc>
+            </a:pPr>
+            <a:r>
+              <a:rPr lang="tr-TR" dirty="0"/>
+              <a:t>Uncertainty in Artificial Intelligence (UAI)</a:t>
+            </a:r>
+          </a:p>
+          <a:p>
+            <a:pPr>
+              <a:lnSpc>
+                <a:spcPct val="80000"/>
+              </a:lnSpc>
+            </a:pPr>
+            <a:r>
+              <a:rPr lang="tr-TR" dirty="0"/>
+              <a:t>Computational Learning Theory (COLT)</a:t>
+            </a:r>
+          </a:p>
+          <a:p>
+            <a:pPr>
+              <a:lnSpc>
+                <a:spcPct val="80000"/>
+              </a:lnSpc>
+            </a:pPr>
+            <a:r>
+              <a:rPr lang="tr-TR" dirty="0"/>
+              <a:t>International Conference on Artificial Neural Networks (ICANN) </a:t>
+            </a:r>
+          </a:p>
+          <a:p>
+            <a:pPr>
+              <a:lnSpc>
+                <a:spcPct val="80000"/>
+              </a:lnSpc>
+            </a:pPr>
+            <a:r>
+              <a:rPr lang="tr-TR" dirty="0"/>
+              <a:t>International Conference on AI &amp; Statistics (AISTATS)</a:t>
+            </a:r>
+          </a:p>
+          <a:p>
+            <a:pPr>
+              <a:lnSpc>
+                <a:spcPct val="80000"/>
+              </a:lnSpc>
+            </a:pPr>
+            <a:r>
+              <a:rPr lang="tr-TR" dirty="0"/>
+              <a:t>Knowledge </a:t>
+            </a:r>
+            <a:r>
+              <a:rPr lang="tr-TR" dirty="0" err="1"/>
+              <a:t>Discovery</a:t>
+            </a:r>
+            <a:r>
+              <a:rPr lang="tr-TR" dirty="0"/>
+              <a:t> </a:t>
+            </a:r>
+            <a:r>
+              <a:rPr lang="tr-TR" dirty="0" err="1"/>
+              <a:t>and</a:t>
+            </a:r>
+            <a:r>
+              <a:rPr lang="tr-TR" dirty="0"/>
+              <a:t> Data </a:t>
+            </a:r>
+            <a:r>
+              <a:rPr lang="tr-TR" dirty="0" err="1"/>
+              <a:t>Mining</a:t>
+            </a:r>
+            <a:r>
+              <a:rPr lang="tr-TR" dirty="0"/>
+              <a:t> (KDD)</a:t>
+            </a:r>
+          </a:p>
+          <a:p>
+            <a:pPr>
+              <a:lnSpc>
+                <a:spcPct val="80000"/>
+              </a:lnSpc>
+            </a:pPr>
+            <a:r>
+              <a:rPr lang="tr-TR" dirty="0"/>
+              <a:t>International Conference on </a:t>
+            </a:r>
+            <a:r>
+              <a:rPr lang="tr-TR" dirty="0" err="1"/>
+              <a:t>Computer</a:t>
+            </a:r>
+            <a:r>
+              <a:rPr lang="tr-TR" dirty="0"/>
+              <a:t> </a:t>
+            </a:r>
+            <a:r>
+              <a:rPr lang="tr-TR" dirty="0" err="1"/>
+              <a:t>Vision</a:t>
+            </a:r>
+            <a:r>
+              <a:rPr lang="tr-TR" dirty="0"/>
+              <a:t> </a:t>
+            </a:r>
+            <a:r>
+              <a:rPr lang="tr-TR" dirty="0" err="1"/>
+              <a:t>and</a:t>
+            </a:r>
+            <a:r>
+              <a:rPr lang="tr-TR" dirty="0"/>
+              <a:t> </a:t>
+            </a:r>
+            <a:r>
+              <a:rPr lang="tr-TR" dirty="0" err="1"/>
+              <a:t>Pattern</a:t>
+            </a:r>
+            <a:r>
+              <a:rPr lang="tr-TR" dirty="0"/>
+              <a:t> </a:t>
+            </a:r>
+            <a:r>
+              <a:rPr lang="tr-TR" dirty="0" err="1"/>
+              <a:t>Recognition</a:t>
+            </a:r>
+            <a:r>
+              <a:rPr lang="tr-TR" dirty="0"/>
+              <a:t> (CVPR)</a:t>
+            </a:r>
+          </a:p>
+          <a:p>
+            <a:pPr>
+              <a:lnSpc>
+                <a:spcPct val="80000"/>
+              </a:lnSpc>
+            </a:pPr>
+            <a:r>
+              <a:rPr lang="tr-TR" dirty="0"/>
+              <a:t>International Conference on </a:t>
+            </a:r>
+            <a:r>
+              <a:rPr lang="tr-TR" dirty="0" err="1"/>
+              <a:t>Computer</a:t>
+            </a:r>
+            <a:r>
+              <a:rPr lang="tr-TR" dirty="0"/>
+              <a:t> </a:t>
+            </a:r>
+            <a:r>
+              <a:rPr lang="tr-TR" dirty="0" err="1"/>
+              <a:t>Vision</a:t>
+            </a:r>
+            <a:r>
+              <a:rPr lang="tr-TR" dirty="0"/>
+              <a:t> (ICCV)</a:t>
+            </a:r>
+          </a:p>
+          <a:p>
+            <a:pPr>
+              <a:lnSpc>
+                <a:spcPct val="80000"/>
+              </a:lnSpc>
+            </a:pPr>
+            <a:r>
+              <a:rPr lang="tr-TR" dirty="0" err="1"/>
+              <a:t>European</a:t>
+            </a:r>
+            <a:r>
+              <a:rPr lang="tr-TR" dirty="0"/>
+              <a:t> Conference on </a:t>
+            </a:r>
+            <a:r>
+              <a:rPr lang="tr-TR" dirty="0" err="1"/>
+              <a:t>Computer</a:t>
+            </a:r>
+            <a:r>
+              <a:rPr lang="tr-TR" dirty="0"/>
+              <a:t> </a:t>
+            </a:r>
+            <a:r>
+              <a:rPr lang="tr-TR" dirty="0" err="1"/>
+              <a:t>Vision</a:t>
+            </a:r>
+            <a:r>
+              <a:rPr lang="tr-TR" dirty="0"/>
+              <a:t> (ECCV)</a:t>
             </a:r>
           </a:p>
           <a:p>
@@ -7935,6 +8033,153 @@
             <a:fld id="{629637A9-119A-49DA-BD12-AAC58B377D80}" type="slidenum">
               <a:rPr lang="en-US" smtClean="0"/>
               <a:t>24</a:t>
+            </a:fld>
+            <a:endParaRPr lang="en-US" dirty="0"/>
+          </a:p>
+        </p:txBody>
+      </p:sp>
+    </p:spTree>
+    <p:extLst>
+      <p:ext uri="{BB962C8B-B14F-4D97-AF65-F5344CB8AC3E}">
+        <p14:creationId xmlns:p14="http://schemas.microsoft.com/office/powerpoint/2010/main" val="3506267765"/>
+      </p:ext>
+    </p:extLst>
+  </p:cSld>
+  <p:clrMapOvr>
+    <a:masterClrMapping/>
+  </p:clrMapOvr>
+</p:sld>
+</file>
+
+<file path=ppt/slides/slide25.xml><?xml version="1.0" encoding="utf-8"?>
+<p:sld xmlns:a="http://schemas.openxmlformats.org/drawingml/2006/main" xmlns:r="http://schemas.openxmlformats.org/officeDocument/2006/relationships" xmlns:p="http://schemas.openxmlformats.org/presentationml/2006/main">
+  <p:cSld>
+    <p:spTree>
+      <p:nvGrpSpPr>
+        <p:cNvPr id="1" name=""/>
+        <p:cNvGrpSpPr/>
+        <p:nvPr/>
+      </p:nvGrpSpPr>
+      <p:grpSpPr>
+        <a:xfrm>
+          <a:off x="0" y="0"/>
+          <a:ext cx="0" cy="0"/>
+          <a:chOff x="0" y="0"/>
+          <a:chExt cx="0" cy="0"/>
+        </a:xfrm>
+      </p:grpSpPr>
+      <p:sp>
+        <p:nvSpPr>
+          <p:cNvPr id="2" name="Title 1"/>
+          <p:cNvSpPr>
+            <a:spLocks noGrp="1"/>
+          </p:cNvSpPr>
+          <p:nvPr>
+            <p:ph type="title"/>
+          </p:nvPr>
+        </p:nvSpPr>
+        <p:spPr/>
+        <p:txBody>
+          <a:bodyPr/>
+          <a:lstStyle/>
+          <a:p>
+            <a:r>
+              <a:rPr lang="en-US" dirty="0"/>
+              <a:t>Exercise</a:t>
+            </a:r>
+          </a:p>
+        </p:txBody>
+      </p:sp>
+      <p:sp>
+        <p:nvSpPr>
+          <p:cNvPr id="3" name="Content Placeholder 2"/>
+          <p:cNvSpPr>
+            <a:spLocks noGrp="1"/>
+          </p:cNvSpPr>
+          <p:nvPr>
+            <p:ph idx="1"/>
+          </p:nvPr>
+        </p:nvSpPr>
+        <p:spPr/>
+        <p:txBody>
+          <a:bodyPr/>
+          <a:lstStyle/>
+          <a:p>
+            <a:r>
+              <a:rPr lang="en-US" dirty="0"/>
+              <a:t>Break into small groups</a:t>
+            </a:r>
+          </a:p>
+          <a:p>
+            <a:r>
+              <a:rPr lang="en-US" dirty="0"/>
+              <a:t>Take a field that interests you:</a:t>
+            </a:r>
+          </a:p>
+          <a:p>
+            <a:pPr lvl="1"/>
+            <a:r>
+              <a:rPr lang="en-US" dirty="0"/>
+              <a:t>Ex.  Driving a car, understanding social networks, finding a good date, recommend a movie to watch, …</a:t>
+            </a:r>
+          </a:p>
+          <a:p>
+            <a:r>
+              <a:rPr lang="en-US" dirty="0"/>
+              <a:t>Identify a specific task that can be done with machine learning</a:t>
+            </a:r>
+          </a:p>
+          <a:p>
+            <a:pPr lvl="1"/>
+            <a:r>
+              <a:rPr lang="en-US" dirty="0"/>
+              <a:t>What is the objective of the task?</a:t>
+            </a:r>
+          </a:p>
+          <a:p>
+            <a:pPr lvl="1"/>
+            <a:r>
+              <a:rPr lang="en-US" dirty="0"/>
+              <a:t>What is the data you need?</a:t>
+            </a:r>
+          </a:p>
+          <a:p>
+            <a:pPr lvl="1"/>
+            <a:r>
+              <a:rPr lang="en-US" dirty="0"/>
+              <a:t>What type of ML problem is this?  Classification, regression, …</a:t>
+            </a:r>
+          </a:p>
+          <a:p>
+            <a:pPr lvl="1"/>
+            <a:r>
+              <a:rPr lang="en-US" dirty="0"/>
+              <a:t>How would your approach compare to an expert-driven method?</a:t>
+            </a:r>
+          </a:p>
+          <a:p>
+            <a:endParaRPr lang="en-US" dirty="0"/>
+          </a:p>
+        </p:txBody>
+      </p:sp>
+      <p:sp>
+        <p:nvSpPr>
+          <p:cNvPr id="4" name="Slide Number Placeholder 3"/>
+          <p:cNvSpPr>
+            <a:spLocks noGrp="1"/>
+          </p:cNvSpPr>
+          <p:nvPr>
+            <p:ph type="sldNum" sz="quarter" idx="12"/>
+          </p:nvPr>
+        </p:nvSpPr>
+        <p:spPr/>
+        <p:txBody>
+          <a:bodyPr/>
+          <a:lstStyle/>
+          <a:p>
+            <a:fld id="{629637A9-119A-49DA-BD12-AAC58B377D80}" type="slidenum">
+              <a:rPr lang="en-US" smtClean="0"/>
+              <a:t>25</a:t>
             </a:fld>
             <a:endParaRPr lang="en-US" dirty="0"/>
           </a:p>
@@ -8263,7 +8508,7 @@
             <a:pPr lvl="1"/>
             <a:r>
               <a:rPr lang="en-US" dirty="0"/>
-              <a:t>Human expertise does not exist (navigating on Mars),</a:t>
+              <a:t>Human expertise does not exist (ex: complex medical processes we don’t fully understand)</a:t>
             </a:r>
           </a:p>
           <a:p>
@@ -8368,147 +8613,91 @@
           </a:p>
         </p:txBody>
       </p:sp>
-      <mc:AlternateContent xmlns:mc="http://schemas.openxmlformats.org/markup-compatibility/2006">
-        <mc:Choice xmlns:a14="http://schemas.microsoft.com/office/drawing/2010/main" Requires="a14">
-          <p:sp>
-            <p:nvSpPr>
-              <p:cNvPr id="3" name="Content Placeholder 2"/>
-              <p:cNvSpPr>
-                <a:spLocks noGrp="1"/>
-              </p:cNvSpPr>
-              <p:nvPr>
-                <p:ph idx="1"/>
-              </p:nvPr>
-            </p:nvSpPr>
-            <p:spPr>
-              <a:xfrm>
-                <a:off x="1193460" y="3952787"/>
-                <a:ext cx="10261158" cy="2004230"/>
-              </a:xfrm>
-            </p:spPr>
-            <p:txBody>
-              <a:bodyPr>
-                <a:normAutofit/>
-              </a:bodyPr>
-              <a:lstStyle/>
-              <a:p>
-                <a:r>
-                  <a:rPr lang="en-US" dirty="0"/>
-                  <a:t>Recognize a digit from the image</a:t>
-                </a:r>
-              </a:p>
-              <a:p>
-                <a:r>
-                  <a:rPr lang="en-US" dirty="0"/>
-                  <a:t>Want a function </a:t>
-                </a:r>
-                <a14:m>
-                  <m:oMath xmlns:m="http://schemas.openxmlformats.org/officeDocument/2006/math">
-                    <m:r>
-                      <a:rPr lang="en-US" b="0" i="1" smtClean="0">
-                        <a:latin typeface="Cambria Math" panose="02040503050406030204" pitchFamily="18" charset="0"/>
-                      </a:rPr>
-                      <m:t>𝑓</m:t>
-                    </m:r>
-                    <m:d>
-                      <m:dPr>
-                        <m:ctrlPr>
-                          <a:rPr lang="en-US" b="0" i="1" smtClean="0">
-                            <a:latin typeface="Cambria Math" panose="02040503050406030204" pitchFamily="18" charset="0"/>
-                          </a:rPr>
-                        </m:ctrlPr>
-                      </m:dPr>
-                      <m:e>
-                        <m:r>
-                          <a:rPr lang="en-US" b="1" i="1" smtClean="0">
-                            <a:latin typeface="Cambria Math" panose="02040503050406030204" pitchFamily="18" charset="0"/>
-                          </a:rPr>
-                          <m:t>𝒙</m:t>
-                        </m:r>
-                      </m:e>
-                    </m:d>
-                    <m:r>
-                      <a:rPr lang="en-US" b="0" i="1" smtClean="0">
-                        <a:latin typeface="Cambria Math" panose="02040503050406030204" pitchFamily="18" charset="0"/>
-                      </a:rPr>
-                      <m:t>∈{0,1,…,9}</m:t>
-                    </m:r>
-                  </m:oMath>
-                </a14:m>
-                <a:r>
-                  <a:rPr lang="en-US" dirty="0"/>
-                  <a:t>,  </a:t>
-                </a:r>
-                <a14:m>
-                  <m:oMath xmlns:m="http://schemas.openxmlformats.org/officeDocument/2006/math">
-                    <m:r>
-                      <a:rPr lang="en-US" b="1" i="1" dirty="0" smtClean="0">
-                        <a:latin typeface="Cambria Math" panose="02040503050406030204" pitchFamily="18" charset="0"/>
-                      </a:rPr>
-                      <m:t>𝒙</m:t>
-                    </m:r>
-                  </m:oMath>
-                </a14:m>
-                <a:r>
-                  <a:rPr lang="en-US" dirty="0"/>
-                  <a:t> is a 28 x 28 matrix</a:t>
-                </a:r>
-              </a:p>
-              <a:p>
-                <a:pPr lvl="1"/>
-                <a:r>
-                  <a:rPr lang="en-US" dirty="0"/>
-                  <a:t>Takes input as an image</a:t>
-                </a:r>
-              </a:p>
-              <a:p>
-                <a:pPr lvl="1"/>
-                <a:r>
-                  <a:rPr lang="en-US" dirty="0"/>
-                  <a:t>Returns the estimated digit</a:t>
-                </a:r>
-              </a:p>
-            </p:txBody>
-          </p:sp>
-        </mc:Choice>
-        <mc:Fallback>
-          <p:sp>
-            <p:nvSpPr>
-              <p:cNvPr id="3" name="Content Placeholder 2"/>
-              <p:cNvSpPr>
-                <a:spLocks noGrp="1" noRot="1" noChangeAspect="1" noMove="1" noResize="1" noEditPoints="1" noAdjustHandles="1" noChangeArrowheads="1" noChangeShapeType="1" noTextEdit="1"/>
-              </p:cNvSpPr>
-              <p:nvPr>
-                <p:ph idx="1"/>
-              </p:nvPr>
-            </p:nvSpPr>
-            <p:spPr>
-              <a:xfrm>
-                <a:off x="1193460" y="3952787"/>
-                <a:ext cx="10261158" cy="2004230"/>
-              </a:xfrm>
-              <a:blipFill>
-                <a:blip r:embed="rId2"/>
-                <a:stretch>
-                  <a:fillRect l="-1426" t="-3040"/>
-                </a:stretch>
-              </a:blipFill>
-            </p:spPr>
-            <p:txBody>
-              <a:bodyPr/>
-              <a:lstStyle/>
-              <a:p>
-                <a:r>
-                  <a:rPr lang="en-US">
-                    <a:noFill/>
-                  </a:rPr>
-                  <a:t> </a:t>
-                </a:r>
-              </a:p>
-            </p:txBody>
-          </p:sp>
-        </mc:Fallback>
-      </mc:AlternateContent>
+      <p:sp>
+        <p:nvSpPr>
+          <p:cNvPr id="3" name="Content Placeholder 2"/>
+          <p:cNvSpPr>
+            <a:spLocks noGrp="1"/>
+          </p:cNvSpPr>
+          <p:nvPr>
+            <p:ph idx="1"/>
+          </p:nvPr>
+        </p:nvSpPr>
+        <p:spPr>
+          <a:xfrm>
+            <a:off x="1193460" y="3952787"/>
+            <a:ext cx="10261158" cy="2004230"/>
+          </a:xfrm>
+        </p:spPr>
+        <p:txBody>
+          <a:bodyPr>
+            <a:normAutofit lnSpcReduction="10000"/>
+          </a:bodyPr>
+          <a:lstStyle/>
+          <a:p>
+            <a:r>
+              <a:rPr lang="en-US" dirty="0">
+                <a:solidFill>
+                  <a:schemeClr val="accent1">
+                    <a:lumMod val="60000"/>
+                    <a:lumOff val="40000"/>
+                  </a:schemeClr>
+                </a:solidFill>
+              </a:rPr>
+              <a:t>Problem</a:t>
+            </a:r>
+            <a:r>
+              <a:rPr lang="en-US" dirty="0"/>
+              <a:t>:  Recognize a digit from the image</a:t>
+            </a:r>
+          </a:p>
+          <a:p>
+            <a:r>
+              <a:rPr lang="en-US" dirty="0">
+                <a:solidFill>
+                  <a:schemeClr val="accent1">
+                    <a:lumMod val="60000"/>
+                    <a:lumOff val="40000"/>
+                  </a:schemeClr>
+                </a:solidFill>
+              </a:rPr>
+              <a:t>MNIST dataset challenge</a:t>
+            </a:r>
+          </a:p>
+          <a:p>
+            <a:pPr lvl="1"/>
+            <a:r>
+              <a:rPr lang="en-US" dirty="0"/>
+              <a:t>Dataset developed in 1990s to spur AI research on a challenging problem for the time</a:t>
+            </a:r>
+          </a:p>
+          <a:p>
+            <a:pPr lvl="1"/>
+            <a:r>
+              <a:rPr lang="en-US" dirty="0"/>
+              <a:t>Data taken from census forms</a:t>
+            </a:r>
+          </a:p>
+          <a:p>
+            <a:pPr lvl="1"/>
+            <a:r>
+              <a:rPr lang="en-US" dirty="0"/>
+              <a:t>Became a classic benchmark for machine vision problems</a:t>
+            </a:r>
+          </a:p>
+          <a:p>
+            <a:pPr lvl="1"/>
+            <a:r>
+              <a:rPr lang="en-US" dirty="0"/>
+              <a:t>We will see this dataset extensively in this class</a:t>
+            </a:r>
+          </a:p>
+          <a:p>
+            <a:pPr lvl="1"/>
+            <a:endParaRPr lang="en-US" dirty="0"/>
+          </a:p>
+        </p:txBody>
+      </p:sp>
       <p:sp>
         <p:nvSpPr>
           <p:cNvPr id="4" name="Slide Number Placeholder 3"/>
@@ -8541,7 +8730,7 @@
           <p:nvPr/>
         </p:nvPicPr>
         <p:blipFill>
-          <a:blip r:embed="rId3"/>
+          <a:blip r:embed="rId2"/>
           <a:stretch>
             <a:fillRect/>
           </a:stretch>
@@ -8669,8 +8858,12 @@
             <a:pPr lvl="1"/>
             <a:r>
               <a:rPr lang="en-US" dirty="0"/>
-              <a:t>Construct simple rules and code them</a:t>
-            </a:r>
+              <a:t>So, you construct simple rules and code them</a:t>
+            </a:r>
+          </a:p>
+          <a:p>
+            <a:pPr lvl="1"/>
+            <a:endParaRPr lang="en-US" dirty="0"/>
           </a:p>
           <a:p>
             <a:r>
@@ -8712,47 +8905,19 @@
             </a:r>
           </a:p>
           <a:p>
-            <a:r>
-              <a:rPr lang="en-US" dirty="0"/>
-              <a:t>But, very difficult to make work in practice</a:t>
-            </a:r>
-          </a:p>
-          <a:p>
             <a:pPr lvl="1"/>
-            <a:r>
-              <a:rPr lang="en-US" dirty="0"/>
-              <a:t>Lacks robustness</a:t>
-            </a:r>
-          </a:p>
-          <a:p>
-            <a:pPr lvl="1"/>
-            <a:r>
-              <a:rPr lang="en-US" dirty="0"/>
-              <a:t>Rotations, curves in lines, poorly drawn digits, …</a:t>
-            </a:r>
-          </a:p>
-          <a:p>
-            <a:r>
-              <a:rPr lang="en-US" dirty="0">
-                <a:solidFill>
-                  <a:schemeClr val="accent1">
-                    <a:lumMod val="60000"/>
-                    <a:lumOff val="40000"/>
-                  </a:schemeClr>
-                </a:solidFill>
-              </a:rPr>
-              <a:t>Problem</a:t>
-            </a:r>
-            <a:r>
-              <a:rPr lang="en-US" dirty="0"/>
-              <a:t>:  We cannot easily code our knowledge </a:t>
-            </a:r>
-          </a:p>
-          <a:p>
-            <a:pPr lvl="1"/>
-            <a:r>
-              <a:rPr lang="en-US" dirty="0"/>
-              <a:t>Hard to translate to simple mathematical formula</a:t>
+            <a:endParaRPr lang="en-US" dirty="0"/>
+          </a:p>
+          <a:p>
+            <a:r>
+              <a:rPr lang="en-US" dirty="0"/>
+              <a:t>Rule seems simple and reasonable</a:t>
+            </a:r>
+          </a:p>
+          <a:p>
+            <a:r>
+              <a:rPr lang="en-US" dirty="0"/>
+              <a:t>But,…</a:t>
             </a:r>
           </a:p>
         </p:txBody>
@@ -8878,6 +9043,253 @@
       </p:grpSpPr>
       <p:sp>
         <p:nvSpPr>
+          <p:cNvPr id="2" name="Title 1">
+            <a:extLst>
+              <a:ext uri="{FF2B5EF4-FFF2-40B4-BE49-F238E27FC236}">
+                <a16:creationId xmlns:a16="http://schemas.microsoft.com/office/drawing/2014/main" id="{6B07E77B-55DC-4922-8DE8-FEDCFB22C433}"/>
+              </a:ext>
+            </a:extLst>
+          </p:cNvPr>
+          <p:cNvSpPr>
+            <a:spLocks noGrp="1"/>
+          </p:cNvSpPr>
+          <p:nvPr>
+            <p:ph type="title"/>
+          </p:nvPr>
+        </p:nvSpPr>
+        <p:spPr/>
+        <p:txBody>
+          <a:bodyPr/>
+          <a:lstStyle/>
+          <a:p>
+            <a:r>
+              <a:rPr lang="en-US" dirty="0"/>
+              <a:t>Problems with Expert Rules</a:t>
+            </a:r>
+          </a:p>
+        </p:txBody>
+      </p:sp>
+      <p:sp>
+        <p:nvSpPr>
+          <p:cNvPr id="3" name="Content Placeholder 2">
+            <a:extLst>
+              <a:ext uri="{FF2B5EF4-FFF2-40B4-BE49-F238E27FC236}">
+                <a16:creationId xmlns:a16="http://schemas.microsoft.com/office/drawing/2014/main" id="{1E11809B-624D-4C25-8870-0506926790DF}"/>
+              </a:ext>
+            </a:extLst>
+          </p:cNvPr>
+          <p:cNvSpPr>
+            <a:spLocks noGrp="1"/>
+          </p:cNvSpPr>
+          <p:nvPr>
+            <p:ph idx="1"/>
+          </p:nvPr>
+        </p:nvSpPr>
+        <p:spPr>
+          <a:xfrm>
+            <a:off x="1097280" y="2769327"/>
+            <a:ext cx="6964895" cy="3099768"/>
+          </a:xfrm>
+        </p:spPr>
+        <p:txBody>
+          <a:bodyPr>
+            <a:normAutofit/>
+          </a:bodyPr>
+          <a:lstStyle/>
+          <a:p>
+            <a:r>
+              <a:rPr lang="en-US" dirty="0"/>
+              <a:t>Simple expert rule breaks down in practice</a:t>
+            </a:r>
+          </a:p>
+          <a:p>
+            <a:pPr lvl="1"/>
+            <a:r>
+              <a:rPr lang="en-US" dirty="0"/>
+              <a:t>Hard to define a “line” precisely</a:t>
+            </a:r>
+          </a:p>
+          <a:p>
+            <a:pPr lvl="1"/>
+            <a:r>
+              <a:rPr lang="en-US" dirty="0"/>
+              <a:t>Orientation, length, thickness, …</a:t>
+            </a:r>
+          </a:p>
+          <a:p>
+            <a:pPr lvl="1"/>
+            <a:r>
+              <a:rPr lang="en-US" dirty="0"/>
+              <a:t>May be multiple lines…</a:t>
+            </a:r>
+          </a:p>
+          <a:p>
+            <a:endParaRPr lang="en-US" dirty="0">
+              <a:solidFill>
+                <a:schemeClr val="accent1">
+                  <a:lumMod val="60000"/>
+                  <a:lumOff val="40000"/>
+                </a:schemeClr>
+              </a:solidFill>
+            </a:endParaRPr>
+          </a:p>
+          <a:p>
+            <a:r>
+              <a:rPr lang="en-US" dirty="0">
+                <a:solidFill>
+                  <a:schemeClr val="accent1">
+                    <a:lumMod val="60000"/>
+                    <a:lumOff val="40000"/>
+                  </a:schemeClr>
+                </a:solidFill>
+              </a:rPr>
+              <a:t>General problem</a:t>
+            </a:r>
+            <a:r>
+              <a:rPr lang="en-US" dirty="0"/>
+              <a:t>:  We cannot easily code our knowledge </a:t>
+            </a:r>
+          </a:p>
+          <a:p>
+            <a:pPr lvl="1"/>
+            <a:r>
+              <a:rPr lang="en-US" dirty="0"/>
+              <a:t>We can do the task</a:t>
+            </a:r>
+          </a:p>
+          <a:p>
+            <a:pPr lvl="1"/>
+            <a:r>
+              <a:rPr lang="en-US" dirty="0"/>
+              <a:t>But, it is hard to translate to simple mathematical formula</a:t>
+            </a:r>
+          </a:p>
+          <a:p>
+            <a:endParaRPr lang="en-US" dirty="0"/>
+          </a:p>
+        </p:txBody>
+      </p:sp>
+      <p:sp>
+        <p:nvSpPr>
+          <p:cNvPr id="4" name="Slide Number Placeholder 3">
+            <a:extLst>
+              <a:ext uri="{FF2B5EF4-FFF2-40B4-BE49-F238E27FC236}">
+                <a16:creationId xmlns:a16="http://schemas.microsoft.com/office/drawing/2014/main" id="{866745E4-5EBC-4077-853C-60B700B29256}"/>
+              </a:ext>
+            </a:extLst>
+          </p:cNvPr>
+          <p:cNvSpPr>
+            <a:spLocks noGrp="1"/>
+          </p:cNvSpPr>
+          <p:nvPr>
+            <p:ph type="sldNum" sz="quarter" idx="12"/>
+          </p:nvPr>
+        </p:nvSpPr>
+        <p:spPr/>
+        <p:txBody>
+          <a:bodyPr/>
+          <a:lstStyle/>
+          <a:p>
+            <a:fld id="{629637A9-119A-49DA-BD12-AAC58B377D80}" type="slidenum">
+              <a:rPr lang="en-US" smtClean="0"/>
+              <a:t>7</a:t>
+            </a:fld>
+            <a:endParaRPr lang="en-US" dirty="0"/>
+          </a:p>
+        </p:txBody>
+      </p:sp>
+      <p:pic>
+        <p:nvPicPr>
+          <p:cNvPr id="5" name="Picture 4">
+            <a:extLst>
+              <a:ext uri="{FF2B5EF4-FFF2-40B4-BE49-F238E27FC236}">
+                <a16:creationId xmlns:a16="http://schemas.microsoft.com/office/drawing/2014/main" id="{A7B19DCF-D070-4625-A082-FB3FF39C5E56}"/>
+              </a:ext>
+            </a:extLst>
+          </p:cNvPr>
+          <p:cNvPicPr>
+            <a:picLocks noChangeAspect="1"/>
+          </p:cNvPicPr>
+          <p:nvPr/>
+        </p:nvPicPr>
+        <p:blipFill>
+          <a:blip r:embed="rId2"/>
+          <a:stretch>
+            <a:fillRect/>
+          </a:stretch>
+        </p:blipFill>
+        <p:spPr>
+          <a:xfrm>
+            <a:off x="1534749" y="1746641"/>
+            <a:ext cx="8181975" cy="885825"/>
+          </a:xfrm>
+          <a:prstGeom prst="rect">
+            <a:avLst/>
+          </a:prstGeom>
+        </p:spPr>
+      </p:pic>
+      <p:pic>
+        <p:nvPicPr>
+          <p:cNvPr id="6" name="Picture 5">
+            <a:extLst>
+              <a:ext uri="{FF2B5EF4-FFF2-40B4-BE49-F238E27FC236}">
+                <a16:creationId xmlns:a16="http://schemas.microsoft.com/office/drawing/2014/main" id="{EEFD694D-3F4C-46F8-96E2-9C989FBA2F0E}"/>
+              </a:ext>
+            </a:extLst>
+          </p:cNvPr>
+          <p:cNvPicPr>
+            <a:picLocks noChangeAspect="1"/>
+          </p:cNvPicPr>
+          <p:nvPr/>
+        </p:nvPicPr>
+        <p:blipFill>
+          <a:blip r:embed="rId3"/>
+          <a:stretch>
+            <a:fillRect/>
+          </a:stretch>
+        </p:blipFill>
+        <p:spPr>
+          <a:xfrm>
+            <a:off x="8458161" y="3052293"/>
+            <a:ext cx="2697519" cy="2771279"/>
+          </a:xfrm>
+          <a:prstGeom prst="rect">
+            <a:avLst/>
+          </a:prstGeom>
+        </p:spPr>
+      </p:pic>
+    </p:spTree>
+    <p:extLst>
+      <p:ext uri="{BB962C8B-B14F-4D97-AF65-F5344CB8AC3E}">
+        <p14:creationId xmlns:p14="http://schemas.microsoft.com/office/powerpoint/2010/main" val="3067472914"/>
+      </p:ext>
+    </p:extLst>
+  </p:cSld>
+  <p:clrMapOvr>
+    <a:masterClrMapping/>
+  </p:clrMapOvr>
+</p:sld>
+</file>
+
+<file path=ppt/slides/slide8.xml><?xml version="1.0" encoding="utf-8"?>
+<p:sld xmlns:a="http://schemas.openxmlformats.org/drawingml/2006/main" xmlns:r="http://schemas.openxmlformats.org/officeDocument/2006/relationships" xmlns:p="http://schemas.openxmlformats.org/presentationml/2006/main">
+  <p:cSld>
+    <p:spTree>
+      <p:nvGrpSpPr>
+        <p:cNvPr id="1" name=""/>
+        <p:cNvGrpSpPr/>
+        <p:nvPr/>
+      </p:nvGrpSpPr>
+      <p:grpSpPr>
+        <a:xfrm>
+          <a:off x="0" y="0"/>
+          <a:ext cx="0" cy="0"/>
+          <a:chOff x="0" y="0"/>
+          <a:chExt cx="0" cy="0"/>
+        </a:xfrm>
+      </p:grpSpPr>
+      <p:sp>
+        <p:nvSpPr>
           <p:cNvPr id="2" name="Title 1"/>
           <p:cNvSpPr>
             <a:spLocks noGrp="1"/>
@@ -8912,15 +9324,35 @@
             </p:nvSpPr>
             <p:spPr>
               <a:xfrm>
-                <a:off x="1026941" y="3668720"/>
-                <a:ext cx="9822767" cy="2046281"/>
+                <a:off x="1026939" y="3595987"/>
+                <a:ext cx="9822767" cy="2373739"/>
               </a:xfrm>
             </p:spPr>
             <p:txBody>
               <a:bodyPr>
-                <a:normAutofit lnSpcReduction="10000"/>
+                <a:normAutofit/>
               </a:bodyPr>
               <a:lstStyle/>
+              <a:p>
+                <a:r>
+                  <a:rPr lang="en-US" dirty="0"/>
+                  <a:t>Do not use your “expert” knowledge</a:t>
+                </a:r>
+              </a:p>
+              <a:p>
+                <a:r>
+                  <a:rPr lang="en-US" dirty="0"/>
+                  <a:t>Learn the function from data!</a:t>
+                </a:r>
+                <a:endParaRPr lang="en-US" dirty="0">
+                  <a:solidFill>
+                    <a:schemeClr val="accent1">
+                      <a:lumMod val="60000"/>
+                      <a:lumOff val="40000"/>
+                    </a:schemeClr>
+                  </a:solidFill>
+                </a:endParaRPr>
+              </a:p>
               <a:p>
                 <a:r>
                   <a:rPr lang="en-US" dirty="0">
@@ -9140,7 +9572,22 @@
                 </a:r>
                 <a:r>
                   <a:rPr lang="en-US" dirty="0"/>
-                  <a:t> a function </a:t>
+                  <a:t> a </a:t>
+                </a:r>
+                <a:r>
+                  <a:rPr lang="en-US" dirty="0">
+                    <a:solidFill>
+                      <a:schemeClr val="accent1">
+                        <a:lumMod val="60000"/>
+                        <a:lumOff val="40000"/>
+                      </a:schemeClr>
+                    </a:solidFill>
+                  </a:rPr>
+                  <a:t>function</a:t>
+                </a:r>
+                <a:r>
+                  <a:rPr lang="en-US" dirty="0"/>
+                  <a:t> </a:t>
                 </a:r>
                 <a14:m>
                   <m:oMath xmlns:m="http://schemas.openxmlformats.org/officeDocument/2006/math">
@@ -9257,30 +9704,6 @@
                 </a:r>
               </a:p>
               <a:p>
-                <a:pPr lvl="1"/>
-                <a:r>
-                  <a:rPr lang="en-US" dirty="0"/>
-                  <a:t>Use this function on new </a:t>
-                </a:r>
-                <a14:m>
-                  <m:oMath xmlns:m="http://schemas.openxmlformats.org/officeDocument/2006/math">
-                    <m:r>
-                      <a:rPr lang="en-US" b="1" i="1">
-                        <a:latin typeface="Cambria Math" panose="02040503050406030204" pitchFamily="18" charset="0"/>
-                      </a:rPr>
-                      <m:t>𝒙</m:t>
-                    </m:r>
-                  </m:oMath>
-                </a14:m>
-                <a:endParaRPr lang="en-US" dirty="0"/>
-              </a:p>
-              <a:p>
-                <a:r>
-                  <a:rPr lang="en-US" dirty="0"/>
-                  <a:t>No manual coding!</a:t>
-                </a:r>
-              </a:p>
-              <a:p>
                 <a:endParaRPr lang="en-US" dirty="0"/>
               </a:p>
             </p:txBody>
@@ -9299,13 +9722,13 @@
             </p:nvSpPr>
             <p:spPr>
               <a:xfrm>
-                <a:off x="1026941" y="3668720"/>
-                <a:ext cx="9822767" cy="2046281"/>
+                <a:off x="1026939" y="3595987"/>
+                <a:ext cx="9822767" cy="2373739"/>
               </a:xfrm>
               <a:blipFill>
                 <a:blip r:embed="rId2"/>
                 <a:stretch>
-                  <a:fillRect l="-1489" t="-4464" b="-298"/>
+                  <a:fillRect l="-1489" t="-2828"/>
                 </a:stretch>
               </a:blipFill>
             </p:spPr>
@@ -9341,7 +9764,7 @@
           <a:p>
             <a:fld id="{629637A9-119A-49DA-BD12-AAC58B377D80}" type="slidenum">
               <a:rPr lang="en-US" smtClean="0"/>
-              <a:t>7</a:t>
+              <a:t>8</a:t>
             </a:fld>
             <a:endParaRPr lang="en-US" dirty="0"/>
           </a:p>
@@ -9371,8 +9794,8 @@
           </a:prstGeom>
         </p:spPr>
       </p:pic>
-      <mc:AlternateContent xmlns:mc="http://schemas.openxmlformats.org/markup-compatibility/2006">
-        <mc:Choice xmlns:a14="http://schemas.microsoft.com/office/drawing/2010/main" Requires="a14">
+      <mc:AlternateContent xmlns:mc="http://schemas.openxmlformats.org/markup-compatibility/2006" xmlns:a14="http://schemas.microsoft.com/office/drawing/2010/main">
+        <mc:Choice Requires="a14">
           <p:sp>
             <p:nvSpPr>
               <p:cNvPr id="6" name="TextBox 5"/>
@@ -9436,7 +9859,7 @@
             </p:txBody>
           </p:sp>
         </mc:Choice>
-        <mc:Fallback>
+        <mc:Fallback xmlns="">
           <p:sp>
             <p:nvSpPr>
               <p:cNvPr id="6" name="TextBox 5"/>
@@ -9527,8 +9950,8 @@
           </a:p>
         </p:txBody>
       </p:sp>
-      <mc:AlternateContent xmlns:mc="http://schemas.openxmlformats.org/markup-compatibility/2006">
-        <mc:Choice xmlns:a14="http://schemas.microsoft.com/office/drawing/2010/main" Requires="a14">
+      <mc:AlternateContent xmlns:mc="http://schemas.openxmlformats.org/markup-compatibility/2006" xmlns:a14="http://schemas.microsoft.com/office/drawing/2010/main">
+        <mc:Choice Requires="a14">
           <p:sp>
             <p:nvSpPr>
               <p:cNvPr id="8" name="TextBox 7">
@@ -9604,7 +10027,7 @@
             </p:txBody>
           </p:sp>
         </mc:Choice>
-        <mc:Fallback>
+        <mc:Fallback xmlns="">
           <p:sp>
             <p:nvSpPr>
               <p:cNvPr id="8" name="TextBox 7">
@@ -9649,8 +10072,8 @@
           </p:sp>
         </mc:Fallback>
       </mc:AlternateContent>
-      <mc:AlternateContent xmlns:mc="http://schemas.openxmlformats.org/markup-compatibility/2006">
-        <mc:Choice xmlns:a14="http://schemas.microsoft.com/office/drawing/2010/main" Requires="a14">
+      <mc:AlternateContent xmlns:mc="http://schemas.openxmlformats.org/markup-compatibility/2006" xmlns:a14="http://schemas.microsoft.com/office/drawing/2010/main">
+        <mc:Choice Requires="a14">
           <p:sp>
             <p:nvSpPr>
               <p:cNvPr id="9" name="TextBox 8">
@@ -9679,6 +10102,7 @@
               </a:bodyPr>
               <a:lstStyle/>
               <a:p>
+                <a:pPr/>
                 <a:r>
                   <a:rPr lang="en-US" b="0" dirty="0"/>
                   <a:t>Learned classifier </a:t>
@@ -9724,7 +10148,7 @@
             </p:txBody>
           </p:sp>
         </mc:Choice>
-        <mc:Fallback>
+        <mc:Fallback xmlns="">
           <p:sp>
             <p:nvSpPr>
               <p:cNvPr id="9" name="TextBox 8">
@@ -9832,7 +10256,7 @@
 </p:sld>
 </file>
 
-<file path=ppt/slides/slide8.xml><?xml version="1.0" encoding="utf-8"?>
+<file path=ppt/slides/slide9.xml><?xml version="1.0" encoding="utf-8"?>
 <p:sld xmlns:a="http://schemas.openxmlformats.org/drawingml/2006/main" xmlns:r="http://schemas.openxmlformats.org/officeDocument/2006/relationships" xmlns:p="http://schemas.openxmlformats.org/presentationml/2006/main">
   <p:cSld>
     <p:spTree>
@@ -9872,13 +10296,13 @@
           <a:p>
             <a:r>
               <a:rPr lang="en-US" dirty="0"/>
-              <a:t>ML Approach Challenges</a:t>
-            </a:r>
-          </a:p>
-        </p:txBody>
-      </p:sp>
-      <mc:AlternateContent xmlns:mc="http://schemas.openxmlformats.org/markup-compatibility/2006">
-        <mc:Choice xmlns:a14="http://schemas.microsoft.com/office/drawing/2010/main" Requires="a14">
+              <a:t>ML Approach Benefits and Challenges</a:t>
+            </a:r>
+          </a:p>
+        </p:txBody>
+      </p:sp>
+      <mc:AlternateContent xmlns:mc="http://schemas.openxmlformats.org/markup-compatibility/2006" xmlns:a14="http://schemas.microsoft.com/office/drawing/2010/main">
+        <mc:Choice Requires="a14">
           <p:sp>
             <p:nvSpPr>
               <p:cNvPr id="3" name="Content Placeholder 2">
@@ -9898,7 +10322,7 @@
             <p:spPr/>
             <p:txBody>
               <a:bodyPr>
-                <a:normAutofit/>
+                <a:normAutofit lnSpcReduction="10000"/>
               </a:bodyPr>
               <a:lstStyle/>
               <a:p>
@@ -9911,7 +10335,7 @@
                 <a:pPr lvl="1"/>
                 <a:r>
                   <a:rPr lang="en-US" dirty="0"/>
-                  <a:t>On digit recognition,  </a:t>
+                  <a:t>On MNIST,  </a:t>
                 </a:r>
                 <a:r>
                   <a:rPr lang="en-US" dirty="0">
@@ -9939,6 +10363,9 @@
                 </a:r>
               </a:p>
               <a:p>
+                <a:endParaRPr lang="en-US" dirty="0"/>
+              </a:p>
+              <a:p>
                 <a:r>
                   <a:rPr lang="en-US" dirty="0"/>
                   <a:t>But, there are challenges:</a:t>
@@ -9948,66 +10375,29 @@
                 <a:pPr lvl="1"/>
                 <a:r>
                   <a:rPr lang="en-US" dirty="0"/>
-                  <a:t>Need labeled data.  Someone has to manually create this.</a:t>
+                  <a:t>How do we </a:t>
+                </a:r>
+                <a:r>
+                  <a:rPr lang="en-US" dirty="0">
+                    <a:solidFill>
+                      <a:schemeClr val="accent1">
+                        <a:lumMod val="60000"/>
+                        <a:lumOff val="40000"/>
+                      </a:schemeClr>
+                    </a:solidFill>
+                  </a:rPr>
+                  <a:t>acquire data</a:t>
+                </a:r>
+                <a:r>
+                  <a:rPr lang="en-US" dirty="0"/>
+                  <a:t>?  Someone has to manually label examples.</a:t>
                 </a:r>
               </a:p>
               <a:p>
                 <a:pPr lvl="1"/>
                 <a:r>
                   <a:rPr lang="en-US" dirty="0"/>
-                  <a:t>How do we search over a set of functions </a:t>
-                </a:r>
-                <a14:m>
-                  <m:oMath xmlns:m="http://schemas.openxmlformats.org/officeDocument/2006/math">
-                    <m:r>
-                      <a:rPr lang="en-US" i="1">
-                        <a:latin typeface="Cambria Math" panose="02040503050406030204" pitchFamily="18" charset="0"/>
-                      </a:rPr>
-                      <m:t>𝑓</m:t>
-                    </m:r>
-                    <m:r>
-                      <a:rPr lang="en-US" i="1">
-                        <a:latin typeface="Cambria Math" panose="02040503050406030204" pitchFamily="18" charset="0"/>
-                      </a:rPr>
-                      <m:t>(</m:t>
-                    </m:r>
-                    <m:r>
-                      <a:rPr lang="en-US" b="1" i="1">
-                        <a:latin typeface="Cambria Math" panose="02040503050406030204" pitchFamily="18" charset="0"/>
-                      </a:rPr>
-                      <m:t>𝒙</m:t>
-                    </m:r>
-                    <m:r>
-                      <a:rPr lang="en-US" i="1">
-                        <a:latin typeface="Cambria Math" panose="02040503050406030204" pitchFamily="18" charset="0"/>
-                      </a:rPr>
-                      <m:t>)</m:t>
-                    </m:r>
-                  </m:oMath>
-                </a14:m>
-                <a:r>
-                  <a:rPr lang="en-US" dirty="0"/>
-                  <a:t>?</a:t>
-                </a:r>
-              </a:p>
-              <a:p>
-                <a:pPr lvl="1"/>
-                <a:r>
-                  <a:rPr lang="en-US" dirty="0"/>
-                  <a:t>If a function works on training example, will it work on new data?</a:t>
-                </a:r>
-              </a:p>
-              <a:p>
-                <a:r>
-                  <a:rPr lang="en-US" dirty="0"/>
-                  <a:t>Some things you will learn in this course</a:t>
-                </a:r>
-              </a:p>
-              <a:p>
-                <a:pPr lvl="1"/>
-                <a:r>
-                  <a:rPr lang="en-US" dirty="0"/>
-                  <a:t>How to </a:t>
+                  <a:t>How do we </a:t>
                 </a:r>
                 <a:r>
                   <a:rPr lang="en-US" dirty="0">
@@ -10022,14 +10412,45 @@
                 </a:r>
                 <a:r>
                   <a:rPr lang="en-US" dirty="0"/>
-                  <a:t> a set functions</a:t>
+                  <a:t> a set of functions </a:t>
+                </a:r>
+                <a14:m>
+                  <m:oMath xmlns:m="http://schemas.openxmlformats.org/officeDocument/2006/math">
+                    <m:r>
+                      <a:rPr lang="en-US" i="1">
+                        <a:latin typeface="Cambria Math" panose="02040503050406030204" pitchFamily="18" charset="0"/>
+                      </a:rPr>
+                      <m:t>𝑓</m:t>
+                    </m:r>
+                    <m:d>
+                      <m:dPr>
+                        <m:ctrlPr>
+                          <a:rPr lang="en-US" i="1">
+                            <a:latin typeface="Cambria Math" panose="02040503050406030204" pitchFamily="18" charset="0"/>
+                          </a:rPr>
+                        </m:ctrlPr>
+                      </m:dPr>
+                      <m:e>
+                        <m:r>
+                          <a:rPr lang="en-US" b="1" i="1">
+                            <a:latin typeface="Cambria Math" panose="02040503050406030204" pitchFamily="18" charset="0"/>
+                          </a:rPr>
+                          <m:t>𝒙</m:t>
+                        </m:r>
+                      </m:e>
+                    </m:d>
+                  </m:oMath>
+                </a14:m>
+                <a:r>
+                  <a:rPr lang="en-US" dirty="0"/>
+                  <a:t> to search?</a:t>
                 </a:r>
               </a:p>
               <a:p>
                 <a:pPr lvl="1"/>
                 <a:r>
                   <a:rPr lang="en-US" dirty="0"/>
-                  <a:t>How to </a:t>
+                  <a:t>How do we </a:t>
                 </a:r>
                 <a:r>
                   <a:rPr lang="en-US" dirty="0">
@@ -10044,14 +10465,14 @@
                 </a:r>
                 <a:r>
                   <a:rPr lang="en-US" dirty="0"/>
-                  <a:t> a function</a:t>
+                  <a:t> the function to data?</a:t>
                 </a:r>
               </a:p>
               <a:p>
                 <a:pPr lvl="1"/>
                 <a:r>
                   <a:rPr lang="en-US" dirty="0"/>
-                  <a:t>How to ensure it </a:t>
+                  <a:t>If a function works on training example, will it </a:t>
                 </a:r>
                 <a:r>
                   <a:rPr lang="en-US" dirty="0">
@@ -10062,21 +10483,30 @@
                       </a:schemeClr>
                     </a:solidFill>
                   </a:rPr>
-                  <a:t>generalizes</a:t>
+                  <a:t>generalize</a:t>
                 </a:r>
                 <a:r>
                   <a:rPr lang="en-US" dirty="0"/>
-                  <a:t> to new examples</a:t>
+                  <a:t> on new data?</a:t>
                 </a:r>
               </a:p>
               <a:p>
                 <a:pPr lvl="1"/>
                 <a:endParaRPr lang="en-US" dirty="0"/>
               </a:p>
+              <a:p>
+                <a:r>
+                  <a:rPr lang="en-US" dirty="0"/>
+                  <a:t>This is what you will learn in this class</a:t>
+                </a:r>
+              </a:p>
+              <a:p>
+                <a:endParaRPr lang="en-US" dirty="0"/>
+              </a:p>
             </p:txBody>
           </p:sp>
         </mc:Choice>
-        <mc:Fallback>
+        <mc:Fallback xmlns="">
           <p:sp>
             <p:nvSpPr>
               <p:cNvPr id="3" name="Content Placeholder 2">
@@ -10097,7 +10527,7 @@
               <a:blipFill>
                 <a:blip r:embed="rId3"/>
                 <a:stretch>
-                  <a:fillRect l="-1455" t="-1549"/>
+                  <a:fillRect l="-1455" t="-2113"/>
                 </a:stretch>
               </a:blipFill>
             </p:spPr>
@@ -10139,7 +10569,7 @@
           <a:p>
             <a:fld id="{629637A9-119A-49DA-BD12-AAC58B377D80}" type="slidenum">
               <a:rPr lang="en-US" smtClean="0"/>
-              <a:t>8</a:t>
+              <a:t>9</a:t>
             </a:fld>
             <a:endParaRPr lang="en-US" dirty="0"/>
           </a:p>
@@ -10179,145 +10609,6 @@
     <p:extLst>
       <p:ext uri="{BB962C8B-B14F-4D97-AF65-F5344CB8AC3E}">
         <p14:creationId xmlns:p14="http://schemas.microsoft.com/office/powerpoint/2010/main" val="961105563"/>
-      </p:ext>
-    </p:extLst>
-  </p:cSld>
-  <p:clrMapOvr>
-    <a:masterClrMapping/>
-  </p:clrMapOvr>
-</p:sld>
-</file>
-
-<file path=ppt/slides/slide9.xml><?xml version="1.0" encoding="utf-8"?>
-<p:sld xmlns:a="http://schemas.openxmlformats.org/drawingml/2006/main" xmlns:r="http://schemas.openxmlformats.org/officeDocument/2006/relationships" xmlns:p="http://schemas.openxmlformats.org/presentationml/2006/main">
-  <p:cSld>
-    <p:spTree>
-      <p:nvGrpSpPr>
-        <p:cNvPr id="1" name=""/>
-        <p:cNvGrpSpPr/>
-        <p:nvPr/>
-      </p:nvGrpSpPr>
-      <p:grpSpPr>
-        <a:xfrm>
-          <a:off x="0" y="0"/>
-          <a:ext cx="0" cy="0"/>
-          <a:chOff x="0" y="0"/>
-          <a:chExt cx="0" cy="0"/>
-        </a:xfrm>
-      </p:grpSpPr>
-      <p:sp>
-        <p:nvSpPr>
-          <p:cNvPr id="2" name="Title 1"/>
-          <p:cNvSpPr>
-            <a:spLocks noGrp="1"/>
-          </p:cNvSpPr>
-          <p:nvPr>
-            <p:ph type="title"/>
-          </p:nvPr>
-        </p:nvSpPr>
-        <p:spPr/>
-        <p:txBody>
-          <a:bodyPr/>
-          <a:lstStyle/>
-          <a:p>
-            <a:r>
-              <a:rPr lang="en-US" dirty="0"/>
-              <a:t>Example 2:  Face Detection</a:t>
-            </a:r>
-          </a:p>
-        </p:txBody>
-      </p:sp>
-      <p:sp>
-        <p:nvSpPr>
-          <p:cNvPr id="3" name="Content Placeholder 2"/>
-          <p:cNvSpPr>
-            <a:spLocks noGrp="1"/>
-          </p:cNvSpPr>
-          <p:nvPr>
-            <p:ph idx="1"/>
-          </p:nvPr>
-        </p:nvSpPr>
-        <p:spPr>
-          <a:xfrm>
-            <a:off x="1097280" y="4200144"/>
-            <a:ext cx="10058400" cy="1668950"/>
-          </a:xfrm>
-        </p:spPr>
-        <p:txBody>
-          <a:bodyPr/>
-          <a:lstStyle/>
-          <a:p>
-            <a:r>
-              <a:rPr lang="en-US" dirty="0"/>
-              <a:t>Also a supervised learning problem</a:t>
-            </a:r>
-          </a:p>
-          <a:p>
-            <a:r>
-              <a:rPr lang="en-US" dirty="0"/>
-              <a:t>For each image region, determine if</a:t>
-            </a:r>
-          </a:p>
-          <a:p>
-            <a:pPr lvl="1"/>
-            <a:r>
-              <a:rPr lang="en-US" dirty="0"/>
-              <a:t>Face or non-face</a:t>
-            </a:r>
-          </a:p>
-        </p:txBody>
-      </p:sp>
-      <p:sp>
-        <p:nvSpPr>
-          <p:cNvPr id="4" name="Slide Number Placeholder 3"/>
-          <p:cNvSpPr>
-            <a:spLocks noGrp="1"/>
-          </p:cNvSpPr>
-          <p:nvPr>
-            <p:ph type="sldNum" sz="quarter" idx="12"/>
-          </p:nvPr>
-        </p:nvSpPr>
-        <p:spPr/>
-        <p:txBody>
-          <a:bodyPr/>
-          <a:lstStyle/>
-          <a:p>
-            <a:fld id="{629637A9-119A-49DA-BD12-AAC58B377D80}" type="slidenum">
-              <a:rPr lang="en-US" smtClean="0"/>
-              <a:t>9</a:t>
-            </a:fld>
-            <a:endParaRPr lang="en-US" dirty="0"/>
-          </a:p>
-        </p:txBody>
-      </p:sp>
-      <p:pic>
-        <p:nvPicPr>
-          <p:cNvPr id="5" name="Picture 4"/>
-          <p:cNvPicPr>
-            <a:picLocks noChangeAspect="1"/>
-          </p:cNvPicPr>
-          <p:nvPr/>
-        </p:nvPicPr>
-        <p:blipFill>
-          <a:blip r:embed="rId2"/>
-          <a:stretch>
-            <a:fillRect/>
-          </a:stretch>
-        </p:blipFill>
-        <p:spPr>
-          <a:xfrm>
-            <a:off x="1269379" y="1643491"/>
-            <a:ext cx="6974506" cy="2219518"/>
-          </a:xfrm>
-          <a:prstGeom prst="rect">
-            <a:avLst/>
-          </a:prstGeom>
-        </p:spPr>
-      </p:pic>
-    </p:spTree>
-    <p:extLst>
-      <p:ext uri="{BB962C8B-B14F-4D97-AF65-F5344CB8AC3E}">
-        <p14:creationId xmlns:p14="http://schemas.microsoft.com/office/powerpoint/2010/main" val="2884451023"/>
       </p:ext>
     </p:extLst>
   </p:cSld>

</xml_diff>